<commit_message>
Added information about Amdahl's Law.
</commit_message>
<xml_diff>
--- a/Lectures/Designing Concurrent Software/Designing Concurrent Software.pptx
+++ b/Lectures/Designing Concurrent Software/Designing Concurrent Software.pptx
@@ -5,7 +5,7 @@
     <p:sldMasterId id="2147483660" r:id="rId1"/>
   </p:sldMasterIdLst>
   <p:notesMasterIdLst>
-    <p:notesMasterId r:id="rId14"/>
+    <p:notesMasterId r:id="rId19"/>
   </p:notesMasterIdLst>
   <p:sldIdLst>
     <p:sldId id="256" r:id="rId2"/>
@@ -20,6 +20,11 @@
     <p:sldId id="265" r:id="rId11"/>
     <p:sldId id="266" r:id="rId12"/>
     <p:sldId id="267" r:id="rId13"/>
+    <p:sldId id="268" r:id="rId14"/>
+    <p:sldId id="269" r:id="rId15"/>
+    <p:sldId id="270" r:id="rId16"/>
+    <p:sldId id="271" r:id="rId17"/>
+    <p:sldId id="272" r:id="rId18"/>
   </p:sldIdLst>
   <p:sldSz cx="9144000" cy="6858000" type="screen4x3"/>
   <p:notesSz cx="6858000" cy="9144000"/>
@@ -121,6 +126,1190 @@
 </p:presentation>
 </file>
 
+<file path=ppt/charts/chart1.xml><?xml version="1.0" encoding="utf-8"?>
+<c:chartSpace xmlns:c="http://schemas.openxmlformats.org/drawingml/2006/chart" xmlns:a="http://schemas.openxmlformats.org/drawingml/2006/main" xmlns:r="http://schemas.openxmlformats.org/officeDocument/2006/relationships">
+  <c:date1904 val="0"/>
+  <c:lang val="en-US"/>
+  <c:roundedCorners val="0"/>
+  <mc:AlternateContent xmlns:mc="http://schemas.openxmlformats.org/markup-compatibility/2006">
+    <mc:Choice xmlns:c14="http://schemas.microsoft.com/office/drawing/2007/8/2/chart" Requires="c14">
+      <c14:style val="102"/>
+    </mc:Choice>
+    <mc:Fallback>
+      <c:style val="2"/>
+    </mc:Fallback>
+  </mc:AlternateContent>
+  <c:chart>
+    <c:title>
+      <c:tx>
+        <c:rich>
+          <a:bodyPr/>
+          <a:lstStyle/>
+          <a:p>
+            <a:pPr>
+              <a:defRPr/>
+            </a:pPr>
+            <a:r>
+              <a:rPr lang="en-US" dirty="0"/>
+              <a:t>Amdahl's</a:t>
+            </a:r>
+            <a:r>
+              <a:rPr lang="en-US" baseline="0" dirty="0"/>
+              <a:t> Law for values of </a:t>
+            </a:r>
+            <a:r>
+              <a:rPr lang="en-US" i="1" baseline="0" dirty="0"/>
+              <a:t>f</a:t>
+            </a:r>
+            <a:r>
+              <a:rPr lang="en-US" i="1" baseline="-25000" dirty="0"/>
+              <a:t>s</a:t>
+            </a:r>
+          </a:p>
+        </c:rich>
+      </c:tx>
+      <c:layout/>
+      <c:overlay val="0"/>
+    </c:title>
+    <c:autoTitleDeleted val="0"/>
+    <c:plotArea>
+      <c:layout/>
+      <c:scatterChart>
+        <c:scatterStyle val="smoothMarker"/>
+        <c:varyColors val="0"/>
+        <c:ser>
+          <c:idx val="0"/>
+          <c:order val="0"/>
+          <c:tx>
+            <c:strRef>
+              <c:f>Sheet1!$B$1</c:f>
+              <c:strCache>
+                <c:ptCount val="1"/>
+                <c:pt idx="0">
+                  <c:v>P (fs = 0.01)</c:v>
+                </c:pt>
+              </c:strCache>
+            </c:strRef>
+          </c:tx>
+          <c:xVal>
+            <c:numRef>
+              <c:f>Sheet1!$A$2:$A$20</c:f>
+              <c:numCache>
+                <c:formatCode>General</c:formatCode>
+                <c:ptCount val="19"/>
+                <c:pt idx="0">
+                  <c:v>1</c:v>
+                </c:pt>
+                <c:pt idx="1">
+                  <c:v>2</c:v>
+                </c:pt>
+                <c:pt idx="2">
+                  <c:v>3</c:v>
+                </c:pt>
+                <c:pt idx="3">
+                  <c:v>4</c:v>
+                </c:pt>
+                <c:pt idx="4">
+                  <c:v>6</c:v>
+                </c:pt>
+                <c:pt idx="5">
+                  <c:v>7</c:v>
+                </c:pt>
+                <c:pt idx="6">
+                  <c:v>8</c:v>
+                </c:pt>
+                <c:pt idx="7">
+                  <c:v>9</c:v>
+                </c:pt>
+                <c:pt idx="8">
+                  <c:v>10</c:v>
+                </c:pt>
+                <c:pt idx="9">
+                  <c:v>11</c:v>
+                </c:pt>
+                <c:pt idx="10">
+                  <c:v>12</c:v>
+                </c:pt>
+                <c:pt idx="11">
+                  <c:v>13</c:v>
+                </c:pt>
+                <c:pt idx="12">
+                  <c:v>14</c:v>
+                </c:pt>
+                <c:pt idx="13">
+                  <c:v>15</c:v>
+                </c:pt>
+                <c:pt idx="14">
+                  <c:v>16</c:v>
+                </c:pt>
+                <c:pt idx="15">
+                  <c:v>17</c:v>
+                </c:pt>
+                <c:pt idx="16">
+                  <c:v>18</c:v>
+                </c:pt>
+                <c:pt idx="17">
+                  <c:v>19</c:v>
+                </c:pt>
+                <c:pt idx="18">
+                  <c:v>20</c:v>
+                </c:pt>
+              </c:numCache>
+            </c:numRef>
+          </c:xVal>
+          <c:yVal>
+            <c:numRef>
+              <c:f>Sheet1!$B$2:$B$20</c:f>
+              <c:numCache>
+                <c:formatCode>General</c:formatCode>
+                <c:ptCount val="19"/>
+                <c:pt idx="0">
+                  <c:v>1</c:v>
+                </c:pt>
+                <c:pt idx="1">
+                  <c:v>1.9801980198019802</c:v>
+                </c:pt>
+                <c:pt idx="2">
+                  <c:v>2.9411764705882351</c:v>
+                </c:pt>
+                <c:pt idx="3">
+                  <c:v>3.883495145631068</c:v>
+                </c:pt>
+                <c:pt idx="4">
+                  <c:v>5.7142857142857135</c:v>
+                </c:pt>
+                <c:pt idx="5">
+                  <c:v>6.6037735849056602</c:v>
+                </c:pt>
+                <c:pt idx="6">
+                  <c:v>7.4766355140186915</c:v>
+                </c:pt>
+                <c:pt idx="7">
+                  <c:v>8.3333333333333339</c:v>
+                </c:pt>
+                <c:pt idx="8">
+                  <c:v>9.1743119266055047</c:v>
+                </c:pt>
+                <c:pt idx="9">
+                  <c:v>10</c:v>
+                </c:pt>
+                <c:pt idx="10">
+                  <c:v>10.810810810810811</c:v>
+                </c:pt>
+                <c:pt idx="11">
+                  <c:v>11.607142857142858</c:v>
+                </c:pt>
+                <c:pt idx="12">
+                  <c:v>12.389380530973451</c:v>
+                </c:pt>
+                <c:pt idx="13">
+                  <c:v>13.157894736842106</c:v>
+                </c:pt>
+                <c:pt idx="14">
+                  <c:v>13.913043478260871</c:v>
+                </c:pt>
+                <c:pt idx="15">
+                  <c:v>14.655172413793103</c:v>
+                </c:pt>
+                <c:pt idx="16">
+                  <c:v>15.384615384615383</c:v>
+                </c:pt>
+                <c:pt idx="17">
+                  <c:v>16.101694915254235</c:v>
+                </c:pt>
+                <c:pt idx="18">
+                  <c:v>16.806722689075627</c:v>
+                </c:pt>
+              </c:numCache>
+            </c:numRef>
+          </c:yVal>
+          <c:smooth val="1"/>
+        </c:ser>
+        <c:ser>
+          <c:idx val="1"/>
+          <c:order val="1"/>
+          <c:tx>
+            <c:strRef>
+              <c:f>Sheet1!$C$1</c:f>
+              <c:strCache>
+                <c:ptCount val="1"/>
+                <c:pt idx="0">
+                  <c:v>P (fs = 0.05)</c:v>
+                </c:pt>
+              </c:strCache>
+            </c:strRef>
+          </c:tx>
+          <c:xVal>
+            <c:numRef>
+              <c:f>Sheet1!$A$2:$A$20</c:f>
+              <c:numCache>
+                <c:formatCode>General</c:formatCode>
+                <c:ptCount val="19"/>
+                <c:pt idx="0">
+                  <c:v>1</c:v>
+                </c:pt>
+                <c:pt idx="1">
+                  <c:v>2</c:v>
+                </c:pt>
+                <c:pt idx="2">
+                  <c:v>3</c:v>
+                </c:pt>
+                <c:pt idx="3">
+                  <c:v>4</c:v>
+                </c:pt>
+                <c:pt idx="4">
+                  <c:v>6</c:v>
+                </c:pt>
+                <c:pt idx="5">
+                  <c:v>7</c:v>
+                </c:pt>
+                <c:pt idx="6">
+                  <c:v>8</c:v>
+                </c:pt>
+                <c:pt idx="7">
+                  <c:v>9</c:v>
+                </c:pt>
+                <c:pt idx="8">
+                  <c:v>10</c:v>
+                </c:pt>
+                <c:pt idx="9">
+                  <c:v>11</c:v>
+                </c:pt>
+                <c:pt idx="10">
+                  <c:v>12</c:v>
+                </c:pt>
+                <c:pt idx="11">
+                  <c:v>13</c:v>
+                </c:pt>
+                <c:pt idx="12">
+                  <c:v>14</c:v>
+                </c:pt>
+                <c:pt idx="13">
+                  <c:v>15</c:v>
+                </c:pt>
+                <c:pt idx="14">
+                  <c:v>16</c:v>
+                </c:pt>
+                <c:pt idx="15">
+                  <c:v>17</c:v>
+                </c:pt>
+                <c:pt idx="16">
+                  <c:v>18</c:v>
+                </c:pt>
+                <c:pt idx="17">
+                  <c:v>19</c:v>
+                </c:pt>
+                <c:pt idx="18">
+                  <c:v>20</c:v>
+                </c:pt>
+              </c:numCache>
+            </c:numRef>
+          </c:xVal>
+          <c:yVal>
+            <c:numRef>
+              <c:f>Sheet1!$C$2:$C$20</c:f>
+              <c:numCache>
+                <c:formatCode>General</c:formatCode>
+                <c:ptCount val="19"/>
+                <c:pt idx="0">
+                  <c:v>1</c:v>
+                </c:pt>
+                <c:pt idx="1">
+                  <c:v>1.9047619047619047</c:v>
+                </c:pt>
+                <c:pt idx="2">
+                  <c:v>2.7272727272727275</c:v>
+                </c:pt>
+                <c:pt idx="3">
+                  <c:v>3.4782608695652177</c:v>
+                </c:pt>
+                <c:pt idx="4">
+                  <c:v>4.8000000000000007</c:v>
+                </c:pt>
+                <c:pt idx="5">
+                  <c:v>5.3846153846153841</c:v>
+                </c:pt>
+                <c:pt idx="6">
+                  <c:v>5.9259259259259256</c:v>
+                </c:pt>
+                <c:pt idx="7">
+                  <c:v>6.4285714285714288</c:v>
+                </c:pt>
+                <c:pt idx="8">
+                  <c:v>6.8965517241379306</c:v>
+                </c:pt>
+                <c:pt idx="9">
+                  <c:v>7.3333333333333339</c:v>
+                </c:pt>
+                <c:pt idx="10">
+                  <c:v>7.7419354838709689</c:v>
+                </c:pt>
+                <c:pt idx="11">
+                  <c:v>8.125</c:v>
+                </c:pt>
+                <c:pt idx="12">
+                  <c:v>8.4848484848484844</c:v>
+                </c:pt>
+                <c:pt idx="13">
+                  <c:v>8.8235294117647065</c:v>
+                </c:pt>
+                <c:pt idx="14">
+                  <c:v>9.1428571428571423</c:v>
+                </c:pt>
+                <c:pt idx="15">
+                  <c:v>9.4444444444444446</c:v>
+                </c:pt>
+                <c:pt idx="16">
+                  <c:v>9.7297297297297298</c:v>
+                </c:pt>
+                <c:pt idx="17">
+                  <c:v>10</c:v>
+                </c:pt>
+                <c:pt idx="18">
+                  <c:v>10.256410256410255</c:v>
+                </c:pt>
+              </c:numCache>
+            </c:numRef>
+          </c:yVal>
+          <c:smooth val="1"/>
+        </c:ser>
+        <c:ser>
+          <c:idx val="2"/>
+          <c:order val="2"/>
+          <c:tx>
+            <c:strRef>
+              <c:f>Sheet1!$D$1</c:f>
+              <c:strCache>
+                <c:ptCount val="1"/>
+                <c:pt idx="0">
+                  <c:v>P (fs = 0.1)</c:v>
+                </c:pt>
+              </c:strCache>
+            </c:strRef>
+          </c:tx>
+          <c:xVal>
+            <c:numRef>
+              <c:f>Sheet1!$A$2:$A$20</c:f>
+              <c:numCache>
+                <c:formatCode>General</c:formatCode>
+                <c:ptCount val="19"/>
+                <c:pt idx="0">
+                  <c:v>1</c:v>
+                </c:pt>
+                <c:pt idx="1">
+                  <c:v>2</c:v>
+                </c:pt>
+                <c:pt idx="2">
+                  <c:v>3</c:v>
+                </c:pt>
+                <c:pt idx="3">
+                  <c:v>4</c:v>
+                </c:pt>
+                <c:pt idx="4">
+                  <c:v>6</c:v>
+                </c:pt>
+                <c:pt idx="5">
+                  <c:v>7</c:v>
+                </c:pt>
+                <c:pt idx="6">
+                  <c:v>8</c:v>
+                </c:pt>
+                <c:pt idx="7">
+                  <c:v>9</c:v>
+                </c:pt>
+                <c:pt idx="8">
+                  <c:v>10</c:v>
+                </c:pt>
+                <c:pt idx="9">
+                  <c:v>11</c:v>
+                </c:pt>
+                <c:pt idx="10">
+                  <c:v>12</c:v>
+                </c:pt>
+                <c:pt idx="11">
+                  <c:v>13</c:v>
+                </c:pt>
+                <c:pt idx="12">
+                  <c:v>14</c:v>
+                </c:pt>
+                <c:pt idx="13">
+                  <c:v>15</c:v>
+                </c:pt>
+                <c:pt idx="14">
+                  <c:v>16</c:v>
+                </c:pt>
+                <c:pt idx="15">
+                  <c:v>17</c:v>
+                </c:pt>
+                <c:pt idx="16">
+                  <c:v>18</c:v>
+                </c:pt>
+                <c:pt idx="17">
+                  <c:v>19</c:v>
+                </c:pt>
+                <c:pt idx="18">
+                  <c:v>20</c:v>
+                </c:pt>
+              </c:numCache>
+            </c:numRef>
+          </c:xVal>
+          <c:yVal>
+            <c:numRef>
+              <c:f>Sheet1!$D$2:$D$20</c:f>
+              <c:numCache>
+                <c:formatCode>General</c:formatCode>
+                <c:ptCount val="19"/>
+                <c:pt idx="0">
+                  <c:v>1</c:v>
+                </c:pt>
+                <c:pt idx="1">
+                  <c:v>1.8181818181818181</c:v>
+                </c:pt>
+                <c:pt idx="2">
+                  <c:v>2.5</c:v>
+                </c:pt>
+                <c:pt idx="3">
+                  <c:v>3.0769230769230766</c:v>
+                </c:pt>
+                <c:pt idx="4">
+                  <c:v>4</c:v>
+                </c:pt>
+                <c:pt idx="5">
+                  <c:v>4.375</c:v>
+                </c:pt>
+                <c:pt idx="6">
+                  <c:v>4.7058823529411757</c:v>
+                </c:pt>
+                <c:pt idx="7">
+                  <c:v>5</c:v>
+                </c:pt>
+                <c:pt idx="8">
+                  <c:v>5.2631578947368425</c:v>
+                </c:pt>
+                <c:pt idx="9">
+                  <c:v>5.5</c:v>
+                </c:pt>
+                <c:pt idx="10">
+                  <c:v>5.7142857142857144</c:v>
+                </c:pt>
+                <c:pt idx="11">
+                  <c:v>5.9090909090909092</c:v>
+                </c:pt>
+                <c:pt idx="12">
+                  <c:v>6.086956521739129</c:v>
+                </c:pt>
+                <c:pt idx="13">
+                  <c:v>6.25</c:v>
+                </c:pt>
+                <c:pt idx="14">
+                  <c:v>6.4</c:v>
+                </c:pt>
+                <c:pt idx="15">
+                  <c:v>6.5384615384615383</c:v>
+                </c:pt>
+                <c:pt idx="16">
+                  <c:v>6.6666666666666661</c:v>
+                </c:pt>
+                <c:pt idx="17">
+                  <c:v>6.7857142857142847</c:v>
+                </c:pt>
+                <c:pt idx="18">
+                  <c:v>6.8965517241379306</c:v>
+                </c:pt>
+              </c:numCache>
+            </c:numRef>
+          </c:yVal>
+          <c:smooth val="1"/>
+        </c:ser>
+        <c:ser>
+          <c:idx val="3"/>
+          <c:order val="3"/>
+          <c:tx>
+            <c:strRef>
+              <c:f>Sheet1!$E$1</c:f>
+              <c:strCache>
+                <c:ptCount val="1"/>
+                <c:pt idx="0">
+                  <c:v>P (fs = 0.2)</c:v>
+                </c:pt>
+              </c:strCache>
+            </c:strRef>
+          </c:tx>
+          <c:xVal>
+            <c:numRef>
+              <c:f>Sheet1!$A$2:$A$20</c:f>
+              <c:numCache>
+                <c:formatCode>General</c:formatCode>
+                <c:ptCount val="19"/>
+                <c:pt idx="0">
+                  <c:v>1</c:v>
+                </c:pt>
+                <c:pt idx="1">
+                  <c:v>2</c:v>
+                </c:pt>
+                <c:pt idx="2">
+                  <c:v>3</c:v>
+                </c:pt>
+                <c:pt idx="3">
+                  <c:v>4</c:v>
+                </c:pt>
+                <c:pt idx="4">
+                  <c:v>6</c:v>
+                </c:pt>
+                <c:pt idx="5">
+                  <c:v>7</c:v>
+                </c:pt>
+                <c:pt idx="6">
+                  <c:v>8</c:v>
+                </c:pt>
+                <c:pt idx="7">
+                  <c:v>9</c:v>
+                </c:pt>
+                <c:pt idx="8">
+                  <c:v>10</c:v>
+                </c:pt>
+                <c:pt idx="9">
+                  <c:v>11</c:v>
+                </c:pt>
+                <c:pt idx="10">
+                  <c:v>12</c:v>
+                </c:pt>
+                <c:pt idx="11">
+                  <c:v>13</c:v>
+                </c:pt>
+                <c:pt idx="12">
+                  <c:v>14</c:v>
+                </c:pt>
+                <c:pt idx="13">
+                  <c:v>15</c:v>
+                </c:pt>
+                <c:pt idx="14">
+                  <c:v>16</c:v>
+                </c:pt>
+                <c:pt idx="15">
+                  <c:v>17</c:v>
+                </c:pt>
+                <c:pt idx="16">
+                  <c:v>18</c:v>
+                </c:pt>
+                <c:pt idx="17">
+                  <c:v>19</c:v>
+                </c:pt>
+                <c:pt idx="18">
+                  <c:v>20</c:v>
+                </c:pt>
+              </c:numCache>
+            </c:numRef>
+          </c:xVal>
+          <c:yVal>
+            <c:numRef>
+              <c:f>Sheet1!$E$2:$E$20</c:f>
+              <c:numCache>
+                <c:formatCode>General</c:formatCode>
+                <c:ptCount val="19"/>
+                <c:pt idx="0">
+                  <c:v>1</c:v>
+                </c:pt>
+                <c:pt idx="1">
+                  <c:v>1.6666666666666665</c:v>
+                </c:pt>
+                <c:pt idx="2">
+                  <c:v>2.1428571428571428</c:v>
+                </c:pt>
+                <c:pt idx="3">
+                  <c:v>2.5</c:v>
+                </c:pt>
+                <c:pt idx="4">
+                  <c:v>2.9999999999999996</c:v>
+                </c:pt>
+                <c:pt idx="5">
+                  <c:v>3.1818181818181821</c:v>
+                </c:pt>
+                <c:pt idx="6">
+                  <c:v>3.333333333333333</c:v>
+                </c:pt>
+                <c:pt idx="7">
+                  <c:v>3.4615384615384612</c:v>
+                </c:pt>
+                <c:pt idx="8">
+                  <c:v>3.5714285714285712</c:v>
+                </c:pt>
+                <c:pt idx="9">
+                  <c:v>3.6666666666666661</c:v>
+                </c:pt>
+                <c:pt idx="10">
+                  <c:v>3.75</c:v>
+                </c:pt>
+                <c:pt idx="11">
+                  <c:v>3.8235294117647056</c:v>
+                </c:pt>
+                <c:pt idx="12">
+                  <c:v>3.8888888888888884</c:v>
+                </c:pt>
+                <c:pt idx="13">
+                  <c:v>3.9473684210526314</c:v>
+                </c:pt>
+                <c:pt idx="14">
+                  <c:v>4</c:v>
+                </c:pt>
+                <c:pt idx="15">
+                  <c:v>4.0476190476190474</c:v>
+                </c:pt>
+                <c:pt idx="16">
+                  <c:v>4.0909090909090908</c:v>
+                </c:pt>
+                <c:pt idx="17">
+                  <c:v>4.1304347826086953</c:v>
+                </c:pt>
+                <c:pt idx="18">
+                  <c:v>4.1666666666666661</c:v>
+                </c:pt>
+              </c:numCache>
+            </c:numRef>
+          </c:yVal>
+          <c:smooth val="1"/>
+        </c:ser>
+        <c:ser>
+          <c:idx val="4"/>
+          <c:order val="4"/>
+          <c:tx>
+            <c:strRef>
+              <c:f>Sheet1!$F$1</c:f>
+              <c:strCache>
+                <c:ptCount val="1"/>
+                <c:pt idx="0">
+                  <c:v>P (fs = 0.3)</c:v>
+                </c:pt>
+              </c:strCache>
+            </c:strRef>
+          </c:tx>
+          <c:xVal>
+            <c:numRef>
+              <c:f>Sheet1!$A$2:$A$20</c:f>
+              <c:numCache>
+                <c:formatCode>General</c:formatCode>
+                <c:ptCount val="19"/>
+                <c:pt idx="0">
+                  <c:v>1</c:v>
+                </c:pt>
+                <c:pt idx="1">
+                  <c:v>2</c:v>
+                </c:pt>
+                <c:pt idx="2">
+                  <c:v>3</c:v>
+                </c:pt>
+                <c:pt idx="3">
+                  <c:v>4</c:v>
+                </c:pt>
+                <c:pt idx="4">
+                  <c:v>6</c:v>
+                </c:pt>
+                <c:pt idx="5">
+                  <c:v>7</c:v>
+                </c:pt>
+                <c:pt idx="6">
+                  <c:v>8</c:v>
+                </c:pt>
+                <c:pt idx="7">
+                  <c:v>9</c:v>
+                </c:pt>
+                <c:pt idx="8">
+                  <c:v>10</c:v>
+                </c:pt>
+                <c:pt idx="9">
+                  <c:v>11</c:v>
+                </c:pt>
+                <c:pt idx="10">
+                  <c:v>12</c:v>
+                </c:pt>
+                <c:pt idx="11">
+                  <c:v>13</c:v>
+                </c:pt>
+                <c:pt idx="12">
+                  <c:v>14</c:v>
+                </c:pt>
+                <c:pt idx="13">
+                  <c:v>15</c:v>
+                </c:pt>
+                <c:pt idx="14">
+                  <c:v>16</c:v>
+                </c:pt>
+                <c:pt idx="15">
+                  <c:v>17</c:v>
+                </c:pt>
+                <c:pt idx="16">
+                  <c:v>18</c:v>
+                </c:pt>
+                <c:pt idx="17">
+                  <c:v>19</c:v>
+                </c:pt>
+                <c:pt idx="18">
+                  <c:v>20</c:v>
+                </c:pt>
+              </c:numCache>
+            </c:numRef>
+          </c:xVal>
+          <c:yVal>
+            <c:numRef>
+              <c:f>Sheet1!$F$2:$F$20</c:f>
+              <c:numCache>
+                <c:formatCode>General</c:formatCode>
+                <c:ptCount val="19"/>
+                <c:pt idx="0">
+                  <c:v>1</c:v>
+                </c:pt>
+                <c:pt idx="1">
+                  <c:v>1.5384615384615388</c:v>
+                </c:pt>
+                <c:pt idx="2">
+                  <c:v>1.875</c:v>
+                </c:pt>
+                <c:pt idx="3">
+                  <c:v>2.1052631578947367</c:v>
+                </c:pt>
+                <c:pt idx="4">
+                  <c:v>2.4000000000000004</c:v>
+                </c:pt>
+                <c:pt idx="5">
+                  <c:v>2.5</c:v>
+                </c:pt>
+                <c:pt idx="6">
+                  <c:v>2.580645161290323</c:v>
+                </c:pt>
+                <c:pt idx="7">
+                  <c:v>2.6470588235294117</c:v>
+                </c:pt>
+                <c:pt idx="8">
+                  <c:v>2.7027027027027026</c:v>
+                </c:pt>
+                <c:pt idx="9">
+                  <c:v>2.75</c:v>
+                </c:pt>
+                <c:pt idx="10">
+                  <c:v>2.7906976744186047</c:v>
+                </c:pt>
+                <c:pt idx="11">
+                  <c:v>2.8260869565217392</c:v>
+                </c:pt>
+                <c:pt idx="12">
+                  <c:v>2.8571428571428572</c:v>
+                </c:pt>
+                <c:pt idx="13">
+                  <c:v>2.8846153846153846</c:v>
+                </c:pt>
+                <c:pt idx="14">
+                  <c:v>2.9090909090909092</c:v>
+                </c:pt>
+                <c:pt idx="15">
+                  <c:v>2.9310344827586206</c:v>
+                </c:pt>
+                <c:pt idx="16">
+                  <c:v>2.9508196721311473</c:v>
+                </c:pt>
+                <c:pt idx="17">
+                  <c:v>2.96875</c:v>
+                </c:pt>
+                <c:pt idx="18">
+                  <c:v>2.9850746268656718</c:v>
+                </c:pt>
+              </c:numCache>
+            </c:numRef>
+          </c:yVal>
+          <c:smooth val="1"/>
+        </c:ser>
+        <c:ser>
+          <c:idx val="5"/>
+          <c:order val="5"/>
+          <c:tx>
+            <c:strRef>
+              <c:f>Sheet1!$G$1</c:f>
+              <c:strCache>
+                <c:ptCount val="1"/>
+                <c:pt idx="0">
+                  <c:v>P (fs = 0.4)</c:v>
+                </c:pt>
+              </c:strCache>
+            </c:strRef>
+          </c:tx>
+          <c:xVal>
+            <c:numRef>
+              <c:f>Sheet1!$A$2:$A$20</c:f>
+              <c:numCache>
+                <c:formatCode>General</c:formatCode>
+                <c:ptCount val="19"/>
+                <c:pt idx="0">
+                  <c:v>1</c:v>
+                </c:pt>
+                <c:pt idx="1">
+                  <c:v>2</c:v>
+                </c:pt>
+                <c:pt idx="2">
+                  <c:v>3</c:v>
+                </c:pt>
+                <c:pt idx="3">
+                  <c:v>4</c:v>
+                </c:pt>
+                <c:pt idx="4">
+                  <c:v>6</c:v>
+                </c:pt>
+                <c:pt idx="5">
+                  <c:v>7</c:v>
+                </c:pt>
+                <c:pt idx="6">
+                  <c:v>8</c:v>
+                </c:pt>
+                <c:pt idx="7">
+                  <c:v>9</c:v>
+                </c:pt>
+                <c:pt idx="8">
+                  <c:v>10</c:v>
+                </c:pt>
+                <c:pt idx="9">
+                  <c:v>11</c:v>
+                </c:pt>
+                <c:pt idx="10">
+                  <c:v>12</c:v>
+                </c:pt>
+                <c:pt idx="11">
+                  <c:v>13</c:v>
+                </c:pt>
+                <c:pt idx="12">
+                  <c:v>14</c:v>
+                </c:pt>
+                <c:pt idx="13">
+                  <c:v>15</c:v>
+                </c:pt>
+                <c:pt idx="14">
+                  <c:v>16</c:v>
+                </c:pt>
+                <c:pt idx="15">
+                  <c:v>17</c:v>
+                </c:pt>
+                <c:pt idx="16">
+                  <c:v>18</c:v>
+                </c:pt>
+                <c:pt idx="17">
+                  <c:v>19</c:v>
+                </c:pt>
+                <c:pt idx="18">
+                  <c:v>20</c:v>
+                </c:pt>
+              </c:numCache>
+            </c:numRef>
+          </c:xVal>
+          <c:yVal>
+            <c:numRef>
+              <c:f>Sheet1!$G$2:$G$20</c:f>
+              <c:numCache>
+                <c:formatCode>General</c:formatCode>
+                <c:ptCount val="19"/>
+                <c:pt idx="0">
+                  <c:v>1</c:v>
+                </c:pt>
+                <c:pt idx="1">
+                  <c:v>1.4285714285714286</c:v>
+                </c:pt>
+                <c:pt idx="2">
+                  <c:v>1.6666666666666667</c:v>
+                </c:pt>
+                <c:pt idx="3">
+                  <c:v>1.8181818181818181</c:v>
+                </c:pt>
+                <c:pt idx="4">
+                  <c:v>2</c:v>
+                </c:pt>
+                <c:pt idx="5">
+                  <c:v>2.0588235294117645</c:v>
+                </c:pt>
+                <c:pt idx="6">
+                  <c:v>2.1052631578947367</c:v>
+                </c:pt>
+                <c:pt idx="7">
+                  <c:v>2.1428571428571428</c:v>
+                </c:pt>
+                <c:pt idx="8">
+                  <c:v>2.1739130434782608</c:v>
+                </c:pt>
+                <c:pt idx="9">
+                  <c:v>2.1999999999999997</c:v>
+                </c:pt>
+                <c:pt idx="10">
+                  <c:v>2.2222222222222223</c:v>
+                </c:pt>
+                <c:pt idx="11">
+                  <c:v>2.2413793103448274</c:v>
+                </c:pt>
+                <c:pt idx="12">
+                  <c:v>2.258064516129032</c:v>
+                </c:pt>
+                <c:pt idx="13">
+                  <c:v>2.2727272727272729</c:v>
+                </c:pt>
+                <c:pt idx="14">
+                  <c:v>2.2857142857142856</c:v>
+                </c:pt>
+                <c:pt idx="15">
+                  <c:v>2.2972972972972974</c:v>
+                </c:pt>
+                <c:pt idx="16">
+                  <c:v>2.3076923076923075</c:v>
+                </c:pt>
+                <c:pt idx="17">
+                  <c:v>2.3170731707317072</c:v>
+                </c:pt>
+                <c:pt idx="18">
+                  <c:v>2.3255813953488369</c:v>
+                </c:pt>
+              </c:numCache>
+            </c:numRef>
+          </c:yVal>
+          <c:smooth val="1"/>
+        </c:ser>
+        <c:ser>
+          <c:idx val="6"/>
+          <c:order val="6"/>
+          <c:tx>
+            <c:strRef>
+              <c:f>Sheet1!$H$1</c:f>
+              <c:strCache>
+                <c:ptCount val="1"/>
+                <c:pt idx="0">
+                  <c:v>P (fs = 0.5)</c:v>
+                </c:pt>
+              </c:strCache>
+            </c:strRef>
+          </c:tx>
+          <c:xVal>
+            <c:numRef>
+              <c:f>Sheet1!$A$2:$A$20</c:f>
+              <c:numCache>
+                <c:formatCode>General</c:formatCode>
+                <c:ptCount val="19"/>
+                <c:pt idx="0">
+                  <c:v>1</c:v>
+                </c:pt>
+                <c:pt idx="1">
+                  <c:v>2</c:v>
+                </c:pt>
+                <c:pt idx="2">
+                  <c:v>3</c:v>
+                </c:pt>
+                <c:pt idx="3">
+                  <c:v>4</c:v>
+                </c:pt>
+                <c:pt idx="4">
+                  <c:v>6</c:v>
+                </c:pt>
+                <c:pt idx="5">
+                  <c:v>7</c:v>
+                </c:pt>
+                <c:pt idx="6">
+                  <c:v>8</c:v>
+                </c:pt>
+                <c:pt idx="7">
+                  <c:v>9</c:v>
+                </c:pt>
+                <c:pt idx="8">
+                  <c:v>10</c:v>
+                </c:pt>
+                <c:pt idx="9">
+                  <c:v>11</c:v>
+                </c:pt>
+                <c:pt idx="10">
+                  <c:v>12</c:v>
+                </c:pt>
+                <c:pt idx="11">
+                  <c:v>13</c:v>
+                </c:pt>
+                <c:pt idx="12">
+                  <c:v>14</c:v>
+                </c:pt>
+                <c:pt idx="13">
+                  <c:v>15</c:v>
+                </c:pt>
+                <c:pt idx="14">
+                  <c:v>16</c:v>
+                </c:pt>
+                <c:pt idx="15">
+                  <c:v>17</c:v>
+                </c:pt>
+                <c:pt idx="16">
+                  <c:v>18</c:v>
+                </c:pt>
+                <c:pt idx="17">
+                  <c:v>19</c:v>
+                </c:pt>
+                <c:pt idx="18">
+                  <c:v>20</c:v>
+                </c:pt>
+              </c:numCache>
+            </c:numRef>
+          </c:xVal>
+          <c:yVal>
+            <c:numRef>
+              <c:f>Sheet1!$H$2:$H$20</c:f>
+              <c:numCache>
+                <c:formatCode>General</c:formatCode>
+                <c:ptCount val="19"/>
+                <c:pt idx="0">
+                  <c:v>1</c:v>
+                </c:pt>
+                <c:pt idx="1">
+                  <c:v>1.3333333333333333</c:v>
+                </c:pt>
+                <c:pt idx="2">
+                  <c:v>1.5</c:v>
+                </c:pt>
+                <c:pt idx="3">
+                  <c:v>1.6</c:v>
+                </c:pt>
+                <c:pt idx="4">
+                  <c:v>1.7142857142857142</c:v>
+                </c:pt>
+                <c:pt idx="5">
+                  <c:v>1.75</c:v>
+                </c:pt>
+                <c:pt idx="6">
+                  <c:v>1.7777777777777777</c:v>
+                </c:pt>
+                <c:pt idx="7">
+                  <c:v>1.7999999999999998</c:v>
+                </c:pt>
+                <c:pt idx="8">
+                  <c:v>1.8181818181818181</c:v>
+                </c:pt>
+                <c:pt idx="9">
+                  <c:v>1.8333333333333335</c:v>
+                </c:pt>
+                <c:pt idx="10">
+                  <c:v>1.8461538461538463</c:v>
+                </c:pt>
+                <c:pt idx="11">
+                  <c:v>1.8571428571428572</c:v>
+                </c:pt>
+                <c:pt idx="12">
+                  <c:v>1.8666666666666667</c:v>
+                </c:pt>
+                <c:pt idx="13">
+                  <c:v>1.875</c:v>
+                </c:pt>
+                <c:pt idx="14">
+                  <c:v>1.8823529411764706</c:v>
+                </c:pt>
+                <c:pt idx="15">
+                  <c:v>1.8888888888888888</c:v>
+                </c:pt>
+                <c:pt idx="16">
+                  <c:v>1.8947368421052631</c:v>
+                </c:pt>
+                <c:pt idx="17">
+                  <c:v>1.9000000000000001</c:v>
+                </c:pt>
+                <c:pt idx="18">
+                  <c:v>1.9047619047619047</c:v>
+                </c:pt>
+              </c:numCache>
+            </c:numRef>
+          </c:yVal>
+          <c:smooth val="1"/>
+        </c:ser>
+        <c:dLbls>
+          <c:showLegendKey val="0"/>
+          <c:showVal val="0"/>
+          <c:showCatName val="0"/>
+          <c:showSerName val="0"/>
+          <c:showPercent val="0"/>
+          <c:showBubbleSize val="0"/>
+        </c:dLbls>
+        <c:axId val="175581440"/>
+        <c:axId val="175825664"/>
+      </c:scatterChart>
+      <c:valAx>
+        <c:axId val="175581440"/>
+        <c:scaling>
+          <c:orientation val="minMax"/>
+          <c:max val="20"/>
+        </c:scaling>
+        <c:delete val="0"/>
+        <c:axPos val="b"/>
+        <c:title>
+          <c:tx>
+            <c:rich>
+              <a:bodyPr/>
+              <a:lstStyle/>
+              <a:p>
+                <a:pPr>
+                  <a:defRPr/>
+                </a:pPr>
+                <a:r>
+                  <a:rPr lang="en-US"/>
+                  <a:t>N</a:t>
+                </a:r>
+              </a:p>
+            </c:rich>
+          </c:tx>
+          <c:layout/>
+          <c:overlay val="0"/>
+        </c:title>
+        <c:numFmt formatCode="General" sourceLinked="1"/>
+        <c:majorTickMark val="out"/>
+        <c:minorTickMark val="none"/>
+        <c:tickLblPos val="nextTo"/>
+        <c:crossAx val="175825664"/>
+        <c:crosses val="autoZero"/>
+        <c:crossBetween val="midCat"/>
+      </c:valAx>
+      <c:valAx>
+        <c:axId val="175825664"/>
+        <c:scaling>
+          <c:orientation val="minMax"/>
+        </c:scaling>
+        <c:delete val="0"/>
+        <c:axPos val="l"/>
+        <c:majorGridlines/>
+        <c:title>
+          <c:tx>
+            <c:rich>
+              <a:bodyPr rot="0" vert="wordArtVert"/>
+              <a:lstStyle/>
+              <a:p>
+                <a:pPr>
+                  <a:defRPr/>
+                </a:pPr>
+                <a:r>
+                  <a:rPr lang="en-US"/>
+                  <a:t>P</a:t>
+                </a:r>
+              </a:p>
+            </c:rich>
+          </c:tx>
+          <c:layout/>
+          <c:overlay val="0"/>
+        </c:title>
+        <c:numFmt formatCode="General" sourceLinked="1"/>
+        <c:majorTickMark val="out"/>
+        <c:minorTickMark val="none"/>
+        <c:tickLblPos val="nextTo"/>
+        <c:crossAx val="175581440"/>
+        <c:crosses val="autoZero"/>
+        <c:crossBetween val="midCat"/>
+      </c:valAx>
+    </c:plotArea>
+    <c:legend>
+      <c:legendPos val="r"/>
+      <c:layout/>
+      <c:overlay val="0"/>
+    </c:legend>
+    <c:plotVisOnly val="1"/>
+    <c:dispBlanksAs val="gap"/>
+    <c:showDLblsOverMax val="0"/>
+  </c:chart>
+  <c:externalData r:id="rId1">
+    <c:autoUpdate val="0"/>
+  </c:externalData>
+</c:chartSpace>
+</file>
+
 <file path=ppt/notesMasters/notesMaster1.xml><?xml version="1.0" encoding="utf-8"?>
 <p:notesMaster xmlns:a="http://schemas.openxmlformats.org/drawingml/2006/main" xmlns:r="http://schemas.openxmlformats.org/officeDocument/2006/relationships" xmlns:p="http://schemas.openxmlformats.org/presentationml/2006/main">
   <p:cSld>
@@ -203,7 +1392,7 @@
           <a:p>
             <a:fld id="{DBE0ECA1-3FBF-48AE-AD2A-4439AE745E19}" type="datetimeFigureOut">
               <a:rPr lang="en-US" smtClean="0"/>
-              <a:t>12/12/2013</a:t>
+              <a:t>12/17/2013</a:t>
             </a:fld>
             <a:endParaRPr lang="en-US"/>
           </a:p>
@@ -664,7 +1853,7 @@
           <a:p>
             <a:fld id="{9769DED8-28D4-45B9-A00F-7CFE9335FEA6}" type="datetime1">
               <a:rPr lang="en-US" smtClean="0"/>
-              <a:t>12/12/2013</a:t>
+              <a:t>12/17/2013</a:t>
             </a:fld>
             <a:endParaRPr lang="en-US"/>
           </a:p>
@@ -929,7 +2118,7 @@
           <a:p>
             <a:fld id="{2DB3D439-1F88-44B4-B5F7-F9BCD4064257}" type="datetime1">
               <a:rPr lang="en-US" smtClean="0"/>
-              <a:t>12/12/2013</a:t>
+              <a:t>12/17/2013</a:t>
             </a:fld>
             <a:endParaRPr lang="en-US"/>
           </a:p>
@@ -1104,7 +2293,7 @@
           <a:p>
             <a:fld id="{99C5638F-6F55-4055-935C-67841BE78C36}" type="datetime1">
               <a:rPr lang="en-US" smtClean="0"/>
-              <a:t>12/12/2013</a:t>
+              <a:t>12/17/2013</a:t>
             </a:fld>
             <a:endParaRPr lang="en-US"/>
           </a:p>
@@ -1269,7 +2458,7 @@
           <a:p>
             <a:fld id="{E6987D90-0C92-4B22-A29D-FED15412CED2}" type="datetime1">
               <a:rPr lang="en-US" smtClean="0"/>
-              <a:t>12/12/2013</a:t>
+              <a:t>12/17/2013</a:t>
             </a:fld>
             <a:endParaRPr lang="en-US"/>
           </a:p>
@@ -1518,7 +2707,7 @@
           <a:p>
             <a:fld id="{DDB67BC4-9554-49E0-BCB3-D1EF965BA0B8}" type="datetime1">
               <a:rPr lang="en-US" smtClean="0"/>
-              <a:t>12/12/2013</a:t>
+              <a:t>12/17/2013</a:t>
             </a:fld>
             <a:endParaRPr lang="en-US"/>
           </a:p>
@@ -1801,7 +2990,7 @@
           <a:p>
             <a:fld id="{EC24D770-803D-4E01-921C-9C100DD8230C}" type="datetime1">
               <a:rPr lang="en-US" smtClean="0"/>
-              <a:t>12/12/2013</a:t>
+              <a:t>12/17/2013</a:t>
             </a:fld>
             <a:endParaRPr lang="en-US"/>
           </a:p>
@@ -2240,7 +3429,7 @@
           <a:p>
             <a:fld id="{356AD44B-78A4-4209-8070-7DCBE2DC4992}" type="datetime1">
               <a:rPr lang="en-US" smtClean="0"/>
-              <a:t>12/12/2013</a:t>
+              <a:t>12/17/2013</a:t>
             </a:fld>
             <a:endParaRPr lang="en-US"/>
           </a:p>
@@ -2353,7 +3542,7 @@
           <a:p>
             <a:fld id="{A993C59A-7CA2-467F-B7F1-9096881A01B8}" type="datetime1">
               <a:rPr lang="en-US" smtClean="0"/>
-              <a:t>12/12/2013</a:t>
+              <a:t>12/17/2013</a:t>
             </a:fld>
             <a:endParaRPr lang="en-US"/>
           </a:p>
@@ -2443,7 +3632,7 @@
           <a:p>
             <a:fld id="{2B6B58D0-2488-434A-8ED1-692E09B85CC5}" type="datetime1">
               <a:rPr lang="en-US" smtClean="0"/>
-              <a:t>12/12/2013</a:t>
+              <a:t>12/17/2013</a:t>
             </a:fld>
             <a:endParaRPr lang="en-US"/>
           </a:p>
@@ -2685,7 +3874,7 @@
           <a:p>
             <a:fld id="{FDB0AFC2-7D64-4F61-A7B7-9932D3305DDA}" type="datetime1">
               <a:rPr lang="en-US" smtClean="0"/>
-              <a:t>12/12/2013</a:t>
+              <a:t>12/17/2013</a:t>
             </a:fld>
             <a:endParaRPr lang="en-US"/>
           </a:p>
@@ -2979,7 +4168,7 @@
           <a:p>
             <a:fld id="{4983D17A-D7B2-4ECE-8A2C-93679B9D177B}" type="datetime1">
               <a:rPr lang="en-US" smtClean="0"/>
-              <a:t>12/12/2013</a:t>
+              <a:t>12/17/2013</a:t>
             </a:fld>
             <a:endParaRPr lang="en-US"/>
           </a:p>
@@ -3273,7 +4462,7 @@
           <a:p>
             <a:fld id="{2A5275F7-419E-4C23-8A3D-2EE5742B2EC9}" type="datetime1">
               <a:rPr lang="en-US" smtClean="0"/>
-              <a:t>12/12/2013</a:t>
+              <a:t>12/17/2013</a:t>
             </a:fld>
             <a:endParaRPr lang="en-US"/>
           </a:p>
@@ -5052,6 +6241,29 @@
           </a:fontRef>
         </p:style>
       </p:cxnSp>
+      <p:sp>
+        <p:nvSpPr>
+          <p:cNvPr id="9" name="Footer Placeholder 8"/>
+          <p:cNvSpPr>
+            <a:spLocks noGrp="1"/>
+          </p:cNvSpPr>
+          <p:nvPr>
+            <p:ph type="ftr" sz="quarter" idx="11"/>
+          </p:nvPr>
+        </p:nvSpPr>
+        <p:spPr/>
+        <p:txBody>
+          <a:bodyPr/>
+          <a:lstStyle/>
+          <a:p>
+            <a:r>
+              <a:rPr lang="en-US" smtClean="0"/>
+              <a:t>Source: Williams, Chapter 8</a:t>
+            </a:r>
+            <a:endParaRPr lang="en-US"/>
+          </a:p>
+        </p:txBody>
+      </p:sp>
     </p:spTree>
     <p:extLst>
       <p:ext uri="{BB962C8B-B14F-4D97-AF65-F5344CB8AC3E}">
@@ -5134,6 +6346,35 @@
           </a:p>
           <a:p>
             <a:pPr marL="800100" lvl="1" indent="-342900"/>
+            <a:r>
+              <a:rPr lang="en-US" dirty="0" smtClean="0"/>
+              <a:t>Quicksort recursively sorts subsections of the input</a:t>
+            </a:r>
+          </a:p>
+          <a:p>
+            <a:pPr marL="800100" lvl="1" indent="-342900"/>
+            <a:r>
+              <a:rPr lang="en-US" dirty="0" smtClean="0"/>
+              <a:t>Each recursive call operates on an independent partition of the data</a:t>
+            </a:r>
+          </a:p>
+          <a:p>
+            <a:pPr marL="800100" lvl="1" indent="-342900"/>
+            <a:r>
+              <a:rPr lang="en-US" dirty="0" smtClean="0"/>
+              <a:t>Each call can execute on a separate thread</a:t>
+            </a:r>
+          </a:p>
+          <a:p>
+            <a:pPr marL="800100" lvl="1" indent="-342900"/>
+            <a:endParaRPr lang="en-US" dirty="0" smtClean="0"/>
+          </a:p>
+          <a:p>
+            <a:pPr marL="800100" lvl="1" indent="-342900"/>
+            <a:endParaRPr lang="en-US" dirty="0" smtClean="0"/>
+          </a:p>
+          <a:p>
+            <a:pPr marL="800100" lvl="1" indent="-342900"/>
             <a:endParaRPr lang="en-US" dirty="0"/>
           </a:p>
         </p:txBody>
@@ -5161,6 +6402,796 @@
           </a:p>
         </p:txBody>
       </p:sp>
+      <p:sp>
+        <p:nvSpPr>
+          <p:cNvPr id="5" name="Footer Placeholder 4"/>
+          <p:cNvSpPr>
+            <a:spLocks noGrp="1"/>
+          </p:cNvSpPr>
+          <p:nvPr>
+            <p:ph type="ftr" sz="quarter" idx="11"/>
+          </p:nvPr>
+        </p:nvSpPr>
+        <p:spPr/>
+        <p:txBody>
+          <a:bodyPr/>
+          <a:lstStyle/>
+          <a:p>
+            <a:r>
+              <a:rPr lang="en-US" smtClean="0"/>
+              <a:t>Source: Williams, Chapter 8</a:t>
+            </a:r>
+            <a:endParaRPr lang="en-US"/>
+          </a:p>
+        </p:txBody>
+      </p:sp>
+      <p:graphicFrame>
+        <p:nvGraphicFramePr>
+          <p:cNvPr id="6" name="Table 5"/>
+          <p:cNvGraphicFramePr>
+            <a:graphicFrameLocks noGrp="1"/>
+          </p:cNvGraphicFramePr>
+          <p:nvPr>
+            <p:extLst>
+              <p:ext uri="{D42A27DB-BD31-4B8C-83A1-F6EECF244321}">
+                <p14:modId xmlns:p14="http://schemas.microsoft.com/office/powerpoint/2010/main" val="3714467666"/>
+              </p:ext>
+            </p:extLst>
+          </p:nvPr>
+        </p:nvGraphicFramePr>
+        <p:xfrm>
+          <a:off x="1219200" y="3820160"/>
+          <a:ext cx="6096000" cy="370840"/>
+        </p:xfrm>
+        <a:graphic>
+          <a:graphicData uri="http://schemas.openxmlformats.org/drawingml/2006/table">
+            <a:tbl>
+              <a:tblPr firstRow="1" bandRow="1">
+                <a:tableStyleId>{5C22544A-7EE6-4342-B048-85BDC9FD1C3A}</a:tableStyleId>
+              </a:tblPr>
+              <a:tblGrid>
+                <a:gridCol w="762000"/>
+                <a:gridCol w="762000"/>
+                <a:gridCol w="762000"/>
+                <a:gridCol w="762000"/>
+                <a:gridCol w="762000"/>
+                <a:gridCol w="762000"/>
+                <a:gridCol w="762000"/>
+                <a:gridCol w="762000"/>
+              </a:tblGrid>
+              <a:tr h="370840">
+                <a:tc>
+                  <a:txBody>
+                    <a:bodyPr/>
+                    <a:lstStyle/>
+                    <a:p>
+                      <a:pPr algn="ctr"/>
+                      <a:r>
+                        <a:rPr lang="en-US" dirty="0" smtClean="0"/>
+                        <a:t>42</a:t>
+                      </a:r>
+                      <a:endParaRPr lang="en-US" dirty="0"/>
+                    </a:p>
+                  </a:txBody>
+                  <a:tcPr/>
+                </a:tc>
+                <a:tc>
+                  <a:txBody>
+                    <a:bodyPr/>
+                    <a:lstStyle/>
+                    <a:p>
+                      <a:pPr algn="ctr"/>
+                      <a:r>
+                        <a:rPr lang="en-US" dirty="0" smtClean="0"/>
+                        <a:t>4</a:t>
+                      </a:r>
+                      <a:endParaRPr lang="en-US" dirty="0"/>
+                    </a:p>
+                  </a:txBody>
+                  <a:tcPr/>
+                </a:tc>
+                <a:tc>
+                  <a:txBody>
+                    <a:bodyPr/>
+                    <a:lstStyle/>
+                    <a:p>
+                      <a:pPr algn="ctr"/>
+                      <a:r>
+                        <a:rPr lang="en-US" dirty="0" smtClean="0"/>
+                        <a:t>5</a:t>
+                      </a:r>
+                      <a:endParaRPr lang="en-US" dirty="0"/>
+                    </a:p>
+                  </a:txBody>
+                  <a:tcPr/>
+                </a:tc>
+                <a:tc>
+                  <a:txBody>
+                    <a:bodyPr/>
+                    <a:lstStyle/>
+                    <a:p>
+                      <a:pPr algn="ctr"/>
+                      <a:r>
+                        <a:rPr lang="en-US" dirty="0" smtClean="0"/>
+                        <a:t>18</a:t>
+                      </a:r>
+                      <a:endParaRPr lang="en-US" dirty="0"/>
+                    </a:p>
+                  </a:txBody>
+                  <a:tcPr/>
+                </a:tc>
+                <a:tc>
+                  <a:txBody>
+                    <a:bodyPr/>
+                    <a:lstStyle/>
+                    <a:p>
+                      <a:pPr algn="ctr"/>
+                      <a:r>
+                        <a:rPr lang="en-US" dirty="0" smtClean="0"/>
+                        <a:t>931</a:t>
+                      </a:r>
+                      <a:endParaRPr lang="en-US" dirty="0"/>
+                    </a:p>
+                  </a:txBody>
+                  <a:tcPr/>
+                </a:tc>
+                <a:tc>
+                  <a:txBody>
+                    <a:bodyPr/>
+                    <a:lstStyle/>
+                    <a:p>
+                      <a:pPr algn="ctr"/>
+                      <a:r>
+                        <a:rPr lang="en-US" dirty="0" smtClean="0"/>
+                        <a:t>6</a:t>
+                      </a:r>
+                      <a:endParaRPr lang="en-US" dirty="0"/>
+                    </a:p>
+                  </a:txBody>
+                  <a:tcPr/>
+                </a:tc>
+                <a:tc>
+                  <a:txBody>
+                    <a:bodyPr/>
+                    <a:lstStyle/>
+                    <a:p>
+                      <a:pPr algn="ctr"/>
+                      <a:r>
+                        <a:rPr lang="en-US" dirty="0" smtClean="0"/>
+                        <a:t>2</a:t>
+                      </a:r>
+                      <a:endParaRPr lang="en-US" dirty="0"/>
+                    </a:p>
+                  </a:txBody>
+                  <a:tcPr/>
+                </a:tc>
+                <a:tc>
+                  <a:txBody>
+                    <a:bodyPr/>
+                    <a:lstStyle/>
+                    <a:p>
+                      <a:pPr algn="ctr"/>
+                      <a:r>
+                        <a:rPr lang="en-US" dirty="0" smtClean="0"/>
+                        <a:t>-67</a:t>
+                      </a:r>
+                      <a:endParaRPr lang="en-US" dirty="0"/>
+                    </a:p>
+                  </a:txBody>
+                  <a:tcPr/>
+                </a:tc>
+              </a:tr>
+            </a:tbl>
+          </a:graphicData>
+        </a:graphic>
+      </p:graphicFrame>
+      <p:graphicFrame>
+        <p:nvGraphicFramePr>
+          <p:cNvPr id="7" name="Table 6"/>
+          <p:cNvGraphicFramePr>
+            <a:graphicFrameLocks noGrp="1"/>
+          </p:cNvGraphicFramePr>
+          <p:nvPr>
+            <p:extLst>
+              <p:ext uri="{D42A27DB-BD31-4B8C-83A1-F6EECF244321}">
+                <p14:modId xmlns:p14="http://schemas.microsoft.com/office/powerpoint/2010/main" val="2568608747"/>
+              </p:ext>
+            </p:extLst>
+          </p:nvPr>
+        </p:nvGraphicFramePr>
+        <p:xfrm>
+          <a:off x="381000" y="4648200"/>
+          <a:ext cx="3962400" cy="370840"/>
+        </p:xfrm>
+        <a:graphic>
+          <a:graphicData uri="http://schemas.openxmlformats.org/drawingml/2006/table">
+            <a:tbl>
+              <a:tblPr firstRow="1" bandRow="1">
+                <a:tableStyleId>{5C22544A-7EE6-4342-B048-85BDC9FD1C3A}</a:tableStyleId>
+              </a:tblPr>
+              <a:tblGrid>
+                <a:gridCol w="792480"/>
+                <a:gridCol w="792480"/>
+                <a:gridCol w="792480"/>
+                <a:gridCol w="792480"/>
+                <a:gridCol w="792480"/>
+              </a:tblGrid>
+              <a:tr h="370840">
+                <a:tc>
+                  <a:txBody>
+                    <a:bodyPr/>
+                    <a:lstStyle/>
+                    <a:p>
+                      <a:endParaRPr lang="en-US" dirty="0"/>
+                    </a:p>
+                  </a:txBody>
+                  <a:tcPr/>
+                </a:tc>
+                <a:tc>
+                  <a:txBody>
+                    <a:bodyPr/>
+                    <a:lstStyle/>
+                    <a:p>
+                      <a:endParaRPr lang="en-US"/>
+                    </a:p>
+                  </a:txBody>
+                  <a:tcPr/>
+                </a:tc>
+                <a:tc>
+                  <a:txBody>
+                    <a:bodyPr/>
+                    <a:lstStyle/>
+                    <a:p>
+                      <a:endParaRPr lang="en-US"/>
+                    </a:p>
+                  </a:txBody>
+                  <a:tcPr/>
+                </a:tc>
+                <a:tc>
+                  <a:txBody>
+                    <a:bodyPr/>
+                    <a:lstStyle/>
+                    <a:p>
+                      <a:endParaRPr lang="en-US"/>
+                    </a:p>
+                  </a:txBody>
+                  <a:tcPr/>
+                </a:tc>
+                <a:tc>
+                  <a:txBody>
+                    <a:bodyPr/>
+                    <a:lstStyle/>
+                    <a:p>
+                      <a:endParaRPr lang="en-US" dirty="0"/>
+                    </a:p>
+                  </a:txBody>
+                  <a:tcPr/>
+                </a:tc>
+              </a:tr>
+            </a:tbl>
+          </a:graphicData>
+        </a:graphic>
+      </p:graphicFrame>
+      <p:graphicFrame>
+        <p:nvGraphicFramePr>
+          <p:cNvPr id="8" name="Table 7"/>
+          <p:cNvGraphicFramePr>
+            <a:graphicFrameLocks noGrp="1"/>
+          </p:cNvGraphicFramePr>
+          <p:nvPr>
+            <p:extLst>
+              <p:ext uri="{D42A27DB-BD31-4B8C-83A1-F6EECF244321}">
+                <p14:modId xmlns:p14="http://schemas.microsoft.com/office/powerpoint/2010/main" val="3471386889"/>
+              </p:ext>
+            </p:extLst>
+          </p:nvPr>
+        </p:nvGraphicFramePr>
+        <p:xfrm>
+          <a:off x="5410200" y="4648200"/>
+          <a:ext cx="2667000" cy="370840"/>
+        </p:xfrm>
+        <a:graphic>
+          <a:graphicData uri="http://schemas.openxmlformats.org/drawingml/2006/table">
+            <a:tbl>
+              <a:tblPr firstRow="1" bandRow="1">
+                <a:tableStyleId>{5C22544A-7EE6-4342-B048-85BDC9FD1C3A}</a:tableStyleId>
+              </a:tblPr>
+              <a:tblGrid>
+                <a:gridCol w="889000"/>
+                <a:gridCol w="889000"/>
+                <a:gridCol w="889000"/>
+              </a:tblGrid>
+              <a:tr h="370840">
+                <a:tc>
+                  <a:txBody>
+                    <a:bodyPr/>
+                    <a:lstStyle/>
+                    <a:p>
+                      <a:endParaRPr lang="en-US" dirty="0"/>
+                    </a:p>
+                  </a:txBody>
+                  <a:tcPr/>
+                </a:tc>
+                <a:tc>
+                  <a:txBody>
+                    <a:bodyPr/>
+                    <a:lstStyle/>
+                    <a:p>
+                      <a:endParaRPr lang="en-US"/>
+                    </a:p>
+                  </a:txBody>
+                  <a:tcPr/>
+                </a:tc>
+                <a:tc>
+                  <a:txBody>
+                    <a:bodyPr/>
+                    <a:lstStyle/>
+                    <a:p>
+                      <a:endParaRPr lang="en-US" dirty="0"/>
+                    </a:p>
+                  </a:txBody>
+                  <a:tcPr/>
+                </a:tc>
+              </a:tr>
+            </a:tbl>
+          </a:graphicData>
+        </a:graphic>
+      </p:graphicFrame>
+      <p:graphicFrame>
+        <p:nvGraphicFramePr>
+          <p:cNvPr id="9" name="Table 8"/>
+          <p:cNvGraphicFramePr>
+            <a:graphicFrameLocks noGrp="1"/>
+          </p:cNvGraphicFramePr>
+          <p:nvPr>
+            <p:extLst>
+              <p:ext uri="{D42A27DB-BD31-4B8C-83A1-F6EECF244321}">
+                <p14:modId xmlns:p14="http://schemas.microsoft.com/office/powerpoint/2010/main" val="3811670799"/>
+              </p:ext>
+            </p:extLst>
+          </p:nvPr>
+        </p:nvGraphicFramePr>
+        <p:xfrm>
+          <a:off x="609600" y="5572760"/>
+          <a:ext cx="1524000" cy="370840"/>
+        </p:xfrm>
+        <a:graphic>
+          <a:graphicData uri="http://schemas.openxmlformats.org/drawingml/2006/table">
+            <a:tbl>
+              <a:tblPr firstRow="1" bandRow="1">
+                <a:tableStyleId>{5C22544A-7EE6-4342-B048-85BDC9FD1C3A}</a:tableStyleId>
+              </a:tblPr>
+              <a:tblGrid>
+                <a:gridCol w="508000"/>
+                <a:gridCol w="508000"/>
+                <a:gridCol w="508000"/>
+              </a:tblGrid>
+              <a:tr h="370840">
+                <a:tc>
+                  <a:txBody>
+                    <a:bodyPr/>
+                    <a:lstStyle/>
+                    <a:p>
+                      <a:endParaRPr lang="en-US" dirty="0"/>
+                    </a:p>
+                  </a:txBody>
+                  <a:tcPr/>
+                </a:tc>
+                <a:tc>
+                  <a:txBody>
+                    <a:bodyPr/>
+                    <a:lstStyle/>
+                    <a:p>
+                      <a:endParaRPr lang="en-US"/>
+                    </a:p>
+                  </a:txBody>
+                  <a:tcPr/>
+                </a:tc>
+                <a:tc>
+                  <a:txBody>
+                    <a:bodyPr/>
+                    <a:lstStyle/>
+                    <a:p>
+                      <a:endParaRPr lang="en-US" dirty="0"/>
+                    </a:p>
+                  </a:txBody>
+                  <a:tcPr/>
+                </a:tc>
+              </a:tr>
+            </a:tbl>
+          </a:graphicData>
+        </a:graphic>
+      </p:graphicFrame>
+      <p:graphicFrame>
+        <p:nvGraphicFramePr>
+          <p:cNvPr id="10" name="Table 9"/>
+          <p:cNvGraphicFramePr>
+            <a:graphicFrameLocks noGrp="1"/>
+          </p:cNvGraphicFramePr>
+          <p:nvPr>
+            <p:extLst>
+              <p:ext uri="{D42A27DB-BD31-4B8C-83A1-F6EECF244321}">
+                <p14:modId xmlns:p14="http://schemas.microsoft.com/office/powerpoint/2010/main" val="2585038526"/>
+              </p:ext>
+            </p:extLst>
+          </p:nvPr>
+        </p:nvGraphicFramePr>
+        <p:xfrm>
+          <a:off x="2819400" y="5572760"/>
+          <a:ext cx="1676400" cy="370840"/>
+        </p:xfrm>
+        <a:graphic>
+          <a:graphicData uri="http://schemas.openxmlformats.org/drawingml/2006/table">
+            <a:tbl>
+              <a:tblPr firstRow="1" bandRow="1">
+                <a:tableStyleId>{5C22544A-7EE6-4342-B048-85BDC9FD1C3A}</a:tableStyleId>
+              </a:tblPr>
+              <a:tblGrid>
+                <a:gridCol w="838200"/>
+                <a:gridCol w="838200"/>
+              </a:tblGrid>
+              <a:tr h="370840">
+                <a:tc>
+                  <a:txBody>
+                    <a:bodyPr/>
+                    <a:lstStyle/>
+                    <a:p>
+                      <a:endParaRPr lang="en-US" dirty="0"/>
+                    </a:p>
+                  </a:txBody>
+                  <a:tcPr/>
+                </a:tc>
+                <a:tc>
+                  <a:txBody>
+                    <a:bodyPr/>
+                    <a:lstStyle/>
+                    <a:p>
+                      <a:endParaRPr lang="en-US" dirty="0"/>
+                    </a:p>
+                  </a:txBody>
+                  <a:tcPr/>
+                </a:tc>
+              </a:tr>
+            </a:tbl>
+          </a:graphicData>
+        </a:graphic>
+      </p:graphicFrame>
+      <p:graphicFrame>
+        <p:nvGraphicFramePr>
+          <p:cNvPr id="11" name="Table 10"/>
+          <p:cNvGraphicFramePr>
+            <a:graphicFrameLocks noGrp="1"/>
+          </p:cNvGraphicFramePr>
+          <p:nvPr>
+            <p:extLst>
+              <p:ext uri="{D42A27DB-BD31-4B8C-83A1-F6EECF244321}">
+                <p14:modId xmlns:p14="http://schemas.microsoft.com/office/powerpoint/2010/main" val="3726780115"/>
+              </p:ext>
+            </p:extLst>
+          </p:nvPr>
+        </p:nvGraphicFramePr>
+        <p:xfrm>
+          <a:off x="5334000" y="5572760"/>
+          <a:ext cx="609600" cy="370840"/>
+        </p:xfrm>
+        <a:graphic>
+          <a:graphicData uri="http://schemas.openxmlformats.org/drawingml/2006/table">
+            <a:tbl>
+              <a:tblPr firstRow="1" bandRow="1">
+                <a:tableStyleId>{5C22544A-7EE6-4342-B048-85BDC9FD1C3A}</a:tableStyleId>
+              </a:tblPr>
+              <a:tblGrid>
+                <a:gridCol w="609600"/>
+              </a:tblGrid>
+              <a:tr h="370840">
+                <a:tc>
+                  <a:txBody>
+                    <a:bodyPr/>
+                    <a:lstStyle/>
+                    <a:p>
+                      <a:endParaRPr lang="en-US" dirty="0"/>
+                    </a:p>
+                  </a:txBody>
+                  <a:tcPr/>
+                </a:tc>
+              </a:tr>
+            </a:tbl>
+          </a:graphicData>
+        </a:graphic>
+      </p:graphicFrame>
+      <p:graphicFrame>
+        <p:nvGraphicFramePr>
+          <p:cNvPr id="12" name="Table 11"/>
+          <p:cNvGraphicFramePr>
+            <a:graphicFrameLocks noGrp="1"/>
+          </p:cNvGraphicFramePr>
+          <p:nvPr>
+            <p:extLst>
+              <p:ext uri="{D42A27DB-BD31-4B8C-83A1-F6EECF244321}">
+                <p14:modId xmlns:p14="http://schemas.microsoft.com/office/powerpoint/2010/main" val="1472503312"/>
+              </p:ext>
+            </p:extLst>
+          </p:nvPr>
+        </p:nvGraphicFramePr>
+        <p:xfrm>
+          <a:off x="6781800" y="5572760"/>
+          <a:ext cx="1447800" cy="370840"/>
+        </p:xfrm>
+        <a:graphic>
+          <a:graphicData uri="http://schemas.openxmlformats.org/drawingml/2006/table">
+            <a:tbl>
+              <a:tblPr firstRow="1" bandRow="1">
+                <a:tableStyleId>{5C22544A-7EE6-4342-B048-85BDC9FD1C3A}</a:tableStyleId>
+              </a:tblPr>
+              <a:tblGrid>
+                <a:gridCol w="723900"/>
+                <a:gridCol w="723900"/>
+              </a:tblGrid>
+              <a:tr h="370840">
+                <a:tc>
+                  <a:txBody>
+                    <a:bodyPr/>
+                    <a:lstStyle/>
+                    <a:p>
+                      <a:endParaRPr lang="en-US" dirty="0"/>
+                    </a:p>
+                  </a:txBody>
+                  <a:tcPr/>
+                </a:tc>
+                <a:tc>
+                  <a:txBody>
+                    <a:bodyPr/>
+                    <a:lstStyle/>
+                    <a:p>
+                      <a:endParaRPr lang="en-US" dirty="0"/>
+                    </a:p>
+                  </a:txBody>
+                  <a:tcPr/>
+                </a:tc>
+              </a:tr>
+            </a:tbl>
+          </a:graphicData>
+        </a:graphic>
+      </p:graphicFrame>
+      <p:cxnSp>
+        <p:nvCxnSpPr>
+          <p:cNvPr id="14" name="Straight Arrow Connector 13"/>
+          <p:cNvCxnSpPr/>
+          <p:nvPr/>
+        </p:nvCxnSpPr>
+        <p:spPr>
+          <a:xfrm>
+            <a:off x="2743200" y="4191000"/>
+            <a:ext cx="0" cy="0"/>
+          </a:xfrm>
+          <a:prstGeom prst="straightConnector1">
+            <a:avLst/>
+          </a:prstGeom>
+          <a:ln>
+            <a:tailEnd type="arrow"/>
+          </a:ln>
+        </p:spPr>
+        <p:style>
+          <a:lnRef idx="1">
+            <a:schemeClr val="accent1"/>
+          </a:lnRef>
+          <a:fillRef idx="0">
+            <a:schemeClr val="accent1"/>
+          </a:fillRef>
+          <a:effectRef idx="0">
+            <a:schemeClr val="accent1"/>
+          </a:effectRef>
+          <a:fontRef idx="minor">
+            <a:schemeClr val="tx1"/>
+          </a:fontRef>
+        </p:style>
+      </p:cxnSp>
+      <p:cxnSp>
+        <p:nvCxnSpPr>
+          <p:cNvPr id="16" name="Straight Arrow Connector 15"/>
+          <p:cNvCxnSpPr/>
+          <p:nvPr/>
+        </p:nvCxnSpPr>
+        <p:spPr>
+          <a:xfrm flipH="1">
+            <a:off x="2133600" y="4191000"/>
+            <a:ext cx="1371600" cy="381000"/>
+          </a:xfrm>
+          <a:prstGeom prst="straightConnector1">
+            <a:avLst/>
+          </a:prstGeom>
+          <a:ln>
+            <a:tailEnd type="arrow"/>
+          </a:ln>
+        </p:spPr>
+        <p:style>
+          <a:lnRef idx="3">
+            <a:schemeClr val="accent5"/>
+          </a:lnRef>
+          <a:fillRef idx="0">
+            <a:schemeClr val="accent5"/>
+          </a:fillRef>
+          <a:effectRef idx="2">
+            <a:schemeClr val="accent5"/>
+          </a:effectRef>
+          <a:fontRef idx="minor">
+            <a:schemeClr val="tx1"/>
+          </a:fontRef>
+        </p:style>
+      </p:cxnSp>
+      <p:cxnSp>
+        <p:nvCxnSpPr>
+          <p:cNvPr id="18" name="Straight Arrow Connector 17"/>
+          <p:cNvCxnSpPr>
+            <a:endCxn id="8" idx="0"/>
+          </p:cNvCxnSpPr>
+          <p:nvPr/>
+        </p:nvCxnSpPr>
+        <p:spPr>
+          <a:xfrm>
+            <a:off x="6019800" y="4191000"/>
+            <a:ext cx="723900" cy="457200"/>
+          </a:xfrm>
+          <a:prstGeom prst="straightConnector1">
+            <a:avLst/>
+          </a:prstGeom>
+          <a:ln>
+            <a:tailEnd type="arrow"/>
+          </a:ln>
+        </p:spPr>
+        <p:style>
+          <a:lnRef idx="3">
+            <a:schemeClr val="accent5"/>
+          </a:lnRef>
+          <a:fillRef idx="0">
+            <a:schemeClr val="accent5"/>
+          </a:fillRef>
+          <a:effectRef idx="2">
+            <a:schemeClr val="accent5"/>
+          </a:effectRef>
+          <a:fontRef idx="minor">
+            <a:schemeClr val="tx1"/>
+          </a:fontRef>
+        </p:style>
+      </p:cxnSp>
+      <p:cxnSp>
+        <p:nvCxnSpPr>
+          <p:cNvPr id="20" name="Straight Arrow Connector 19"/>
+          <p:cNvCxnSpPr>
+            <a:endCxn id="9" idx="0"/>
+          </p:cNvCxnSpPr>
+          <p:nvPr/>
+        </p:nvCxnSpPr>
+        <p:spPr>
+          <a:xfrm flipH="1">
+            <a:off x="1371600" y="5029200"/>
+            <a:ext cx="228600" cy="543560"/>
+          </a:xfrm>
+          <a:prstGeom prst="straightConnector1">
+            <a:avLst/>
+          </a:prstGeom>
+          <a:ln>
+            <a:tailEnd type="arrow"/>
+          </a:ln>
+        </p:spPr>
+        <p:style>
+          <a:lnRef idx="3">
+            <a:schemeClr val="accent5"/>
+          </a:lnRef>
+          <a:fillRef idx="0">
+            <a:schemeClr val="accent5"/>
+          </a:fillRef>
+          <a:effectRef idx="2">
+            <a:schemeClr val="accent5"/>
+          </a:effectRef>
+          <a:fontRef idx="minor">
+            <a:schemeClr val="tx1"/>
+          </a:fontRef>
+        </p:style>
+      </p:cxnSp>
+      <p:cxnSp>
+        <p:nvCxnSpPr>
+          <p:cNvPr id="22" name="Straight Arrow Connector 21"/>
+          <p:cNvCxnSpPr>
+            <a:endCxn id="10" idx="0"/>
+          </p:cNvCxnSpPr>
+          <p:nvPr/>
+        </p:nvCxnSpPr>
+        <p:spPr>
+          <a:xfrm>
+            <a:off x="3505200" y="5029200"/>
+            <a:ext cx="152400" cy="543560"/>
+          </a:xfrm>
+          <a:prstGeom prst="straightConnector1">
+            <a:avLst/>
+          </a:prstGeom>
+          <a:ln>
+            <a:tailEnd type="arrow"/>
+          </a:ln>
+        </p:spPr>
+        <p:style>
+          <a:lnRef idx="3">
+            <a:schemeClr val="accent5"/>
+          </a:lnRef>
+          <a:fillRef idx="0">
+            <a:schemeClr val="accent5"/>
+          </a:fillRef>
+          <a:effectRef idx="2">
+            <a:schemeClr val="accent5"/>
+          </a:effectRef>
+          <a:fontRef idx="minor">
+            <a:schemeClr val="tx1"/>
+          </a:fontRef>
+        </p:style>
+      </p:cxnSp>
+      <p:cxnSp>
+        <p:nvCxnSpPr>
+          <p:cNvPr id="24" name="Straight Arrow Connector 23"/>
+          <p:cNvCxnSpPr/>
+          <p:nvPr/>
+        </p:nvCxnSpPr>
+        <p:spPr>
+          <a:xfrm flipH="1">
+            <a:off x="5715000" y="5029200"/>
+            <a:ext cx="76200" cy="457200"/>
+          </a:xfrm>
+          <a:prstGeom prst="straightConnector1">
+            <a:avLst/>
+          </a:prstGeom>
+          <a:ln>
+            <a:tailEnd type="arrow"/>
+          </a:ln>
+        </p:spPr>
+        <p:style>
+          <a:lnRef idx="3">
+            <a:schemeClr val="accent5"/>
+          </a:lnRef>
+          <a:fillRef idx="0">
+            <a:schemeClr val="accent5"/>
+          </a:fillRef>
+          <a:effectRef idx="2">
+            <a:schemeClr val="accent5"/>
+          </a:effectRef>
+          <a:fontRef idx="minor">
+            <a:schemeClr val="tx1"/>
+          </a:fontRef>
+        </p:style>
+      </p:cxnSp>
+      <p:cxnSp>
+        <p:nvCxnSpPr>
+          <p:cNvPr id="26" name="Straight Arrow Connector 25"/>
+          <p:cNvCxnSpPr>
+            <a:endCxn id="12" idx="0"/>
+          </p:cNvCxnSpPr>
+          <p:nvPr/>
+        </p:nvCxnSpPr>
+        <p:spPr>
+          <a:xfrm>
+            <a:off x="7162800" y="5029200"/>
+            <a:ext cx="342900" cy="543560"/>
+          </a:xfrm>
+          <a:prstGeom prst="straightConnector1">
+            <a:avLst/>
+          </a:prstGeom>
+          <a:ln>
+            <a:tailEnd type="arrow"/>
+          </a:ln>
+        </p:spPr>
+        <p:style>
+          <a:lnRef idx="3">
+            <a:schemeClr val="accent5"/>
+          </a:lnRef>
+          <a:fillRef idx="0">
+            <a:schemeClr val="accent5"/>
+          </a:fillRef>
+          <a:effectRef idx="2">
+            <a:schemeClr val="accent5"/>
+          </a:effectRef>
+          <a:fontRef idx="minor">
+            <a:schemeClr val="tx1"/>
+          </a:fontRef>
+        </p:style>
+      </p:cxnSp>
     </p:spTree>
     <p:extLst>
       <p:ext uri="{BB962C8B-B14F-4D97-AF65-F5344CB8AC3E}">
@@ -5213,7 +7244,11 @@
           <a:bodyPr/>
           <a:lstStyle/>
           <a:p>
-            <a:endParaRPr lang="en-US"/>
+            <a:r>
+              <a:rPr lang="en-US" dirty="0" smtClean="0"/>
+              <a:t>Dividing work by task type</a:t>
+            </a:r>
+            <a:endParaRPr lang="en-US" dirty="0"/>
           </a:p>
         </p:txBody>
       </p:sp>
@@ -5232,7 +7267,42 @@
           <a:bodyPr/>
           <a:lstStyle/>
           <a:p>
-            <a:endParaRPr lang="en-US"/>
+            <a:r>
+              <a:rPr lang="en-US" dirty="0" smtClean="0"/>
+              <a:t>Many algorithms have a independent sequence of step</a:t>
+            </a:r>
+            <a:r>
+              <a:rPr lang="en-US" dirty="0" smtClean="0"/>
+              <a:t>s</a:t>
+            </a:r>
+          </a:p>
+          <a:p>
+            <a:pPr marL="800100" lvl="1" indent="-342900"/>
+            <a:r>
+              <a:rPr lang="en-US" dirty="0" smtClean="0"/>
+              <a:t>Each part of the data may be an input to each step</a:t>
+            </a:r>
+          </a:p>
+          <a:p>
+            <a:pPr marL="800100" lvl="1" indent="-342900"/>
+            <a:r>
+              <a:rPr lang="en-US" dirty="0" smtClean="0"/>
+              <a:t>The steps operate on a sequence of data</a:t>
+            </a:r>
+          </a:p>
+          <a:p>
+            <a:pPr marL="800100" lvl="1" indent="-342900"/>
+            <a:r>
+              <a:rPr lang="en-US" dirty="0" smtClean="0"/>
+              <a:t>Each step can be executed on a separate thread.</a:t>
+            </a:r>
+          </a:p>
+          <a:p>
+            <a:pPr marL="800100" lvl="1" indent="-342900"/>
+            <a:r>
+              <a:rPr lang="en-US" dirty="0" smtClean="0"/>
+              <a:t>This is often called pipelining.</a:t>
+            </a:r>
           </a:p>
         </p:txBody>
       </p:sp>
@@ -5259,10 +7329,1861 @@
           </a:p>
         </p:txBody>
       </p:sp>
+      <p:graphicFrame>
+        <p:nvGraphicFramePr>
+          <p:cNvPr id="6" name="Table 5"/>
+          <p:cNvGraphicFramePr>
+            <a:graphicFrameLocks noGrp="1"/>
+          </p:cNvGraphicFramePr>
+          <p:nvPr>
+            <p:extLst>
+              <p:ext uri="{D42A27DB-BD31-4B8C-83A1-F6EECF244321}">
+                <p14:modId xmlns:p14="http://schemas.microsoft.com/office/powerpoint/2010/main" val="1731255801"/>
+              </p:ext>
+            </p:extLst>
+          </p:nvPr>
+        </p:nvGraphicFramePr>
+        <p:xfrm>
+          <a:off x="1143000" y="3896360"/>
+          <a:ext cx="6096000" cy="370840"/>
+        </p:xfrm>
+        <a:graphic>
+          <a:graphicData uri="http://schemas.openxmlformats.org/drawingml/2006/table">
+            <a:tbl>
+              <a:tblPr firstRow="1" bandRow="1">
+                <a:tableStyleId>{5C22544A-7EE6-4342-B048-85BDC9FD1C3A}</a:tableStyleId>
+              </a:tblPr>
+              <a:tblGrid>
+                <a:gridCol w="762000"/>
+                <a:gridCol w="762000"/>
+                <a:gridCol w="762000"/>
+                <a:gridCol w="762000"/>
+                <a:gridCol w="762000"/>
+                <a:gridCol w="762000"/>
+                <a:gridCol w="762000"/>
+                <a:gridCol w="762000"/>
+              </a:tblGrid>
+              <a:tr h="370840">
+                <a:tc>
+                  <a:txBody>
+                    <a:bodyPr/>
+                    <a:lstStyle/>
+                    <a:p>
+                      <a:pPr algn="ctr"/>
+                      <a:r>
+                        <a:rPr lang="en-US" dirty="0" smtClean="0"/>
+                        <a:t>42</a:t>
+                      </a:r>
+                      <a:endParaRPr lang="en-US" dirty="0"/>
+                    </a:p>
+                  </a:txBody>
+                  <a:tcPr/>
+                </a:tc>
+                <a:tc>
+                  <a:txBody>
+                    <a:bodyPr/>
+                    <a:lstStyle/>
+                    <a:p>
+                      <a:pPr algn="ctr"/>
+                      <a:r>
+                        <a:rPr lang="en-US" dirty="0" smtClean="0"/>
+                        <a:t>4</a:t>
+                      </a:r>
+                      <a:endParaRPr lang="en-US" dirty="0"/>
+                    </a:p>
+                  </a:txBody>
+                  <a:tcPr/>
+                </a:tc>
+                <a:tc>
+                  <a:txBody>
+                    <a:bodyPr/>
+                    <a:lstStyle/>
+                    <a:p>
+                      <a:pPr algn="ctr"/>
+                      <a:r>
+                        <a:rPr lang="en-US" dirty="0" smtClean="0"/>
+                        <a:t>5</a:t>
+                      </a:r>
+                      <a:endParaRPr lang="en-US" dirty="0"/>
+                    </a:p>
+                  </a:txBody>
+                  <a:tcPr/>
+                </a:tc>
+                <a:tc>
+                  <a:txBody>
+                    <a:bodyPr/>
+                    <a:lstStyle/>
+                    <a:p>
+                      <a:pPr algn="ctr"/>
+                      <a:r>
+                        <a:rPr lang="en-US" dirty="0" smtClean="0"/>
+                        <a:t>18</a:t>
+                      </a:r>
+                      <a:endParaRPr lang="en-US" dirty="0"/>
+                    </a:p>
+                  </a:txBody>
+                  <a:tcPr/>
+                </a:tc>
+                <a:tc>
+                  <a:txBody>
+                    <a:bodyPr/>
+                    <a:lstStyle/>
+                    <a:p>
+                      <a:pPr algn="ctr"/>
+                      <a:r>
+                        <a:rPr lang="en-US" dirty="0" smtClean="0"/>
+                        <a:t>931</a:t>
+                      </a:r>
+                      <a:endParaRPr lang="en-US" dirty="0"/>
+                    </a:p>
+                  </a:txBody>
+                  <a:tcPr/>
+                </a:tc>
+                <a:tc>
+                  <a:txBody>
+                    <a:bodyPr/>
+                    <a:lstStyle/>
+                    <a:p>
+                      <a:pPr algn="ctr"/>
+                      <a:r>
+                        <a:rPr lang="en-US" dirty="0" smtClean="0"/>
+                        <a:t>6</a:t>
+                      </a:r>
+                      <a:endParaRPr lang="en-US" dirty="0"/>
+                    </a:p>
+                  </a:txBody>
+                  <a:tcPr/>
+                </a:tc>
+                <a:tc>
+                  <a:txBody>
+                    <a:bodyPr/>
+                    <a:lstStyle/>
+                    <a:p>
+                      <a:pPr algn="ctr"/>
+                      <a:r>
+                        <a:rPr lang="en-US" dirty="0" smtClean="0"/>
+                        <a:t>2</a:t>
+                      </a:r>
+                      <a:endParaRPr lang="en-US" dirty="0"/>
+                    </a:p>
+                  </a:txBody>
+                  <a:tcPr/>
+                </a:tc>
+                <a:tc>
+                  <a:txBody>
+                    <a:bodyPr/>
+                    <a:lstStyle/>
+                    <a:p>
+                      <a:pPr algn="ctr"/>
+                      <a:r>
+                        <a:rPr lang="en-US" dirty="0" smtClean="0"/>
+                        <a:t>-67</a:t>
+                      </a:r>
+                      <a:endParaRPr lang="en-US" dirty="0"/>
+                    </a:p>
+                  </a:txBody>
+                  <a:tcPr/>
+                </a:tc>
+              </a:tr>
+            </a:tbl>
+          </a:graphicData>
+        </a:graphic>
+      </p:graphicFrame>
+      <p:sp>
+        <p:nvSpPr>
+          <p:cNvPr id="7" name="Rectangle 6"/>
+          <p:cNvSpPr/>
+          <p:nvPr/>
+        </p:nvSpPr>
+        <p:spPr>
+          <a:xfrm>
+            <a:off x="1066800" y="4876800"/>
+            <a:ext cx="1828800" cy="1219200"/>
+          </a:xfrm>
+          <a:prstGeom prst="rect">
+            <a:avLst/>
+          </a:prstGeom>
+        </p:spPr>
+        <p:style>
+          <a:lnRef idx="2">
+            <a:schemeClr val="accent1">
+              <a:shade val="50000"/>
+            </a:schemeClr>
+          </a:lnRef>
+          <a:fillRef idx="1">
+            <a:schemeClr val="accent1"/>
+          </a:fillRef>
+          <a:effectRef idx="0">
+            <a:schemeClr val="accent1"/>
+          </a:effectRef>
+          <a:fontRef idx="minor">
+            <a:schemeClr val="lt1"/>
+          </a:fontRef>
+        </p:style>
+        <p:txBody>
+          <a:bodyPr rtlCol="0" anchor="ctr"/>
+          <a:lstStyle/>
+          <a:p>
+            <a:pPr algn="ctr"/>
+            <a:r>
+              <a:rPr lang="en-US" dirty="0" smtClean="0"/>
+              <a:t>Thread 1</a:t>
+            </a:r>
+          </a:p>
+          <a:p>
+            <a:pPr algn="ctr"/>
+            <a:r>
+              <a:rPr lang="en-US" dirty="0" smtClean="0"/>
+              <a:t>Step 1</a:t>
+            </a:r>
+          </a:p>
+          <a:p>
+            <a:pPr algn="ctr"/>
+            <a:r>
+              <a:rPr lang="en-US" dirty="0" smtClean="0"/>
+              <a:t>18</a:t>
+            </a:r>
+            <a:endParaRPr lang="en-US" dirty="0"/>
+          </a:p>
+        </p:txBody>
+      </p:sp>
+      <p:sp>
+        <p:nvSpPr>
+          <p:cNvPr id="8" name="Rectangle 7"/>
+          <p:cNvSpPr/>
+          <p:nvPr/>
+        </p:nvSpPr>
+        <p:spPr>
+          <a:xfrm>
+            <a:off x="3276600" y="4876800"/>
+            <a:ext cx="1828800" cy="1219200"/>
+          </a:xfrm>
+          <a:prstGeom prst="rect">
+            <a:avLst/>
+          </a:prstGeom>
+        </p:spPr>
+        <p:style>
+          <a:lnRef idx="2">
+            <a:schemeClr val="accent1">
+              <a:shade val="50000"/>
+            </a:schemeClr>
+          </a:lnRef>
+          <a:fillRef idx="1">
+            <a:schemeClr val="accent1"/>
+          </a:fillRef>
+          <a:effectRef idx="0">
+            <a:schemeClr val="accent1"/>
+          </a:effectRef>
+          <a:fontRef idx="minor">
+            <a:schemeClr val="lt1"/>
+          </a:fontRef>
+        </p:style>
+        <p:txBody>
+          <a:bodyPr rtlCol="0" anchor="ctr"/>
+          <a:lstStyle/>
+          <a:p>
+            <a:pPr algn="ctr"/>
+            <a:r>
+              <a:rPr lang="en-US" dirty="0" smtClean="0"/>
+              <a:t>Thread 1</a:t>
+            </a:r>
+          </a:p>
+          <a:p>
+            <a:pPr algn="ctr"/>
+            <a:r>
+              <a:rPr lang="en-US" dirty="0" smtClean="0"/>
+              <a:t>Step 1</a:t>
+            </a:r>
+          </a:p>
+          <a:p>
+            <a:pPr algn="ctr"/>
+            <a:r>
+              <a:rPr lang="en-US" dirty="0"/>
+              <a:t>5</a:t>
+            </a:r>
+          </a:p>
+        </p:txBody>
+      </p:sp>
+      <p:sp>
+        <p:nvSpPr>
+          <p:cNvPr id="9" name="Rectangle 8"/>
+          <p:cNvSpPr/>
+          <p:nvPr/>
+        </p:nvSpPr>
+        <p:spPr>
+          <a:xfrm>
+            <a:off x="5486400" y="4876800"/>
+            <a:ext cx="1828800" cy="1219200"/>
+          </a:xfrm>
+          <a:prstGeom prst="rect">
+            <a:avLst/>
+          </a:prstGeom>
+        </p:spPr>
+        <p:style>
+          <a:lnRef idx="2">
+            <a:schemeClr val="accent1">
+              <a:shade val="50000"/>
+            </a:schemeClr>
+          </a:lnRef>
+          <a:fillRef idx="1">
+            <a:schemeClr val="accent1"/>
+          </a:fillRef>
+          <a:effectRef idx="0">
+            <a:schemeClr val="accent1"/>
+          </a:effectRef>
+          <a:fontRef idx="minor">
+            <a:schemeClr val="lt1"/>
+          </a:fontRef>
+        </p:style>
+        <p:txBody>
+          <a:bodyPr rtlCol="0" anchor="ctr"/>
+          <a:lstStyle/>
+          <a:p>
+            <a:pPr algn="ctr"/>
+            <a:r>
+              <a:rPr lang="en-US" dirty="0" smtClean="0"/>
+              <a:t>Thread 1</a:t>
+            </a:r>
+          </a:p>
+          <a:p>
+            <a:pPr algn="ctr"/>
+            <a:r>
+              <a:rPr lang="en-US" dirty="0" smtClean="0"/>
+              <a:t>Step 1</a:t>
+            </a:r>
+          </a:p>
+          <a:p>
+            <a:pPr algn="ctr"/>
+            <a:r>
+              <a:rPr lang="en-US" dirty="0"/>
+              <a:t>4</a:t>
+            </a:r>
+          </a:p>
+        </p:txBody>
+      </p:sp>
+      <p:sp>
+        <p:nvSpPr>
+          <p:cNvPr id="10" name="TextBox 9"/>
+          <p:cNvSpPr txBox="1"/>
+          <p:nvPr/>
+        </p:nvSpPr>
+        <p:spPr>
+          <a:xfrm>
+            <a:off x="7697289" y="5301734"/>
+            <a:ext cx="685800" cy="369332"/>
+          </a:xfrm>
+          <a:prstGeom prst="rect">
+            <a:avLst/>
+          </a:prstGeom>
+          <a:noFill/>
+        </p:spPr>
+        <p:txBody>
+          <a:bodyPr wrap="square" rtlCol="0">
+            <a:spAutoFit/>
+          </a:bodyPr>
+          <a:lstStyle/>
+          <a:p>
+            <a:r>
+              <a:rPr lang="en-US" dirty="0" smtClean="0"/>
+              <a:t>42</a:t>
+            </a:r>
+            <a:endParaRPr lang="en-US" dirty="0"/>
+          </a:p>
+        </p:txBody>
+      </p:sp>
+      <p:cxnSp>
+        <p:nvCxnSpPr>
+          <p:cNvPr id="12" name="Straight Arrow Connector 11"/>
+          <p:cNvCxnSpPr>
+            <a:stCxn id="7" idx="3"/>
+            <a:endCxn id="8" idx="1"/>
+          </p:cNvCxnSpPr>
+          <p:nvPr/>
+        </p:nvCxnSpPr>
+        <p:spPr>
+          <a:xfrm>
+            <a:off x="2895600" y="5486400"/>
+            <a:ext cx="381000" cy="0"/>
+          </a:xfrm>
+          <a:prstGeom prst="straightConnector1">
+            <a:avLst/>
+          </a:prstGeom>
+          <a:ln>
+            <a:tailEnd type="arrow"/>
+          </a:ln>
+        </p:spPr>
+        <p:style>
+          <a:lnRef idx="3">
+            <a:schemeClr val="accent5"/>
+          </a:lnRef>
+          <a:fillRef idx="0">
+            <a:schemeClr val="accent5"/>
+          </a:fillRef>
+          <a:effectRef idx="2">
+            <a:schemeClr val="accent5"/>
+          </a:effectRef>
+          <a:fontRef idx="minor">
+            <a:schemeClr val="tx1"/>
+          </a:fontRef>
+        </p:style>
+      </p:cxnSp>
+      <p:cxnSp>
+        <p:nvCxnSpPr>
+          <p:cNvPr id="14" name="Straight Arrow Connector 13"/>
+          <p:cNvCxnSpPr>
+            <a:stCxn id="8" idx="3"/>
+            <a:endCxn id="9" idx="1"/>
+          </p:cNvCxnSpPr>
+          <p:nvPr/>
+        </p:nvCxnSpPr>
+        <p:spPr>
+          <a:xfrm>
+            <a:off x="5105400" y="5486400"/>
+            <a:ext cx="381000" cy="0"/>
+          </a:xfrm>
+          <a:prstGeom prst="straightConnector1">
+            <a:avLst/>
+          </a:prstGeom>
+          <a:ln>
+            <a:tailEnd type="arrow"/>
+          </a:ln>
+        </p:spPr>
+        <p:style>
+          <a:lnRef idx="3">
+            <a:schemeClr val="accent5"/>
+          </a:lnRef>
+          <a:fillRef idx="0">
+            <a:schemeClr val="accent5"/>
+          </a:fillRef>
+          <a:effectRef idx="2">
+            <a:schemeClr val="accent5"/>
+          </a:effectRef>
+          <a:fontRef idx="minor">
+            <a:schemeClr val="tx1"/>
+          </a:fontRef>
+        </p:style>
+      </p:cxnSp>
+      <p:cxnSp>
+        <p:nvCxnSpPr>
+          <p:cNvPr id="16" name="Straight Arrow Connector 15"/>
+          <p:cNvCxnSpPr>
+            <a:stCxn id="9" idx="3"/>
+            <a:endCxn id="10" idx="1"/>
+          </p:cNvCxnSpPr>
+          <p:nvPr/>
+        </p:nvCxnSpPr>
+        <p:spPr>
+          <a:xfrm>
+            <a:off x="7315200" y="5486400"/>
+            <a:ext cx="382089" cy="0"/>
+          </a:xfrm>
+          <a:prstGeom prst="straightConnector1">
+            <a:avLst/>
+          </a:prstGeom>
+          <a:ln>
+            <a:tailEnd type="arrow"/>
+          </a:ln>
+        </p:spPr>
+        <p:style>
+          <a:lnRef idx="3">
+            <a:schemeClr val="accent5"/>
+          </a:lnRef>
+          <a:fillRef idx="0">
+            <a:schemeClr val="accent5"/>
+          </a:fillRef>
+          <a:effectRef idx="2">
+            <a:schemeClr val="accent5"/>
+          </a:effectRef>
+          <a:fontRef idx="minor">
+            <a:schemeClr val="tx1"/>
+          </a:fontRef>
+        </p:style>
+      </p:cxnSp>
+      <p:sp>
+        <p:nvSpPr>
+          <p:cNvPr id="17" name="TextBox 16"/>
+          <p:cNvSpPr txBox="1"/>
+          <p:nvPr/>
+        </p:nvSpPr>
+        <p:spPr>
+          <a:xfrm>
+            <a:off x="152399" y="5286885"/>
+            <a:ext cx="684711" cy="369332"/>
+          </a:xfrm>
+          <a:prstGeom prst="rect">
+            <a:avLst/>
+          </a:prstGeom>
+          <a:noFill/>
+        </p:spPr>
+        <p:txBody>
+          <a:bodyPr wrap="square" rtlCol="0">
+            <a:spAutoFit/>
+          </a:bodyPr>
+          <a:lstStyle/>
+          <a:p>
+            <a:r>
+              <a:rPr lang="en-US" dirty="0" smtClean="0"/>
+              <a:t>931</a:t>
+            </a:r>
+            <a:endParaRPr lang="en-US" dirty="0"/>
+          </a:p>
+        </p:txBody>
+      </p:sp>
+      <p:cxnSp>
+        <p:nvCxnSpPr>
+          <p:cNvPr id="18" name="Straight Arrow Connector 17"/>
+          <p:cNvCxnSpPr/>
+          <p:nvPr/>
+        </p:nvCxnSpPr>
+        <p:spPr>
+          <a:xfrm>
+            <a:off x="685800" y="5486400"/>
+            <a:ext cx="381000" cy="0"/>
+          </a:xfrm>
+          <a:prstGeom prst="straightConnector1">
+            <a:avLst/>
+          </a:prstGeom>
+          <a:ln>
+            <a:tailEnd type="arrow"/>
+          </a:ln>
+        </p:spPr>
+        <p:style>
+          <a:lnRef idx="3">
+            <a:schemeClr val="accent5"/>
+          </a:lnRef>
+          <a:fillRef idx="0">
+            <a:schemeClr val="accent5"/>
+          </a:fillRef>
+          <a:effectRef idx="2">
+            <a:schemeClr val="accent5"/>
+          </a:effectRef>
+          <a:fontRef idx="minor">
+            <a:schemeClr val="tx1"/>
+          </a:fontRef>
+        </p:style>
+      </p:cxnSp>
+      <p:sp>
+        <p:nvSpPr>
+          <p:cNvPr id="19" name="Footer Placeholder 18"/>
+          <p:cNvSpPr>
+            <a:spLocks noGrp="1"/>
+          </p:cNvSpPr>
+          <p:nvPr>
+            <p:ph type="ftr" sz="quarter" idx="11"/>
+          </p:nvPr>
+        </p:nvSpPr>
+        <p:spPr/>
+        <p:txBody>
+          <a:bodyPr/>
+          <a:lstStyle/>
+          <a:p>
+            <a:r>
+              <a:rPr lang="en-US" smtClean="0"/>
+              <a:t>Source: Williams, Chapter 8</a:t>
+            </a:r>
+            <a:endParaRPr lang="en-US"/>
+          </a:p>
+        </p:txBody>
+      </p:sp>
     </p:spTree>
     <p:extLst>
       <p:ext uri="{BB962C8B-B14F-4D97-AF65-F5344CB8AC3E}">
         <p14:creationId xmlns:p14="http://schemas.microsoft.com/office/powerpoint/2010/main" val="1059133841"/>
+      </p:ext>
+    </p:extLst>
+  </p:cSld>
+  <p:clrMapOvr>
+    <a:masterClrMapping/>
+  </p:clrMapOvr>
+  <p:timing>
+    <p:tnLst>
+      <p:par>
+        <p:cTn id="1" dur="indefinite" restart="never" nodeType="tmRoot"/>
+      </p:par>
+    </p:tnLst>
+  </p:timing>
+</p:sld>
+</file>
+
+<file path=ppt/slides/slide13.xml><?xml version="1.0" encoding="utf-8"?>
+<p:sld xmlns:a="http://schemas.openxmlformats.org/drawingml/2006/main" xmlns:r="http://schemas.openxmlformats.org/officeDocument/2006/relationships" xmlns:p="http://schemas.openxmlformats.org/presentationml/2006/main">
+  <p:cSld>
+    <p:spTree>
+      <p:nvGrpSpPr>
+        <p:cNvPr id="1" name=""/>
+        <p:cNvGrpSpPr/>
+        <p:nvPr/>
+      </p:nvGrpSpPr>
+      <p:grpSpPr>
+        <a:xfrm>
+          <a:off x="0" y="0"/>
+          <a:ext cx="0" cy="0"/>
+          <a:chOff x="0" y="0"/>
+          <a:chExt cx="0" cy="0"/>
+        </a:xfrm>
+      </p:grpSpPr>
+      <p:sp>
+        <p:nvSpPr>
+          <p:cNvPr id="2" name="Title 1"/>
+          <p:cNvSpPr>
+            <a:spLocks noGrp="1"/>
+          </p:cNvSpPr>
+          <p:nvPr>
+            <p:ph type="title"/>
+          </p:nvPr>
+        </p:nvSpPr>
+        <p:spPr/>
+        <p:txBody>
+          <a:bodyPr/>
+          <a:lstStyle/>
+          <a:p>
+            <a:r>
+              <a:rPr lang="en-US" dirty="0" smtClean="0"/>
+              <a:t>What is the best approach?</a:t>
+            </a:r>
+            <a:endParaRPr lang="en-US" dirty="0"/>
+          </a:p>
+        </p:txBody>
+      </p:sp>
+      <p:sp>
+        <p:nvSpPr>
+          <p:cNvPr id="3" name="Content Placeholder 2"/>
+          <p:cNvSpPr>
+            <a:spLocks noGrp="1"/>
+          </p:cNvSpPr>
+          <p:nvPr>
+            <p:ph idx="1"/>
+          </p:nvPr>
+        </p:nvSpPr>
+        <p:spPr/>
+        <p:txBody>
+          <a:bodyPr/>
+          <a:lstStyle/>
+          <a:p>
+            <a:r>
+              <a:rPr lang="en-US" dirty="0" smtClean="0"/>
+              <a:t>It depends on the situation!</a:t>
+            </a:r>
+          </a:p>
+          <a:p>
+            <a:pPr marL="800100" lvl="1" indent="-342900"/>
+            <a:r>
+              <a:rPr lang="en-US" dirty="0" smtClean="0"/>
+              <a:t>Dividing work by task type</a:t>
+            </a:r>
+          </a:p>
+          <a:p>
+            <a:pPr marL="1485900" lvl="2" indent="-342900"/>
+            <a:r>
+              <a:rPr lang="en-US" dirty="0" smtClean="0"/>
+              <a:t>All of the patterns for responsiveness are special cases.</a:t>
+            </a:r>
+          </a:p>
+          <a:p>
+            <a:pPr marL="1485900" lvl="2" indent="-342900"/>
+            <a:r>
+              <a:rPr lang="en-US" dirty="0" smtClean="0"/>
+              <a:t>High frequency trading algorithms often operate on a stream of data.</a:t>
+            </a:r>
+          </a:p>
+          <a:p>
+            <a:pPr marL="1485900" lvl="2" indent="-342900"/>
+            <a:r>
+              <a:rPr lang="en-US" dirty="0" smtClean="0"/>
+              <a:t>Limits scalability, but requires known hardware</a:t>
+            </a:r>
+          </a:p>
+          <a:p>
+            <a:pPr marL="800100" lvl="1" indent="-342900"/>
+            <a:r>
+              <a:rPr lang="en-US" dirty="0" smtClean="0"/>
+              <a:t>Partitioning during execution</a:t>
+            </a:r>
+          </a:p>
+          <a:p>
+            <a:pPr marL="1485900" lvl="2" indent="-342900"/>
+            <a:r>
+              <a:rPr lang="en-US" dirty="0" smtClean="0"/>
+              <a:t>Tied to specific algorithms</a:t>
+            </a:r>
+          </a:p>
+          <a:p>
+            <a:pPr marL="1485900" lvl="2" indent="-342900"/>
+            <a:r>
+              <a:rPr lang="en-US" dirty="0" smtClean="0"/>
+              <a:t>Difficult to determine hardware requirements</a:t>
+            </a:r>
+          </a:p>
+          <a:p>
+            <a:pPr marL="800100" lvl="1" indent="-342900"/>
+            <a:r>
+              <a:rPr lang="en-US" dirty="0" smtClean="0"/>
+              <a:t>Partitioning input data</a:t>
+            </a:r>
+          </a:p>
+          <a:p>
+            <a:pPr marL="1485900" lvl="2" indent="-342900"/>
+            <a:r>
+              <a:rPr lang="en-US" dirty="0" smtClean="0"/>
+              <a:t>Usually input data is known and can be partitioned</a:t>
+            </a:r>
+          </a:p>
+          <a:p>
+            <a:pPr marL="1485900" lvl="2" indent="-342900"/>
+            <a:r>
+              <a:rPr lang="en-US" dirty="0" smtClean="0"/>
+              <a:t>Offer best chance to scale in the future</a:t>
+            </a:r>
+            <a:endParaRPr lang="en-US" dirty="0"/>
+          </a:p>
+        </p:txBody>
+      </p:sp>
+      <p:sp>
+        <p:nvSpPr>
+          <p:cNvPr id="4" name="Slide Number Placeholder 3"/>
+          <p:cNvSpPr>
+            <a:spLocks noGrp="1"/>
+          </p:cNvSpPr>
+          <p:nvPr>
+            <p:ph type="sldNum" sz="quarter" idx="12"/>
+          </p:nvPr>
+        </p:nvSpPr>
+        <p:spPr/>
+        <p:txBody>
+          <a:bodyPr/>
+          <a:lstStyle/>
+          <a:p>
+            <a:fld id="{6DA12B36-9664-4CB0-8B2E-F4A2F44AE97E}" type="slidenum">
+              <a:rPr lang="en-US" smtClean="0"/>
+              <a:t>13</a:t>
+            </a:fld>
+            <a:endParaRPr lang="en-US"/>
+          </a:p>
+        </p:txBody>
+      </p:sp>
+    </p:spTree>
+    <p:extLst>
+      <p:ext uri="{BB962C8B-B14F-4D97-AF65-F5344CB8AC3E}">
+        <p14:creationId xmlns:p14="http://schemas.microsoft.com/office/powerpoint/2010/main" val="3546252676"/>
+      </p:ext>
+    </p:extLst>
+  </p:cSld>
+  <p:clrMapOvr>
+    <a:masterClrMapping/>
+  </p:clrMapOvr>
+  <p:timing>
+    <p:tnLst>
+      <p:par>
+        <p:cTn id="1" dur="indefinite" restart="never" nodeType="tmRoot"/>
+      </p:par>
+    </p:tnLst>
+  </p:timing>
+</p:sld>
+</file>
+
+<file path=ppt/slides/slide14.xml><?xml version="1.0" encoding="utf-8"?>
+<p:sld xmlns:a="http://schemas.openxmlformats.org/drawingml/2006/main" xmlns:r="http://schemas.openxmlformats.org/officeDocument/2006/relationships" xmlns:p="http://schemas.openxmlformats.org/presentationml/2006/main">
+  <p:cSld>
+    <p:spTree>
+      <p:nvGrpSpPr>
+        <p:cNvPr id="1" name=""/>
+        <p:cNvGrpSpPr/>
+        <p:nvPr/>
+      </p:nvGrpSpPr>
+      <p:grpSpPr>
+        <a:xfrm>
+          <a:off x="0" y="0"/>
+          <a:ext cx="0" cy="0"/>
+          <a:chOff x="0" y="0"/>
+          <a:chExt cx="0" cy="0"/>
+        </a:xfrm>
+      </p:grpSpPr>
+      <p:sp>
+        <p:nvSpPr>
+          <p:cNvPr id="2" name="Title 1"/>
+          <p:cNvSpPr>
+            <a:spLocks noGrp="1"/>
+          </p:cNvSpPr>
+          <p:nvPr>
+            <p:ph type="title"/>
+          </p:nvPr>
+        </p:nvSpPr>
+        <p:spPr/>
+        <p:txBody>
+          <a:bodyPr/>
+          <a:lstStyle/>
+          <a:p>
+            <a:r>
+              <a:rPr lang="en-US" dirty="0" smtClean="0"/>
+              <a:t>Performance vs. Scalability</a:t>
+            </a:r>
+            <a:endParaRPr lang="en-US" dirty="0"/>
+          </a:p>
+        </p:txBody>
+      </p:sp>
+      <p:sp>
+        <p:nvSpPr>
+          <p:cNvPr id="3" name="Content Placeholder 2"/>
+          <p:cNvSpPr>
+            <a:spLocks noGrp="1"/>
+          </p:cNvSpPr>
+          <p:nvPr>
+            <p:ph idx="1"/>
+          </p:nvPr>
+        </p:nvSpPr>
+        <p:spPr/>
+        <p:txBody>
+          <a:bodyPr/>
+          <a:lstStyle/>
+          <a:p>
+            <a:r>
+              <a:rPr lang="en-US" dirty="0" smtClean="0"/>
+              <a:t>These are two related, but different concepts.</a:t>
+            </a:r>
+          </a:p>
+          <a:p>
+            <a:pPr marL="800100" lvl="1" indent="-342900"/>
+            <a:r>
+              <a:rPr lang="en-US" i="1" dirty="0" smtClean="0"/>
+              <a:t>Performance</a:t>
+            </a:r>
+            <a:r>
+              <a:rPr lang="en-US" dirty="0" smtClean="0"/>
+              <a:t>: the time an action takes to complete</a:t>
+            </a:r>
+          </a:p>
+          <a:p>
+            <a:pPr marL="800100" lvl="1" indent="-342900"/>
+            <a:r>
+              <a:rPr lang="en-US" i="1" dirty="0" smtClean="0"/>
+              <a:t>Scalability</a:t>
+            </a:r>
+            <a:r>
+              <a:rPr lang="en-US" dirty="0" smtClean="0"/>
+              <a:t>: how the performance changes with more resources or a larger problem</a:t>
+            </a:r>
+          </a:p>
+          <a:p>
+            <a:pPr marL="800100" lvl="1" indent="-342900"/>
+            <a:endParaRPr lang="en-US" dirty="0" smtClean="0"/>
+          </a:p>
+          <a:p>
+            <a:pPr marL="342900" indent="-342900"/>
+            <a:r>
+              <a:rPr lang="en-US" dirty="0" smtClean="0"/>
+              <a:t>We have already seen the he need for increased performance has pushed CPU designs to more processors and cores.</a:t>
+            </a:r>
+          </a:p>
+          <a:p>
+            <a:pPr marL="800100" lvl="1" indent="-342900"/>
+            <a:r>
+              <a:rPr lang="en-US" dirty="0" smtClean="0"/>
+              <a:t>Partitioning input provides the best potential for scalability</a:t>
+            </a:r>
+          </a:p>
+          <a:p>
+            <a:pPr marL="800100" lvl="1" indent="-342900"/>
+            <a:r>
+              <a:rPr lang="en-US" dirty="0" smtClean="0"/>
+              <a:t>Therefore, it provides the best potential for </a:t>
+            </a:r>
+            <a:r>
+              <a:rPr lang="en-US" i="1" dirty="0" smtClean="0"/>
+              <a:t>future</a:t>
+            </a:r>
+            <a:r>
+              <a:rPr lang="en-US" dirty="0" smtClean="0"/>
+              <a:t> performance</a:t>
+            </a:r>
+            <a:endParaRPr lang="en-US" dirty="0"/>
+          </a:p>
+        </p:txBody>
+      </p:sp>
+      <p:sp>
+        <p:nvSpPr>
+          <p:cNvPr id="4" name="Slide Number Placeholder 3"/>
+          <p:cNvSpPr>
+            <a:spLocks noGrp="1"/>
+          </p:cNvSpPr>
+          <p:nvPr>
+            <p:ph type="sldNum" sz="quarter" idx="12"/>
+          </p:nvPr>
+        </p:nvSpPr>
+        <p:spPr/>
+        <p:txBody>
+          <a:bodyPr/>
+          <a:lstStyle/>
+          <a:p>
+            <a:fld id="{6DA12B36-9664-4CB0-8B2E-F4A2F44AE97E}" type="slidenum">
+              <a:rPr lang="en-US" smtClean="0"/>
+              <a:t>14</a:t>
+            </a:fld>
+            <a:endParaRPr lang="en-US"/>
+          </a:p>
+        </p:txBody>
+      </p:sp>
+    </p:spTree>
+    <p:extLst>
+      <p:ext uri="{BB962C8B-B14F-4D97-AF65-F5344CB8AC3E}">
+        <p14:creationId xmlns:p14="http://schemas.microsoft.com/office/powerpoint/2010/main" val="1507204519"/>
+      </p:ext>
+    </p:extLst>
+  </p:cSld>
+  <p:clrMapOvr>
+    <a:masterClrMapping/>
+  </p:clrMapOvr>
+  <p:timing>
+    <p:tnLst>
+      <p:par>
+        <p:cTn id="1" dur="indefinite" restart="never" nodeType="tmRoot">
+          <p:childTnLst>
+            <p:seq concurrent="1" nextAc="seek">
+              <p:cTn id="2" dur="indefinite" nodeType="mainSeq">
+                <p:childTnLst>
+                  <p:par>
+                    <p:cTn id="3" fill="hold">
+                      <p:stCondLst>
+                        <p:cond delay="indefinite"/>
+                      </p:stCondLst>
+                      <p:childTnLst>
+                        <p:par>
+                          <p:cTn id="4" fill="hold">
+                            <p:stCondLst>
+                              <p:cond delay="0"/>
+                            </p:stCondLst>
+                            <p:childTnLst>
+                              <p:par>
+                                <p:cTn id="5" presetID="1" presetClass="entr" presetSubtype="0" fill="hold" nodeType="clickEffect">
+                                  <p:stCondLst>
+                                    <p:cond delay="0"/>
+                                  </p:stCondLst>
+                                  <p:childTnLst>
+                                    <p:set>
+                                      <p:cBhvr>
+                                        <p:cTn id="6" dur="1" fill="hold">
+                                          <p:stCondLst>
+                                            <p:cond delay="0"/>
+                                          </p:stCondLst>
+                                        </p:cTn>
+                                        <p:tgtEl>
+                                          <p:spTgt spid="3">
+                                            <p:txEl>
+                                              <p:pRg st="4" end="4"/>
+                                            </p:txEl>
+                                          </p:spTgt>
+                                        </p:tgtEl>
+                                        <p:attrNameLst>
+                                          <p:attrName>style.visibility</p:attrName>
+                                        </p:attrNameLst>
+                                      </p:cBhvr>
+                                      <p:to>
+                                        <p:strVal val="visible"/>
+                                      </p:to>
+                                    </p:set>
+                                  </p:childTnLst>
+                                </p:cTn>
+                              </p:par>
+                              <p:par>
+                                <p:cTn id="7" presetID="1" presetClass="entr" presetSubtype="0" fill="hold" nodeType="withEffect">
+                                  <p:stCondLst>
+                                    <p:cond delay="0"/>
+                                  </p:stCondLst>
+                                  <p:childTnLst>
+                                    <p:set>
+                                      <p:cBhvr>
+                                        <p:cTn id="8" dur="1" fill="hold">
+                                          <p:stCondLst>
+                                            <p:cond delay="0"/>
+                                          </p:stCondLst>
+                                        </p:cTn>
+                                        <p:tgtEl>
+                                          <p:spTgt spid="3">
+                                            <p:txEl>
+                                              <p:pRg st="5" end="5"/>
+                                            </p:txEl>
+                                          </p:spTgt>
+                                        </p:tgtEl>
+                                        <p:attrNameLst>
+                                          <p:attrName>style.visibility</p:attrName>
+                                        </p:attrNameLst>
+                                      </p:cBhvr>
+                                      <p:to>
+                                        <p:strVal val="visible"/>
+                                      </p:to>
+                                    </p:set>
+                                  </p:childTnLst>
+                                </p:cTn>
+                              </p:par>
+                              <p:par>
+                                <p:cTn id="9" presetID="1" presetClass="entr" presetSubtype="0" fill="hold" nodeType="withEffect">
+                                  <p:stCondLst>
+                                    <p:cond delay="0"/>
+                                  </p:stCondLst>
+                                  <p:childTnLst>
+                                    <p:set>
+                                      <p:cBhvr>
+                                        <p:cTn id="10" dur="1" fill="hold">
+                                          <p:stCondLst>
+                                            <p:cond delay="0"/>
+                                          </p:stCondLst>
+                                        </p:cTn>
+                                        <p:tgtEl>
+                                          <p:spTgt spid="3">
+                                            <p:txEl>
+                                              <p:pRg st="6" end="6"/>
+                                            </p:txEl>
+                                          </p:spTgt>
+                                        </p:tgtEl>
+                                        <p:attrNameLst>
+                                          <p:attrName>style.visibility</p:attrName>
+                                        </p:attrNameLst>
+                                      </p:cBhvr>
+                                      <p:to>
+                                        <p:strVal val="visible"/>
+                                      </p:to>
+                                    </p:set>
+                                  </p:childTnLst>
+                                </p:cTn>
+                              </p:par>
+                            </p:childTnLst>
+                          </p:cTn>
+                        </p:par>
+                      </p:childTnLst>
+                    </p:cTn>
+                  </p:par>
+                </p:childTnLst>
+              </p:cTn>
+              <p:prevCondLst>
+                <p:cond evt="onPrev" delay="0">
+                  <p:tgtEl>
+                    <p:sldTgt/>
+                  </p:tgtEl>
+                </p:cond>
+              </p:prevCondLst>
+              <p:nextCondLst>
+                <p:cond evt="onNext" delay="0">
+                  <p:tgtEl>
+                    <p:sldTgt/>
+                  </p:tgtEl>
+                </p:cond>
+              </p:nextCondLst>
+            </p:seq>
+          </p:childTnLst>
+        </p:cTn>
+      </p:par>
+    </p:tnLst>
+  </p:timing>
+</p:sld>
+</file>
+
+<file path=ppt/slides/slide15.xml><?xml version="1.0" encoding="utf-8"?>
+<p:sld xmlns:a="http://schemas.openxmlformats.org/drawingml/2006/main" xmlns:r="http://schemas.openxmlformats.org/officeDocument/2006/relationships" xmlns:p="http://schemas.openxmlformats.org/presentationml/2006/main">
+  <p:cSld>
+    <p:spTree>
+      <p:nvGrpSpPr>
+        <p:cNvPr id="1" name=""/>
+        <p:cNvGrpSpPr/>
+        <p:nvPr/>
+      </p:nvGrpSpPr>
+      <p:grpSpPr>
+        <a:xfrm>
+          <a:off x="0" y="0"/>
+          <a:ext cx="0" cy="0"/>
+          <a:chOff x="0" y="0"/>
+          <a:chExt cx="0" cy="0"/>
+        </a:xfrm>
+      </p:grpSpPr>
+      <p:sp>
+        <p:nvSpPr>
+          <p:cNvPr id="2" name="Title 1"/>
+          <p:cNvSpPr>
+            <a:spLocks noGrp="1"/>
+          </p:cNvSpPr>
+          <p:nvPr>
+            <p:ph type="title"/>
+          </p:nvPr>
+        </p:nvSpPr>
+        <p:spPr/>
+        <p:txBody>
+          <a:bodyPr/>
+          <a:lstStyle/>
+          <a:p>
+            <a:r>
+              <a:rPr lang="en-US" dirty="0" smtClean="0"/>
+              <a:t>Amdahl’s Law</a:t>
+            </a:r>
+            <a:endParaRPr lang="en-US" dirty="0"/>
+          </a:p>
+        </p:txBody>
+      </p:sp>
+      <mc:AlternateContent xmlns:mc="http://schemas.openxmlformats.org/markup-compatibility/2006">
+        <mc:Choice xmlns:a14="http://schemas.microsoft.com/office/drawing/2010/main" Requires="a14">
+          <p:sp>
+            <p:nvSpPr>
+              <p:cNvPr id="3" name="Content Placeholder 2"/>
+              <p:cNvSpPr>
+                <a:spLocks noGrp="1"/>
+              </p:cNvSpPr>
+              <p:nvPr>
+                <p:ph idx="1"/>
+              </p:nvPr>
+            </p:nvSpPr>
+            <p:spPr/>
+            <p:txBody>
+              <a:bodyPr/>
+              <a:lstStyle/>
+              <a:p>
+                <a:r>
+                  <a:rPr lang="en-US" dirty="0" smtClean="0"/>
+                  <a:t>Amdahl’s law relates performance and scalability.</a:t>
+                </a:r>
+              </a:p>
+              <a:p>
+                <a:pPr marL="800100" lvl="1" indent="-342900"/>
+                <a:r>
+                  <a:rPr lang="en-US" dirty="0" smtClean="0"/>
+                  <a:t>Given a certain number of processors, what is the expected performance gain?</a:t>
+                </a:r>
+              </a:p>
+              <a:p>
+                <a:pPr marL="800100" lvl="1" indent="-342900"/>
+                <a:r>
+                  <a:rPr lang="en-US" dirty="0" smtClean="0"/>
+                  <a:t>Helps us understand the benefit of making code parallel.</a:t>
+                </a:r>
+              </a:p>
+              <a:p>
+                <a:pPr marL="342900" indent="-342900"/>
+                <a:endParaRPr lang="en-US" dirty="0"/>
+              </a:p>
+              <a:p>
+                <a:pPr marL="342900" indent="-342900"/>
+                <a14:m>
+                  <m:oMathPara xmlns:m="http://schemas.openxmlformats.org/officeDocument/2006/math">
+                    <m:oMathParaPr>
+                      <m:jc m:val="centerGroup"/>
+                    </m:oMathParaPr>
+                    <m:oMath xmlns:m="http://schemas.openxmlformats.org/officeDocument/2006/math">
+                      <m:r>
+                        <a:rPr lang="en-US" b="1" i="1" smtClean="0">
+                          <a:latin typeface="Cambria Math"/>
+                        </a:rPr>
+                        <m:t>𝑷</m:t>
+                      </m:r>
+                      <m:r>
+                        <a:rPr lang="en-US" b="1" i="1" smtClean="0">
+                          <a:latin typeface="Cambria Math"/>
+                        </a:rPr>
+                        <m:t>=</m:t>
+                      </m:r>
+                      <m:f>
+                        <m:fPr>
+                          <m:ctrlPr>
+                            <a:rPr lang="en-US" b="1" i="1" smtClean="0">
+                              <a:latin typeface="Cambria Math"/>
+                            </a:rPr>
+                          </m:ctrlPr>
+                        </m:fPr>
+                        <m:num>
+                          <m:r>
+                            <a:rPr lang="en-US" b="1" i="1" smtClean="0">
+                              <a:latin typeface="Cambria Math"/>
+                            </a:rPr>
+                            <m:t>𝟏</m:t>
+                          </m:r>
+                        </m:num>
+                        <m:den>
+                          <m:sSub>
+                            <m:sSubPr>
+                              <m:ctrlPr>
+                                <a:rPr lang="en-US" b="1" i="1" smtClean="0">
+                                  <a:latin typeface="Cambria Math"/>
+                                </a:rPr>
+                              </m:ctrlPr>
+                            </m:sSubPr>
+                            <m:e>
+                              <m:r>
+                                <a:rPr lang="en-US" b="1" i="1" smtClean="0">
+                                  <a:latin typeface="Cambria Math"/>
+                                </a:rPr>
+                                <m:t>𝒇</m:t>
+                              </m:r>
+                            </m:e>
+                            <m:sub>
+                              <m:r>
+                                <a:rPr lang="en-US" b="1" i="1" smtClean="0">
+                                  <a:latin typeface="Cambria Math"/>
+                                </a:rPr>
+                                <m:t>𝒔</m:t>
+                              </m:r>
+                            </m:sub>
+                          </m:sSub>
+                          <m:r>
+                            <a:rPr lang="en-US" b="1" i="1" smtClean="0">
+                              <a:latin typeface="Cambria Math"/>
+                            </a:rPr>
+                            <m:t>+ </m:t>
+                          </m:r>
+                          <m:f>
+                            <m:fPr>
+                              <m:ctrlPr>
+                                <a:rPr lang="en-US" b="1" i="1" smtClean="0">
+                                  <a:latin typeface="Cambria Math"/>
+                                </a:rPr>
+                              </m:ctrlPr>
+                            </m:fPr>
+                            <m:num>
+                              <m:r>
+                                <a:rPr lang="en-US" b="1" i="1" smtClean="0">
+                                  <a:latin typeface="Cambria Math"/>
+                                </a:rPr>
+                                <m:t>𝟏</m:t>
+                              </m:r>
+                              <m:r>
+                                <a:rPr lang="en-US" b="1" i="1" smtClean="0">
+                                  <a:latin typeface="Cambria Math"/>
+                                </a:rPr>
+                                <m:t>−</m:t>
+                              </m:r>
+                              <m:sSub>
+                                <m:sSubPr>
+                                  <m:ctrlPr>
+                                    <a:rPr lang="en-US" b="1" i="1" smtClean="0">
+                                      <a:latin typeface="Cambria Math"/>
+                                    </a:rPr>
+                                  </m:ctrlPr>
+                                </m:sSubPr>
+                                <m:e>
+                                  <m:r>
+                                    <a:rPr lang="en-US" b="1" i="1" smtClean="0">
+                                      <a:latin typeface="Cambria Math"/>
+                                    </a:rPr>
+                                    <m:t>𝒇</m:t>
+                                  </m:r>
+                                </m:e>
+                                <m:sub>
+                                  <m:r>
+                                    <a:rPr lang="en-US" b="1" i="1" smtClean="0">
+                                      <a:latin typeface="Cambria Math"/>
+                                    </a:rPr>
+                                    <m:t>𝒔</m:t>
+                                  </m:r>
+                                </m:sub>
+                              </m:sSub>
+                            </m:num>
+                            <m:den>
+                              <m:r>
+                                <a:rPr lang="en-US" b="1" i="1" smtClean="0">
+                                  <a:latin typeface="Cambria Math"/>
+                                </a:rPr>
+                                <m:t>𝑵</m:t>
+                              </m:r>
+                            </m:den>
+                          </m:f>
+                        </m:den>
+                      </m:f>
+                    </m:oMath>
+                  </m:oMathPara>
+                </a14:m>
+                <a:endParaRPr lang="en-US" dirty="0" smtClean="0"/>
+              </a:p>
+              <a:p>
+                <a:pPr marL="800100" lvl="1" indent="-342900"/>
+                <a:r>
+                  <a:rPr lang="en-US" i="1" dirty="0" smtClean="0"/>
+                  <a:t>P</a:t>
+                </a:r>
+                <a:r>
+                  <a:rPr lang="en-US" dirty="0" smtClean="0"/>
+                  <a:t> is the expected performance gain</a:t>
+                </a:r>
+              </a:p>
+              <a:p>
+                <a:pPr marL="800100" lvl="1" indent="-342900"/>
+                <a:r>
+                  <a:rPr lang="en-US" i="1" dirty="0" smtClean="0"/>
+                  <a:t>N</a:t>
+                </a:r>
+                <a:r>
+                  <a:rPr lang="en-US" dirty="0" smtClean="0"/>
+                  <a:t> is the number of processors</a:t>
+                </a:r>
+              </a:p>
+              <a:p>
+                <a:pPr marL="800100" lvl="1" indent="-342900"/>
+                <a:r>
+                  <a:rPr lang="en-US" i="1" dirty="0" smtClean="0"/>
+                  <a:t>f</a:t>
+                </a:r>
+                <a:r>
+                  <a:rPr lang="en-US" i="1" baseline="-25000" dirty="0" smtClean="0"/>
+                  <a:t>s</a:t>
+                </a:r>
+                <a:r>
+                  <a:rPr lang="en-US" dirty="0" smtClean="0"/>
+                  <a:t> is the fraction of the program which is serial</a:t>
+                </a:r>
+                <a:endParaRPr lang="en-US" dirty="0"/>
+              </a:p>
+            </p:txBody>
+          </p:sp>
+        </mc:Choice>
+        <mc:Fallback>
+          <p:sp>
+            <p:nvSpPr>
+              <p:cNvPr id="3" name="Content Placeholder 2"/>
+              <p:cNvSpPr>
+                <a:spLocks noGrp="1" noRot="1" noChangeAspect="1" noMove="1" noResize="1" noEditPoints="1" noAdjustHandles="1" noChangeArrowheads="1" noChangeShapeType="1" noTextEdit="1"/>
+              </p:cNvSpPr>
+              <p:nvPr>
+                <p:ph idx="1"/>
+              </p:nvPr>
+            </p:nvSpPr>
+            <p:spPr>
+              <a:blipFill rotWithShape="1">
+                <a:blip r:embed="rId2"/>
+                <a:stretch>
+                  <a:fillRect l="-800" t="-558"/>
+                </a:stretch>
+              </a:blipFill>
+            </p:spPr>
+            <p:txBody>
+              <a:bodyPr/>
+              <a:lstStyle/>
+              <a:p>
+                <a:r>
+                  <a:rPr lang="en-US">
+                    <a:noFill/>
+                  </a:rPr>
+                  <a:t> </a:t>
+                </a:r>
+              </a:p>
+            </p:txBody>
+          </p:sp>
+        </mc:Fallback>
+      </mc:AlternateContent>
+      <p:sp>
+        <p:nvSpPr>
+          <p:cNvPr id="4" name="Slide Number Placeholder 3"/>
+          <p:cNvSpPr>
+            <a:spLocks noGrp="1"/>
+          </p:cNvSpPr>
+          <p:nvPr>
+            <p:ph type="sldNum" sz="quarter" idx="12"/>
+          </p:nvPr>
+        </p:nvSpPr>
+        <p:spPr/>
+        <p:txBody>
+          <a:bodyPr/>
+          <a:lstStyle/>
+          <a:p>
+            <a:fld id="{6DA12B36-9664-4CB0-8B2E-F4A2F44AE97E}" type="slidenum">
+              <a:rPr lang="en-US" smtClean="0"/>
+              <a:t>15</a:t>
+            </a:fld>
+            <a:endParaRPr lang="en-US"/>
+          </a:p>
+        </p:txBody>
+      </p:sp>
+    </p:spTree>
+    <p:extLst>
+      <p:ext uri="{BB962C8B-B14F-4D97-AF65-F5344CB8AC3E}">
+        <p14:creationId xmlns:p14="http://schemas.microsoft.com/office/powerpoint/2010/main" val="3082464987"/>
+      </p:ext>
+    </p:extLst>
+  </p:cSld>
+  <p:clrMapOvr>
+    <a:masterClrMapping/>
+  </p:clrMapOvr>
+  <p:timing>
+    <p:tnLst>
+      <p:par>
+        <p:cTn id="1" dur="indefinite" restart="never" nodeType="tmRoot"/>
+      </p:par>
+    </p:tnLst>
+  </p:timing>
+</p:sld>
+</file>
+
+<file path=ppt/slides/slide16.xml><?xml version="1.0" encoding="utf-8"?>
+<p:sld xmlns:a="http://schemas.openxmlformats.org/drawingml/2006/main" xmlns:r="http://schemas.openxmlformats.org/officeDocument/2006/relationships" xmlns:p="http://schemas.openxmlformats.org/presentationml/2006/main">
+  <p:cSld>
+    <p:spTree>
+      <p:nvGrpSpPr>
+        <p:cNvPr id="1" name=""/>
+        <p:cNvGrpSpPr/>
+        <p:nvPr/>
+      </p:nvGrpSpPr>
+      <p:grpSpPr>
+        <a:xfrm>
+          <a:off x="0" y="0"/>
+          <a:ext cx="0" cy="0"/>
+          <a:chOff x="0" y="0"/>
+          <a:chExt cx="0" cy="0"/>
+        </a:xfrm>
+      </p:grpSpPr>
+      <p:sp>
+        <p:nvSpPr>
+          <p:cNvPr id="2" name="Title 1"/>
+          <p:cNvSpPr>
+            <a:spLocks noGrp="1"/>
+          </p:cNvSpPr>
+          <p:nvPr>
+            <p:ph type="title"/>
+          </p:nvPr>
+        </p:nvSpPr>
+        <p:spPr/>
+        <p:txBody>
+          <a:bodyPr/>
+          <a:lstStyle/>
+          <a:p>
+            <a:r>
+              <a:rPr lang="en-US" dirty="0" smtClean="0"/>
+              <a:t>Exploring Amdahl’s law</a:t>
+            </a:r>
+            <a:endParaRPr lang="en-US" dirty="0"/>
+          </a:p>
+        </p:txBody>
+      </p:sp>
+      <mc:AlternateContent xmlns:mc="http://schemas.openxmlformats.org/markup-compatibility/2006">
+        <mc:Choice xmlns:a14="http://schemas.microsoft.com/office/drawing/2010/main" Requires="a14">
+          <p:sp>
+            <p:nvSpPr>
+              <p:cNvPr id="3" name="Content Placeholder 2"/>
+              <p:cNvSpPr>
+                <a:spLocks noGrp="1"/>
+              </p:cNvSpPr>
+              <p:nvPr>
+                <p:ph idx="1"/>
+              </p:nvPr>
+            </p:nvSpPr>
+            <p:spPr/>
+            <p:txBody>
+              <a:bodyPr/>
+              <a:lstStyle/>
+              <a:p>
+                <a14:m>
+                  <m:oMathPara xmlns:m="http://schemas.openxmlformats.org/officeDocument/2006/math">
+                    <m:oMathParaPr>
+                      <m:jc m:val="centerGroup"/>
+                    </m:oMathParaPr>
+                    <m:oMath xmlns:m="http://schemas.openxmlformats.org/officeDocument/2006/math">
+                      <m:r>
+                        <a:rPr lang="en-US" i="1" smtClean="0">
+                          <a:latin typeface="Cambria Math"/>
+                        </a:rPr>
+                        <m:t>𝑷</m:t>
+                      </m:r>
+                      <m:r>
+                        <a:rPr lang="en-US" i="1" smtClean="0">
+                          <a:latin typeface="Cambria Math"/>
+                        </a:rPr>
+                        <m:t>=</m:t>
+                      </m:r>
+                      <m:f>
+                        <m:fPr>
+                          <m:ctrlPr>
+                            <a:rPr lang="en-US" i="1">
+                              <a:latin typeface="Cambria Math"/>
+                            </a:rPr>
+                          </m:ctrlPr>
+                        </m:fPr>
+                        <m:num>
+                          <m:r>
+                            <a:rPr lang="en-US" i="1">
+                              <a:latin typeface="Cambria Math"/>
+                            </a:rPr>
+                            <m:t>𝟏</m:t>
+                          </m:r>
+                        </m:num>
+                        <m:den>
+                          <m:sSub>
+                            <m:sSubPr>
+                              <m:ctrlPr>
+                                <a:rPr lang="en-US" i="1">
+                                  <a:latin typeface="Cambria Math"/>
+                                </a:rPr>
+                              </m:ctrlPr>
+                            </m:sSubPr>
+                            <m:e>
+                              <m:r>
+                                <a:rPr lang="en-US" i="1">
+                                  <a:latin typeface="Cambria Math"/>
+                                </a:rPr>
+                                <m:t>𝒇</m:t>
+                              </m:r>
+                            </m:e>
+                            <m:sub>
+                              <m:r>
+                                <a:rPr lang="en-US" i="1">
+                                  <a:latin typeface="Cambria Math"/>
+                                </a:rPr>
+                                <m:t>𝒔</m:t>
+                              </m:r>
+                            </m:sub>
+                          </m:sSub>
+                          <m:r>
+                            <a:rPr lang="en-US" i="1">
+                              <a:latin typeface="Cambria Math"/>
+                            </a:rPr>
+                            <m:t>+ </m:t>
+                          </m:r>
+                          <m:f>
+                            <m:fPr>
+                              <m:ctrlPr>
+                                <a:rPr lang="en-US" i="1">
+                                  <a:latin typeface="Cambria Math"/>
+                                </a:rPr>
+                              </m:ctrlPr>
+                            </m:fPr>
+                            <m:num>
+                              <m:r>
+                                <a:rPr lang="en-US" i="1">
+                                  <a:latin typeface="Cambria Math"/>
+                                </a:rPr>
+                                <m:t>𝟏</m:t>
+                              </m:r>
+                              <m:r>
+                                <a:rPr lang="en-US" i="1">
+                                  <a:latin typeface="Cambria Math"/>
+                                </a:rPr>
+                                <m:t>−</m:t>
+                              </m:r>
+                              <m:sSub>
+                                <m:sSubPr>
+                                  <m:ctrlPr>
+                                    <a:rPr lang="en-US" i="1">
+                                      <a:latin typeface="Cambria Math"/>
+                                    </a:rPr>
+                                  </m:ctrlPr>
+                                </m:sSubPr>
+                                <m:e>
+                                  <m:r>
+                                    <a:rPr lang="en-US" i="1">
+                                      <a:latin typeface="Cambria Math"/>
+                                    </a:rPr>
+                                    <m:t>𝒇</m:t>
+                                  </m:r>
+                                </m:e>
+                                <m:sub>
+                                  <m:r>
+                                    <a:rPr lang="en-US" i="1">
+                                      <a:latin typeface="Cambria Math"/>
+                                    </a:rPr>
+                                    <m:t>𝒔</m:t>
+                                  </m:r>
+                                </m:sub>
+                              </m:sSub>
+                            </m:num>
+                            <m:den>
+                              <m:r>
+                                <a:rPr lang="en-US" i="1">
+                                  <a:latin typeface="Cambria Math"/>
+                                </a:rPr>
+                                <m:t>𝑵</m:t>
+                              </m:r>
+                            </m:den>
+                          </m:f>
+                        </m:den>
+                      </m:f>
+                    </m:oMath>
+                  </m:oMathPara>
+                </a14:m>
+                <a:endParaRPr lang="en-US" dirty="0" smtClean="0"/>
+              </a:p>
+              <a:p>
+                <a:r>
+                  <a:rPr lang="en-US" dirty="0" smtClean="0"/>
+                  <a:t>If </a:t>
+                </a:r>
+                <a:r>
+                  <a:rPr lang="en-US" i="1" dirty="0" smtClean="0"/>
+                  <a:t>f</a:t>
+                </a:r>
+                <a:r>
+                  <a:rPr lang="en-US" i="1" baseline="-25000" dirty="0" smtClean="0"/>
+                  <a:t>s</a:t>
+                </a:r>
+                <a:r>
+                  <a:rPr lang="en-US" dirty="0" smtClean="0"/>
+                  <a:t>, is zero (no serial code)</a:t>
+                </a:r>
+              </a:p>
+              <a:p>
+                <a:pPr marL="800100" lvl="1" indent="-342900"/>
+                <a:r>
+                  <a:rPr lang="en-US" dirty="0" smtClean="0"/>
+                  <a:t>Then </a:t>
+                </a:r>
+                <a:r>
+                  <a:rPr lang="en-US" i="1" dirty="0" smtClean="0"/>
+                  <a:t>P = N</a:t>
+                </a:r>
+                <a:r>
+                  <a:rPr lang="en-US" dirty="0" smtClean="0"/>
+                  <a:t>, each processor is used a full efficiency</a:t>
+                </a:r>
+              </a:p>
+              <a:p>
+                <a:pPr marL="800100" lvl="1" indent="-342900"/>
+                <a:r>
+                  <a:rPr lang="en-US" dirty="0" smtClean="0"/>
+                  <a:t>Called and </a:t>
+                </a:r>
+                <a:r>
+                  <a:rPr lang="en-US" i="1" dirty="0" smtClean="0"/>
+                  <a:t>embarrassingly parallel</a:t>
+                </a:r>
+                <a:r>
+                  <a:rPr lang="en-US" dirty="0" smtClean="0"/>
+                  <a:t> algorithm</a:t>
+                </a:r>
+              </a:p>
+              <a:p>
+                <a:pPr marL="342900" indent="-342900"/>
+                <a:r>
+                  <a:rPr lang="en-US" dirty="0"/>
+                  <a:t>If </a:t>
+                </a:r>
+                <a:r>
+                  <a:rPr lang="en-US" i="1" dirty="0"/>
+                  <a:t>f</a:t>
+                </a:r>
+                <a:r>
+                  <a:rPr lang="en-US" i="1" baseline="-25000" dirty="0"/>
+                  <a:t>s</a:t>
+                </a:r>
+                <a:r>
+                  <a:rPr lang="en-US" dirty="0"/>
+                  <a:t>, </a:t>
+                </a:r>
+                <a:r>
+                  <a:rPr lang="en-US" dirty="0" smtClean="0"/>
+                  <a:t>is one (no parallel code)</a:t>
+                </a:r>
+              </a:p>
+              <a:p>
+                <a:pPr marL="800100" lvl="1" indent="-342900"/>
+                <a:r>
+                  <a:rPr lang="en-US" dirty="0" smtClean="0"/>
+                  <a:t>Then </a:t>
+                </a:r>
+                <a:r>
+                  <a:rPr lang="en-US" i="1" dirty="0" smtClean="0"/>
+                  <a:t>P</a:t>
+                </a:r>
+                <a:r>
+                  <a:rPr lang="en-US" dirty="0" smtClean="0"/>
+                  <a:t> = 1, each processor is used at zero efficiency</a:t>
+                </a:r>
+              </a:p>
+              <a:p>
+                <a:pPr marL="800100" lvl="1" indent="-342900"/>
+                <a:r>
+                  <a:rPr lang="en-US" dirty="0" smtClean="0"/>
+                  <a:t>The algorithm will not benefit at all from more processors</a:t>
+                </a:r>
+              </a:p>
+              <a:p>
+                <a:r>
+                  <a:rPr lang="en-US" dirty="0" smtClean="0"/>
+                  <a:t>More likely, </a:t>
+                </a:r>
+                <a:r>
+                  <a:rPr lang="en-US" i="1" dirty="0"/>
+                  <a:t>f</a:t>
+                </a:r>
+                <a:r>
+                  <a:rPr lang="en-US" i="1" baseline="-25000" dirty="0"/>
+                  <a:t>s</a:t>
+                </a:r>
+                <a:r>
+                  <a:rPr lang="en-US" dirty="0" smtClean="0"/>
+                  <a:t>, is something like 0.3 (30% serial code)</a:t>
+                </a:r>
+              </a:p>
+              <a:p>
+                <a:pPr marL="800100" lvl="1" indent="-342900"/>
+                <a:r>
+                  <a:rPr lang="en-US" dirty="0" smtClean="0"/>
+                  <a:t>The benefit of additional processors is bounded</a:t>
+                </a:r>
+              </a:p>
+              <a:p>
+                <a:pPr marL="800100" lvl="1" indent="-342900"/>
+                <a:endParaRPr lang="en-US" i="1" dirty="0" smtClean="0"/>
+              </a:p>
+            </p:txBody>
+          </p:sp>
+        </mc:Choice>
+        <mc:Fallback>
+          <p:sp>
+            <p:nvSpPr>
+              <p:cNvPr id="3" name="Content Placeholder 2"/>
+              <p:cNvSpPr>
+                <a:spLocks noGrp="1" noRot="1" noChangeAspect="1" noMove="1" noResize="1" noEditPoints="1" noAdjustHandles="1" noChangeArrowheads="1" noChangeShapeType="1" noTextEdit="1"/>
+              </p:cNvSpPr>
+              <p:nvPr>
+                <p:ph idx="1"/>
+              </p:nvPr>
+            </p:nvSpPr>
+            <p:spPr>
+              <a:blipFill rotWithShape="1">
+                <a:blip r:embed="rId2"/>
+                <a:stretch>
+                  <a:fillRect l="-800"/>
+                </a:stretch>
+              </a:blipFill>
+            </p:spPr>
+            <p:txBody>
+              <a:bodyPr/>
+              <a:lstStyle/>
+              <a:p>
+                <a:r>
+                  <a:rPr lang="en-US">
+                    <a:noFill/>
+                  </a:rPr>
+                  <a:t> </a:t>
+                </a:r>
+              </a:p>
+            </p:txBody>
+          </p:sp>
+        </mc:Fallback>
+      </mc:AlternateContent>
+      <p:sp>
+        <p:nvSpPr>
+          <p:cNvPr id="4" name="Slide Number Placeholder 3"/>
+          <p:cNvSpPr>
+            <a:spLocks noGrp="1"/>
+          </p:cNvSpPr>
+          <p:nvPr>
+            <p:ph type="sldNum" sz="quarter" idx="12"/>
+          </p:nvPr>
+        </p:nvSpPr>
+        <p:spPr/>
+        <p:txBody>
+          <a:bodyPr/>
+          <a:lstStyle/>
+          <a:p>
+            <a:fld id="{6DA12B36-9664-4CB0-8B2E-F4A2F44AE97E}" type="slidenum">
+              <a:rPr lang="en-US" smtClean="0"/>
+              <a:t>16</a:t>
+            </a:fld>
+            <a:endParaRPr lang="en-US"/>
+          </a:p>
+        </p:txBody>
+      </p:sp>
+    </p:spTree>
+    <p:extLst>
+      <p:ext uri="{BB962C8B-B14F-4D97-AF65-F5344CB8AC3E}">
+        <p14:creationId xmlns:p14="http://schemas.microsoft.com/office/powerpoint/2010/main" val="949304368"/>
+      </p:ext>
+    </p:extLst>
+  </p:cSld>
+  <p:clrMapOvr>
+    <a:masterClrMapping/>
+  </p:clrMapOvr>
+  <p:timing>
+    <p:tnLst>
+      <p:par>
+        <p:cTn id="1" dur="indefinite" restart="never" nodeType="tmRoot"/>
+      </p:par>
+    </p:tnLst>
+  </p:timing>
+</p:sld>
+</file>
+
+<file path=ppt/slides/slide17.xml><?xml version="1.0" encoding="utf-8"?>
+<p:sld xmlns:a="http://schemas.openxmlformats.org/drawingml/2006/main" xmlns:r="http://schemas.openxmlformats.org/officeDocument/2006/relationships" xmlns:p="http://schemas.openxmlformats.org/presentationml/2006/main">
+  <p:cSld>
+    <p:spTree>
+      <p:nvGrpSpPr>
+        <p:cNvPr id="1" name=""/>
+        <p:cNvGrpSpPr/>
+        <p:nvPr/>
+      </p:nvGrpSpPr>
+      <p:grpSpPr>
+        <a:xfrm>
+          <a:off x="0" y="0"/>
+          <a:ext cx="0" cy="0"/>
+          <a:chOff x="0" y="0"/>
+          <a:chExt cx="0" cy="0"/>
+        </a:xfrm>
+      </p:grpSpPr>
+      <p:sp>
+        <p:nvSpPr>
+          <p:cNvPr id="2" name="Title 1"/>
+          <p:cNvSpPr>
+            <a:spLocks noGrp="1"/>
+          </p:cNvSpPr>
+          <p:nvPr>
+            <p:ph type="title"/>
+          </p:nvPr>
+        </p:nvSpPr>
+        <p:spPr/>
+        <p:txBody>
+          <a:bodyPr/>
+          <a:lstStyle/>
+          <a:p>
+            <a:r>
+              <a:rPr lang="en-US" dirty="0" smtClean="0"/>
+              <a:t>Plot of Amdahl’s Law</a:t>
+            </a:r>
+            <a:endParaRPr lang="en-US" dirty="0"/>
+          </a:p>
+        </p:txBody>
+      </p:sp>
+      <p:sp>
+        <p:nvSpPr>
+          <p:cNvPr id="4" name="Slide Number Placeholder 3"/>
+          <p:cNvSpPr>
+            <a:spLocks noGrp="1"/>
+          </p:cNvSpPr>
+          <p:nvPr>
+            <p:ph type="sldNum" sz="quarter" idx="12"/>
+          </p:nvPr>
+        </p:nvSpPr>
+        <p:spPr/>
+        <p:txBody>
+          <a:bodyPr/>
+          <a:lstStyle/>
+          <a:p>
+            <a:fld id="{6DA12B36-9664-4CB0-8B2E-F4A2F44AE97E}" type="slidenum">
+              <a:rPr lang="en-US" smtClean="0"/>
+              <a:t>17</a:t>
+            </a:fld>
+            <a:endParaRPr lang="en-US"/>
+          </a:p>
+        </p:txBody>
+      </p:sp>
+      <p:graphicFrame>
+        <p:nvGraphicFramePr>
+          <p:cNvPr id="7" name="Chart 6"/>
+          <p:cNvGraphicFramePr>
+            <a:graphicFrameLocks/>
+          </p:cNvGraphicFramePr>
+          <p:nvPr>
+            <p:extLst>
+              <p:ext uri="{D42A27DB-BD31-4B8C-83A1-F6EECF244321}">
+                <p14:modId xmlns:p14="http://schemas.microsoft.com/office/powerpoint/2010/main" val="935987880"/>
+              </p:ext>
+            </p:extLst>
+          </p:nvPr>
+        </p:nvGraphicFramePr>
+        <p:xfrm>
+          <a:off x="381000" y="1524000"/>
+          <a:ext cx="8382000" cy="5105400"/>
+        </p:xfrm>
+        <a:graphic>
+          <a:graphicData uri="http://schemas.openxmlformats.org/drawingml/2006/chart">
+            <c:chart xmlns:c="http://schemas.openxmlformats.org/drawingml/2006/chart" xmlns:r="http://schemas.openxmlformats.org/officeDocument/2006/relationships" r:id="rId2"/>
+          </a:graphicData>
+        </a:graphic>
+      </p:graphicFrame>
+    </p:spTree>
+    <p:extLst>
+      <p:ext uri="{BB962C8B-B14F-4D97-AF65-F5344CB8AC3E}">
+        <p14:creationId xmlns:p14="http://schemas.microsoft.com/office/powerpoint/2010/main" val="3386557025"/>
       </p:ext>
     </p:extLst>
   </p:cSld>
@@ -7590,6 +11511,29 @@
               <a:t>9</a:t>
             </a:fld>
             <a:endParaRPr lang="en-US"/>
+          </a:p>
+        </p:txBody>
+      </p:sp>
+      <p:sp>
+        <p:nvSpPr>
+          <p:cNvPr id="5" name="Footer Placeholder 4"/>
+          <p:cNvSpPr>
+            <a:spLocks noGrp="1"/>
+          </p:cNvSpPr>
+          <p:nvPr>
+            <p:ph type="ftr" sz="quarter" idx="11"/>
+          </p:nvPr>
+        </p:nvSpPr>
+        <p:spPr/>
+        <p:txBody>
+          <a:bodyPr/>
+          <a:lstStyle/>
+          <a:p>
+            <a:r>
+              <a:rPr lang="en-US" dirty="0" smtClean="0"/>
+              <a:t>Source: Williams, Chapter 8</a:t>
+            </a:r>
+            <a:endParaRPr lang="en-US" dirty="0"/>
           </a:p>
         </p:txBody>
       </p:sp>

</xml_diff>

<commit_message>
Complete lecture on designing concurrent software.
</commit_message>
<xml_diff>
--- a/Lectures/Designing Concurrent Software/Designing Concurrent Software.pptx
+++ b/Lectures/Designing Concurrent Software/Designing Concurrent Software.pptx
@@ -5,7 +5,7 @@
     <p:sldMasterId id="2147483660" r:id="rId1"/>
   </p:sldMasterIdLst>
   <p:notesMasterIdLst>
-    <p:notesMasterId r:id="rId19"/>
+    <p:notesMasterId r:id="rId24"/>
   </p:notesMasterIdLst>
   <p:sldIdLst>
     <p:sldId id="256" r:id="rId2"/>
@@ -25,6 +25,11 @@
     <p:sldId id="270" r:id="rId16"/>
     <p:sldId id="271" r:id="rId17"/>
     <p:sldId id="272" r:id="rId18"/>
+    <p:sldId id="273" r:id="rId19"/>
+    <p:sldId id="274" r:id="rId20"/>
+    <p:sldId id="275" r:id="rId21"/>
+    <p:sldId id="276" r:id="rId22"/>
+    <p:sldId id="277" r:id="rId23"/>
   </p:sldIdLst>
   <p:sldSz cx="9144000" cy="6858000" type="screen4x3"/>
   <p:notesSz cx="6858000" cy="9144000"/>
@@ -1221,11 +1226,11 @@
           <c:showPercent val="0"/>
           <c:showBubbleSize val="0"/>
         </c:dLbls>
-        <c:axId val="175581440"/>
-        <c:axId val="175825664"/>
+        <c:axId val="72706688"/>
+        <c:axId val="72712960"/>
       </c:scatterChart>
       <c:valAx>
-        <c:axId val="175581440"/>
+        <c:axId val="72706688"/>
         <c:scaling>
           <c:orientation val="minMax"/>
           <c:max val="20"/>
@@ -1255,12 +1260,12 @@
         <c:majorTickMark val="out"/>
         <c:minorTickMark val="none"/>
         <c:tickLblPos val="nextTo"/>
-        <c:crossAx val="175825664"/>
+        <c:crossAx val="72712960"/>
         <c:crosses val="autoZero"/>
         <c:crossBetween val="midCat"/>
       </c:valAx>
       <c:valAx>
-        <c:axId val="175825664"/>
+        <c:axId val="72712960"/>
         <c:scaling>
           <c:orientation val="minMax"/>
         </c:scaling>
@@ -1290,7 +1295,7 @@
         <c:majorTickMark val="out"/>
         <c:minorTickMark val="none"/>
         <c:tickLblPos val="nextTo"/>
-        <c:crossAx val="175581440"/>
+        <c:crossAx val="72706688"/>
         <c:crosses val="autoZero"/>
         <c:crossBetween val="midCat"/>
       </c:valAx>
@@ -1392,7 +1397,7 @@
           <a:p>
             <a:fld id="{DBE0ECA1-3FBF-48AE-AD2A-4439AE745E19}" type="datetimeFigureOut">
               <a:rPr lang="en-US" smtClean="0"/>
-              <a:t>12/17/2013</a:t>
+              <a:t>12/18/2013</a:t>
             </a:fld>
             <a:endParaRPr lang="en-US"/>
           </a:p>
@@ -1853,7 +1858,7 @@
           <a:p>
             <a:fld id="{9769DED8-28D4-45B9-A00F-7CFE9335FEA6}" type="datetime1">
               <a:rPr lang="en-US" smtClean="0"/>
-              <a:t>12/17/2013</a:t>
+              <a:t>12/18/2013</a:t>
             </a:fld>
             <a:endParaRPr lang="en-US"/>
           </a:p>
@@ -2118,7 +2123,7 @@
           <a:p>
             <a:fld id="{2DB3D439-1F88-44B4-B5F7-F9BCD4064257}" type="datetime1">
               <a:rPr lang="en-US" smtClean="0"/>
-              <a:t>12/17/2013</a:t>
+              <a:t>12/18/2013</a:t>
             </a:fld>
             <a:endParaRPr lang="en-US"/>
           </a:p>
@@ -2293,7 +2298,7 @@
           <a:p>
             <a:fld id="{99C5638F-6F55-4055-935C-67841BE78C36}" type="datetime1">
               <a:rPr lang="en-US" smtClean="0"/>
-              <a:t>12/17/2013</a:t>
+              <a:t>12/18/2013</a:t>
             </a:fld>
             <a:endParaRPr lang="en-US"/>
           </a:p>
@@ -2458,7 +2463,7 @@
           <a:p>
             <a:fld id="{E6987D90-0C92-4B22-A29D-FED15412CED2}" type="datetime1">
               <a:rPr lang="en-US" smtClean="0"/>
-              <a:t>12/17/2013</a:t>
+              <a:t>12/18/2013</a:t>
             </a:fld>
             <a:endParaRPr lang="en-US"/>
           </a:p>
@@ -2707,7 +2712,7 @@
           <a:p>
             <a:fld id="{DDB67BC4-9554-49E0-BCB3-D1EF965BA0B8}" type="datetime1">
               <a:rPr lang="en-US" smtClean="0"/>
-              <a:t>12/17/2013</a:t>
+              <a:t>12/18/2013</a:t>
             </a:fld>
             <a:endParaRPr lang="en-US"/>
           </a:p>
@@ -2990,7 +2995,7 @@
           <a:p>
             <a:fld id="{EC24D770-803D-4E01-921C-9C100DD8230C}" type="datetime1">
               <a:rPr lang="en-US" smtClean="0"/>
-              <a:t>12/17/2013</a:t>
+              <a:t>12/18/2013</a:t>
             </a:fld>
             <a:endParaRPr lang="en-US"/>
           </a:p>
@@ -3429,7 +3434,7 @@
           <a:p>
             <a:fld id="{356AD44B-78A4-4209-8070-7DCBE2DC4992}" type="datetime1">
               <a:rPr lang="en-US" smtClean="0"/>
-              <a:t>12/17/2013</a:t>
+              <a:t>12/18/2013</a:t>
             </a:fld>
             <a:endParaRPr lang="en-US"/>
           </a:p>
@@ -3542,7 +3547,7 @@
           <a:p>
             <a:fld id="{A993C59A-7CA2-467F-B7F1-9096881A01B8}" type="datetime1">
               <a:rPr lang="en-US" smtClean="0"/>
-              <a:t>12/17/2013</a:t>
+              <a:t>12/18/2013</a:t>
             </a:fld>
             <a:endParaRPr lang="en-US"/>
           </a:p>
@@ -3632,7 +3637,7 @@
           <a:p>
             <a:fld id="{2B6B58D0-2488-434A-8ED1-692E09B85CC5}" type="datetime1">
               <a:rPr lang="en-US" smtClean="0"/>
-              <a:t>12/17/2013</a:t>
+              <a:t>12/18/2013</a:t>
             </a:fld>
             <a:endParaRPr lang="en-US"/>
           </a:p>
@@ -3874,7 +3879,7 @@
           <a:p>
             <a:fld id="{FDB0AFC2-7D64-4F61-A7B7-9932D3305DDA}" type="datetime1">
               <a:rPr lang="en-US" smtClean="0"/>
-              <a:t>12/17/2013</a:t>
+              <a:t>12/18/2013</a:t>
             </a:fld>
             <a:endParaRPr lang="en-US"/>
           </a:p>
@@ -4168,7 +4173,7 @@
           <a:p>
             <a:fld id="{4983D17A-D7B2-4ECE-8A2C-93679B9D177B}" type="datetime1">
               <a:rPr lang="en-US" smtClean="0"/>
-              <a:t>12/17/2013</a:t>
+              <a:t>12/18/2013</a:t>
             </a:fld>
             <a:endParaRPr lang="en-US"/>
           </a:p>
@@ -4462,7 +4467,7 @@
           <a:p>
             <a:fld id="{2A5275F7-419E-4C23-8A3D-2EE5742B2EC9}" type="datetime1">
               <a:rPr lang="en-US" smtClean="0"/>
-              <a:t>12/17/2013</a:t>
+              <a:t>12/18/2013</a:t>
             </a:fld>
             <a:endParaRPr lang="en-US"/>
           </a:p>
@@ -7269,11 +7274,7 @@
           <a:p>
             <a:r>
               <a:rPr lang="en-US" dirty="0" smtClean="0"/>
-              <a:t>Many algorithms have a independent sequence of step</a:t>
-            </a:r>
-            <a:r>
-              <a:rPr lang="en-US" dirty="0" smtClean="0"/>
-              <a:t>s</a:t>
+              <a:t>Many algorithms have a independent sequence of steps</a:t>
             </a:r>
           </a:p>
           <a:p>
@@ -8416,8 +8417,8 @@
           </a:p>
         </p:txBody>
       </p:sp>
-      <mc:AlternateContent xmlns:mc="http://schemas.openxmlformats.org/markup-compatibility/2006">
-        <mc:Choice xmlns:a14="http://schemas.microsoft.com/office/drawing/2010/main" Requires="a14">
+      <mc:AlternateContent xmlns:mc="http://schemas.openxmlformats.org/markup-compatibility/2006" xmlns:a14="http://schemas.microsoft.com/office/drawing/2010/main">
+        <mc:Choice Requires="a14">
           <p:sp>
             <p:nvSpPr>
               <p:cNvPr id="3" name="Content Placeholder 2"/>
@@ -8628,7 +8629,7 @@
             </p:txBody>
           </p:sp>
         </mc:Choice>
-        <mc:Fallback>
+        <mc:Fallback xmlns="">
           <p:sp>
             <p:nvSpPr>
               <p:cNvPr id="3" name="Content Placeholder 2"/>
@@ -8681,6 +8682,29 @@
               <a:rPr lang="en-US" smtClean="0"/>
               <a:t>15</a:t>
             </a:fld>
+            <a:endParaRPr lang="en-US"/>
+          </a:p>
+        </p:txBody>
+      </p:sp>
+      <p:sp>
+        <p:nvSpPr>
+          <p:cNvPr id="5" name="Footer Placeholder 4"/>
+          <p:cNvSpPr>
+            <a:spLocks noGrp="1"/>
+          </p:cNvSpPr>
+          <p:nvPr>
+            <p:ph type="ftr" sz="quarter" idx="11"/>
+          </p:nvPr>
+        </p:nvSpPr>
+        <p:spPr/>
+        <p:txBody>
+          <a:bodyPr/>
+          <a:lstStyle/>
+          <a:p>
+            <a:r>
+              <a:rPr lang="en-US" smtClean="0"/>
+              <a:t>Source: Williams, Chapter 8</a:t>
+            </a:r>
             <a:endParaRPr lang="en-US"/>
           </a:p>
         </p:txBody>
@@ -8745,8 +8769,8 @@
           </a:p>
         </p:txBody>
       </p:sp>
-      <mc:AlternateContent xmlns:mc="http://schemas.openxmlformats.org/markup-compatibility/2006">
-        <mc:Choice xmlns:a14="http://schemas.microsoft.com/office/drawing/2010/main" Requires="a14">
+      <mc:AlternateContent xmlns:mc="http://schemas.openxmlformats.org/markup-compatibility/2006" xmlns:a14="http://schemas.microsoft.com/office/drawing/2010/main">
+        <mc:Choice Requires="a14">
           <p:sp>
             <p:nvSpPr>
               <p:cNvPr id="3" name="Content Placeholder 2"/>
@@ -8762,6 +8786,7 @@
               <a:bodyPr/>
               <a:lstStyle/>
               <a:p>
+                <a:pPr/>
                 <a14:m>
                   <m:oMathPara xmlns:m="http://schemas.openxmlformats.org/officeDocument/2006/math">
                     <m:oMathParaPr>
@@ -9016,7 +9041,7 @@
             </p:txBody>
           </p:sp>
         </mc:Choice>
-        <mc:Fallback>
+        <mc:Fallback xmlns="">
           <p:sp>
             <p:nvSpPr>
               <p:cNvPr id="3" name="Content Placeholder 2"/>
@@ -9180,10 +9205,983 @@
           </a:graphicData>
         </a:graphic>
       </p:graphicFrame>
+      <p:sp>
+        <p:nvSpPr>
+          <p:cNvPr id="3" name="Rectangle 2"/>
+          <p:cNvSpPr/>
+          <p:nvPr/>
+        </p:nvSpPr>
+        <p:spPr>
+          <a:xfrm>
+            <a:off x="6324600" y="304800"/>
+            <a:ext cx="2362200" cy="1371600"/>
+          </a:xfrm>
+          <a:prstGeom prst="rect">
+            <a:avLst/>
+          </a:prstGeom>
+        </p:spPr>
+        <p:style>
+          <a:lnRef idx="2">
+            <a:schemeClr val="accent1">
+              <a:shade val="50000"/>
+            </a:schemeClr>
+          </a:lnRef>
+          <a:fillRef idx="1">
+            <a:schemeClr val="accent1"/>
+          </a:fillRef>
+          <a:effectRef idx="0">
+            <a:schemeClr val="accent1"/>
+          </a:effectRef>
+          <a:fontRef idx="minor">
+            <a:schemeClr val="lt1"/>
+          </a:fontRef>
+        </p:style>
+        <p:txBody>
+          <a:bodyPr rtlCol="0" anchor="ctr"/>
+          <a:lstStyle/>
+          <a:p>
+            <a:pPr algn="ctr"/>
+            <a:r>
+              <a:rPr lang="en-US" dirty="0" smtClean="0"/>
+              <a:t>Determining the value of </a:t>
+            </a:r>
+            <a:r>
+              <a:rPr lang="en-US" i="1" dirty="0" smtClean="0"/>
+              <a:t>f</a:t>
+            </a:r>
+            <a:r>
+              <a:rPr lang="en-US" i="1" baseline="-25000" dirty="0" smtClean="0"/>
+              <a:t>s</a:t>
+            </a:r>
+            <a:r>
+              <a:rPr lang="en-US" dirty="0" smtClean="0"/>
+              <a:t> is often difficult.</a:t>
+            </a:r>
+            <a:endParaRPr lang="en-US" dirty="0"/>
+          </a:p>
+        </p:txBody>
+      </p:sp>
     </p:spTree>
     <p:extLst>
       <p:ext uri="{BB962C8B-B14F-4D97-AF65-F5344CB8AC3E}">
         <p14:creationId xmlns:p14="http://schemas.microsoft.com/office/powerpoint/2010/main" val="3386557025"/>
+      </p:ext>
+    </p:extLst>
+  </p:cSld>
+  <p:clrMapOvr>
+    <a:masterClrMapping/>
+  </p:clrMapOvr>
+  <p:timing>
+    <p:tnLst>
+      <p:par>
+        <p:cTn id="1" dur="indefinite" restart="never" nodeType="tmRoot">
+          <p:childTnLst>
+            <p:seq concurrent="1" nextAc="seek">
+              <p:cTn id="2" dur="indefinite" nodeType="mainSeq">
+                <p:childTnLst>
+                  <p:par>
+                    <p:cTn id="3" fill="hold">
+                      <p:stCondLst>
+                        <p:cond delay="indefinite"/>
+                      </p:stCondLst>
+                      <p:childTnLst>
+                        <p:par>
+                          <p:cTn id="4" fill="hold">
+                            <p:stCondLst>
+                              <p:cond delay="0"/>
+                            </p:stCondLst>
+                            <p:childTnLst>
+                              <p:par>
+                                <p:cTn id="5" presetID="1" presetClass="entr" presetSubtype="0" fill="hold" grpId="0" nodeType="clickEffect">
+                                  <p:stCondLst>
+                                    <p:cond delay="0"/>
+                                  </p:stCondLst>
+                                  <p:childTnLst>
+                                    <p:set>
+                                      <p:cBhvr>
+                                        <p:cTn id="6" dur="1" fill="hold">
+                                          <p:stCondLst>
+                                            <p:cond delay="0"/>
+                                          </p:stCondLst>
+                                        </p:cTn>
+                                        <p:tgtEl>
+                                          <p:spTgt spid="3"/>
+                                        </p:tgtEl>
+                                        <p:attrNameLst>
+                                          <p:attrName>style.visibility</p:attrName>
+                                        </p:attrNameLst>
+                                      </p:cBhvr>
+                                      <p:to>
+                                        <p:strVal val="visible"/>
+                                      </p:to>
+                                    </p:set>
+                                  </p:childTnLst>
+                                </p:cTn>
+                              </p:par>
+                            </p:childTnLst>
+                          </p:cTn>
+                        </p:par>
+                      </p:childTnLst>
+                    </p:cTn>
+                  </p:par>
+                </p:childTnLst>
+              </p:cTn>
+              <p:prevCondLst>
+                <p:cond evt="onPrev" delay="0">
+                  <p:tgtEl>
+                    <p:sldTgt/>
+                  </p:tgtEl>
+                </p:cond>
+              </p:prevCondLst>
+              <p:nextCondLst>
+                <p:cond evt="onNext" delay="0">
+                  <p:tgtEl>
+                    <p:sldTgt/>
+                  </p:tgtEl>
+                </p:cond>
+              </p:nextCondLst>
+            </p:seq>
+          </p:childTnLst>
+        </p:cTn>
+      </p:par>
+    </p:tnLst>
+    <p:bldLst>
+      <p:bldP spid="3" grpId="0" animBg="1"/>
+    </p:bldLst>
+  </p:timing>
+</p:sld>
+</file>
+
+<file path=ppt/slides/slide18.xml><?xml version="1.0" encoding="utf-8"?>
+<p:sld xmlns:a="http://schemas.openxmlformats.org/drawingml/2006/main" xmlns:r="http://schemas.openxmlformats.org/officeDocument/2006/relationships" xmlns:p="http://schemas.openxmlformats.org/presentationml/2006/main">
+  <p:cSld>
+    <p:spTree>
+      <p:nvGrpSpPr>
+        <p:cNvPr id="1" name=""/>
+        <p:cNvGrpSpPr/>
+        <p:nvPr/>
+      </p:nvGrpSpPr>
+      <p:grpSpPr>
+        <a:xfrm>
+          <a:off x="0" y="0"/>
+          <a:ext cx="0" cy="0"/>
+          <a:chOff x="0" y="0"/>
+          <a:chExt cx="0" cy="0"/>
+        </a:xfrm>
+      </p:grpSpPr>
+      <p:sp>
+        <p:nvSpPr>
+          <p:cNvPr id="2" name="Title 1"/>
+          <p:cNvSpPr>
+            <a:spLocks noGrp="1"/>
+          </p:cNvSpPr>
+          <p:nvPr>
+            <p:ph type="title"/>
+          </p:nvPr>
+        </p:nvSpPr>
+        <p:spPr/>
+        <p:txBody>
+          <a:bodyPr/>
+          <a:lstStyle/>
+          <a:p>
+            <a:r>
+              <a:rPr lang="en-US" dirty="0" smtClean="0"/>
+              <a:t>Minimizing serial code</a:t>
+            </a:r>
+            <a:endParaRPr lang="en-US" dirty="0"/>
+          </a:p>
+        </p:txBody>
+      </p:sp>
+      <p:sp>
+        <p:nvSpPr>
+          <p:cNvPr id="3" name="Content Placeholder 2"/>
+          <p:cNvSpPr>
+            <a:spLocks noGrp="1"/>
+          </p:cNvSpPr>
+          <p:nvPr>
+            <p:ph idx="1"/>
+          </p:nvPr>
+        </p:nvSpPr>
+        <p:spPr/>
+        <p:txBody>
+          <a:bodyPr/>
+          <a:lstStyle/>
+          <a:p>
+            <a:r>
+              <a:rPr lang="en-US" dirty="0" smtClean="0"/>
+              <a:t>How do we minimize </a:t>
+            </a:r>
+            <a:r>
+              <a:rPr lang="en-US" i="1" dirty="0" smtClean="0"/>
+              <a:t>f</a:t>
+            </a:r>
+            <a:r>
+              <a:rPr lang="en-US" i="1" baseline="-25000" dirty="0" smtClean="0"/>
+              <a:t>s</a:t>
+            </a:r>
+            <a:r>
+              <a:rPr lang="en-US" dirty="0" smtClean="0"/>
+              <a:t>? – Eliminate sharing</a:t>
+            </a:r>
+          </a:p>
+          <a:p>
+            <a:pPr marL="800100" lvl="1" indent="-342900"/>
+            <a:r>
+              <a:rPr lang="en-US" dirty="0" smtClean="0"/>
+              <a:t>Limit code which is I/O bound</a:t>
+            </a:r>
+          </a:p>
+          <a:p>
+            <a:pPr marL="1485900" lvl="2" indent="-342900"/>
+            <a:r>
+              <a:rPr lang="en-US" dirty="0" smtClean="0"/>
+              <a:t>I/O is usually shared</a:t>
+            </a:r>
+          </a:p>
+          <a:p>
+            <a:pPr marL="1485900" lvl="2" indent="-342900"/>
+            <a:r>
+              <a:rPr lang="en-US" dirty="0" smtClean="0"/>
+              <a:t>I/O is usually slow</a:t>
+            </a:r>
+          </a:p>
+          <a:p>
+            <a:pPr marL="800100" lvl="1" indent="-342900"/>
+            <a:r>
+              <a:rPr lang="en-US" dirty="0" smtClean="0"/>
+              <a:t>Avoid </a:t>
+            </a:r>
+            <a:r>
+              <a:rPr lang="en-US" i="1" dirty="0" smtClean="0"/>
+              <a:t>oversubscription</a:t>
+            </a:r>
+            <a:r>
+              <a:rPr lang="en-US" dirty="0" smtClean="0"/>
+              <a:t> – more threads than cores</a:t>
+            </a:r>
+          </a:p>
+          <a:p>
+            <a:pPr marL="1485900" lvl="2" indent="-342900"/>
+            <a:r>
+              <a:rPr lang="en-US" dirty="0" smtClean="0"/>
+              <a:t>Leads to time spent context switching in CPUs</a:t>
+            </a:r>
+          </a:p>
+          <a:p>
+            <a:pPr marL="1485900" lvl="2" indent="-342900"/>
+            <a:r>
+              <a:rPr lang="en-US" dirty="0" smtClean="0"/>
+              <a:t>Effectively sharing CPU registers</a:t>
+            </a:r>
+          </a:p>
+          <a:p>
+            <a:pPr marL="800100" lvl="1" indent="-342900"/>
+            <a:r>
+              <a:rPr lang="en-US" dirty="0" smtClean="0"/>
+              <a:t>Limit shared data</a:t>
+            </a:r>
+          </a:p>
+          <a:p>
+            <a:pPr marL="1485900" lvl="2" indent="-342900"/>
+            <a:r>
+              <a:rPr lang="en-US" dirty="0" smtClean="0"/>
+              <a:t>Minimize data used by the algorithm that is shared</a:t>
+            </a:r>
+          </a:p>
+          <a:p>
+            <a:pPr marL="1485900" lvl="2" indent="-342900"/>
+            <a:r>
+              <a:rPr lang="en-US" dirty="0" smtClean="0"/>
+              <a:t>Minimize the number of mutexes – they are always shared</a:t>
+            </a:r>
+          </a:p>
+          <a:p>
+            <a:pPr marL="1485900" lvl="2" indent="-342900"/>
+            <a:r>
+              <a:rPr lang="en-US" dirty="0" smtClean="0"/>
+              <a:t>Minimize the number of atomics – they are always shared</a:t>
+            </a:r>
+          </a:p>
+          <a:p>
+            <a:pPr marL="1485900" lvl="2" indent="-342900"/>
+            <a:r>
+              <a:rPr lang="en-US" dirty="0" smtClean="0"/>
+              <a:t>Understand cache size and performance</a:t>
+            </a:r>
+          </a:p>
+          <a:p>
+            <a:pPr marL="800100" lvl="1" indent="-342900"/>
+            <a:endParaRPr lang="en-US" dirty="0" smtClean="0"/>
+          </a:p>
+          <a:p>
+            <a:pPr marL="800100" lvl="1" indent="-342900"/>
+            <a:endParaRPr lang="en-US" dirty="0"/>
+          </a:p>
+        </p:txBody>
+      </p:sp>
+      <p:sp>
+        <p:nvSpPr>
+          <p:cNvPr id="4" name="Slide Number Placeholder 3"/>
+          <p:cNvSpPr>
+            <a:spLocks noGrp="1"/>
+          </p:cNvSpPr>
+          <p:nvPr>
+            <p:ph type="sldNum" sz="quarter" idx="12"/>
+          </p:nvPr>
+        </p:nvSpPr>
+        <p:spPr/>
+        <p:txBody>
+          <a:bodyPr/>
+          <a:lstStyle/>
+          <a:p>
+            <a:fld id="{6DA12B36-9664-4CB0-8B2E-F4A2F44AE97E}" type="slidenum">
+              <a:rPr lang="en-US" smtClean="0"/>
+              <a:t>18</a:t>
+            </a:fld>
+            <a:endParaRPr lang="en-US"/>
+          </a:p>
+        </p:txBody>
+      </p:sp>
+      <p:sp>
+        <p:nvSpPr>
+          <p:cNvPr id="5" name="Footer Placeholder 4"/>
+          <p:cNvSpPr>
+            <a:spLocks noGrp="1"/>
+          </p:cNvSpPr>
+          <p:nvPr>
+            <p:ph type="ftr" sz="quarter" idx="11"/>
+          </p:nvPr>
+        </p:nvSpPr>
+        <p:spPr/>
+        <p:txBody>
+          <a:bodyPr/>
+          <a:lstStyle/>
+          <a:p>
+            <a:r>
+              <a:rPr lang="en-US" smtClean="0"/>
+              <a:t>Source: Williams, Chapter 8</a:t>
+            </a:r>
+            <a:endParaRPr lang="en-US"/>
+          </a:p>
+        </p:txBody>
+      </p:sp>
+    </p:spTree>
+    <p:extLst>
+      <p:ext uri="{BB962C8B-B14F-4D97-AF65-F5344CB8AC3E}">
+        <p14:creationId xmlns:p14="http://schemas.microsoft.com/office/powerpoint/2010/main" val="2114966377"/>
+      </p:ext>
+    </p:extLst>
+  </p:cSld>
+  <p:clrMapOvr>
+    <a:masterClrMapping/>
+  </p:clrMapOvr>
+  <p:timing>
+    <p:tnLst>
+      <p:par>
+        <p:cTn id="1" dur="indefinite" restart="never" nodeType="tmRoot"/>
+      </p:par>
+    </p:tnLst>
+  </p:timing>
+</p:sld>
+</file>
+
+<file path=ppt/slides/slide19.xml><?xml version="1.0" encoding="utf-8"?>
+<p:sld xmlns:a="http://schemas.openxmlformats.org/drawingml/2006/main" xmlns:r="http://schemas.openxmlformats.org/officeDocument/2006/relationships" xmlns:p="http://schemas.openxmlformats.org/presentationml/2006/main">
+  <p:cSld>
+    <p:spTree>
+      <p:nvGrpSpPr>
+        <p:cNvPr id="1" name=""/>
+        <p:cNvGrpSpPr/>
+        <p:nvPr/>
+      </p:nvGrpSpPr>
+      <p:grpSpPr>
+        <a:xfrm>
+          <a:off x="0" y="0"/>
+          <a:ext cx="0" cy="0"/>
+          <a:chOff x="0" y="0"/>
+          <a:chExt cx="0" cy="0"/>
+        </a:xfrm>
+      </p:grpSpPr>
+      <p:sp>
+        <p:nvSpPr>
+          <p:cNvPr id="2" name="Title 1"/>
+          <p:cNvSpPr>
+            <a:spLocks noGrp="1"/>
+          </p:cNvSpPr>
+          <p:nvPr>
+            <p:ph type="title"/>
+          </p:nvPr>
+        </p:nvSpPr>
+        <p:spPr/>
+        <p:txBody>
+          <a:bodyPr>
+            <a:normAutofit fontScale="90000"/>
+          </a:bodyPr>
+          <a:lstStyle/>
+          <a:p>
+            <a:r>
+              <a:rPr lang="en-US" dirty="0" smtClean="0"/>
+              <a:t/>
+            </a:r>
+            <a:br>
+              <a:rPr lang="en-US" dirty="0" smtClean="0"/>
+            </a:br>
+            <a:r>
+              <a:rPr lang="en-US" dirty="0" smtClean="0"/>
+              <a:t>Understanding cache layout</a:t>
+            </a:r>
+            <a:endParaRPr lang="en-US" dirty="0"/>
+          </a:p>
+        </p:txBody>
+      </p:sp>
+      <p:sp>
+        <p:nvSpPr>
+          <p:cNvPr id="3" name="Content Placeholder 2"/>
+          <p:cNvSpPr>
+            <a:spLocks noGrp="1"/>
+          </p:cNvSpPr>
+          <p:nvPr>
+            <p:ph idx="1"/>
+          </p:nvPr>
+        </p:nvSpPr>
+        <p:spPr/>
+        <p:txBody>
+          <a:bodyPr/>
+          <a:lstStyle/>
+          <a:p>
+            <a:r>
+              <a:rPr lang="en-US" dirty="0" smtClean="0"/>
+              <a:t>Good cache is the key factor to improving performance of concurrent code in my experience.</a:t>
+            </a:r>
+          </a:p>
+          <a:p>
+            <a:pPr marL="800100" lvl="1" indent="-342900"/>
+            <a:r>
+              <a:rPr lang="en-US" dirty="0" smtClean="0"/>
+              <a:t>A cache is a small, fast segment of memory.</a:t>
+            </a:r>
+          </a:p>
+          <a:p>
+            <a:pPr marL="800100" lvl="1" indent="-342900"/>
+            <a:r>
+              <a:rPr lang="en-US" dirty="0" smtClean="0"/>
+              <a:t>Caches are often provided in levels, where each level is used by more processors.</a:t>
+            </a:r>
+            <a:endParaRPr lang="en-US" dirty="0"/>
+          </a:p>
+        </p:txBody>
+      </p:sp>
+      <p:sp>
+        <p:nvSpPr>
+          <p:cNvPr id="4" name="Slide Number Placeholder 3"/>
+          <p:cNvSpPr>
+            <a:spLocks noGrp="1"/>
+          </p:cNvSpPr>
+          <p:nvPr>
+            <p:ph type="sldNum" sz="quarter" idx="12"/>
+          </p:nvPr>
+        </p:nvSpPr>
+        <p:spPr/>
+        <p:txBody>
+          <a:bodyPr/>
+          <a:lstStyle/>
+          <a:p>
+            <a:fld id="{6DA12B36-9664-4CB0-8B2E-F4A2F44AE97E}" type="slidenum">
+              <a:rPr lang="en-US" smtClean="0"/>
+              <a:t>19</a:t>
+            </a:fld>
+            <a:endParaRPr lang="en-US"/>
+          </a:p>
+        </p:txBody>
+      </p:sp>
+      <p:sp>
+        <p:nvSpPr>
+          <p:cNvPr id="5" name="Rectangle 4"/>
+          <p:cNvSpPr/>
+          <p:nvPr/>
+        </p:nvSpPr>
+        <p:spPr>
+          <a:xfrm>
+            <a:off x="1752600" y="3657600"/>
+            <a:ext cx="1143000" cy="914400"/>
+          </a:xfrm>
+          <a:prstGeom prst="rect">
+            <a:avLst/>
+          </a:prstGeom>
+        </p:spPr>
+        <p:style>
+          <a:lnRef idx="2">
+            <a:schemeClr val="accent1">
+              <a:shade val="50000"/>
+            </a:schemeClr>
+          </a:lnRef>
+          <a:fillRef idx="1">
+            <a:schemeClr val="accent1"/>
+          </a:fillRef>
+          <a:effectRef idx="0">
+            <a:schemeClr val="accent1"/>
+          </a:effectRef>
+          <a:fontRef idx="minor">
+            <a:schemeClr val="lt1"/>
+          </a:fontRef>
+        </p:style>
+        <p:txBody>
+          <a:bodyPr rtlCol="0" anchor="ctr"/>
+          <a:lstStyle/>
+          <a:p>
+            <a:pPr algn="ctr"/>
+            <a:r>
+              <a:rPr lang="en-US" dirty="0" smtClean="0"/>
+              <a:t>CPU1</a:t>
+            </a:r>
+            <a:endParaRPr lang="en-US" dirty="0"/>
+          </a:p>
+        </p:txBody>
+      </p:sp>
+      <p:sp>
+        <p:nvSpPr>
+          <p:cNvPr id="6" name="Rectangle 5"/>
+          <p:cNvSpPr/>
+          <p:nvPr/>
+        </p:nvSpPr>
+        <p:spPr>
+          <a:xfrm>
+            <a:off x="3048000" y="3657600"/>
+            <a:ext cx="1143000" cy="914400"/>
+          </a:xfrm>
+          <a:prstGeom prst="rect">
+            <a:avLst/>
+          </a:prstGeom>
+        </p:spPr>
+        <p:style>
+          <a:lnRef idx="2">
+            <a:schemeClr val="accent1">
+              <a:shade val="50000"/>
+            </a:schemeClr>
+          </a:lnRef>
+          <a:fillRef idx="1">
+            <a:schemeClr val="accent1"/>
+          </a:fillRef>
+          <a:effectRef idx="0">
+            <a:schemeClr val="accent1"/>
+          </a:effectRef>
+          <a:fontRef idx="minor">
+            <a:schemeClr val="lt1"/>
+          </a:fontRef>
+        </p:style>
+        <p:txBody>
+          <a:bodyPr rtlCol="0" anchor="ctr"/>
+          <a:lstStyle/>
+          <a:p>
+            <a:pPr algn="ctr"/>
+            <a:r>
+              <a:rPr lang="en-US" dirty="0" smtClean="0"/>
+              <a:t>CPU2</a:t>
+            </a:r>
+            <a:endParaRPr lang="en-US" dirty="0"/>
+          </a:p>
+        </p:txBody>
+      </p:sp>
+      <p:sp>
+        <p:nvSpPr>
+          <p:cNvPr id="7" name="Rectangle 6"/>
+          <p:cNvSpPr/>
+          <p:nvPr/>
+        </p:nvSpPr>
+        <p:spPr>
+          <a:xfrm>
+            <a:off x="4343400" y="3657600"/>
+            <a:ext cx="1143000" cy="914400"/>
+          </a:xfrm>
+          <a:prstGeom prst="rect">
+            <a:avLst/>
+          </a:prstGeom>
+        </p:spPr>
+        <p:style>
+          <a:lnRef idx="2">
+            <a:schemeClr val="accent1">
+              <a:shade val="50000"/>
+            </a:schemeClr>
+          </a:lnRef>
+          <a:fillRef idx="1">
+            <a:schemeClr val="accent1"/>
+          </a:fillRef>
+          <a:effectRef idx="0">
+            <a:schemeClr val="accent1"/>
+          </a:effectRef>
+          <a:fontRef idx="minor">
+            <a:schemeClr val="lt1"/>
+          </a:fontRef>
+        </p:style>
+        <p:txBody>
+          <a:bodyPr rtlCol="0" anchor="ctr"/>
+          <a:lstStyle/>
+          <a:p>
+            <a:pPr algn="ctr"/>
+            <a:r>
+              <a:rPr lang="en-US" dirty="0" smtClean="0"/>
+              <a:t>CPU3</a:t>
+            </a:r>
+            <a:endParaRPr lang="en-US" dirty="0"/>
+          </a:p>
+        </p:txBody>
+      </p:sp>
+      <p:sp>
+        <p:nvSpPr>
+          <p:cNvPr id="8" name="Rectangle 7"/>
+          <p:cNvSpPr/>
+          <p:nvPr/>
+        </p:nvSpPr>
+        <p:spPr>
+          <a:xfrm>
+            <a:off x="5638800" y="3657600"/>
+            <a:ext cx="1143000" cy="914400"/>
+          </a:xfrm>
+          <a:prstGeom prst="rect">
+            <a:avLst/>
+          </a:prstGeom>
+        </p:spPr>
+        <p:style>
+          <a:lnRef idx="2">
+            <a:schemeClr val="accent1">
+              <a:shade val="50000"/>
+            </a:schemeClr>
+          </a:lnRef>
+          <a:fillRef idx="1">
+            <a:schemeClr val="accent1"/>
+          </a:fillRef>
+          <a:effectRef idx="0">
+            <a:schemeClr val="accent1"/>
+          </a:effectRef>
+          <a:fontRef idx="minor">
+            <a:schemeClr val="lt1"/>
+          </a:fontRef>
+        </p:style>
+        <p:txBody>
+          <a:bodyPr rtlCol="0" anchor="ctr"/>
+          <a:lstStyle/>
+          <a:p>
+            <a:pPr algn="ctr"/>
+            <a:r>
+              <a:rPr lang="en-US" dirty="0" smtClean="0"/>
+              <a:t>CPU4</a:t>
+            </a:r>
+            <a:endParaRPr lang="en-US" dirty="0"/>
+          </a:p>
+        </p:txBody>
+      </p:sp>
+      <p:sp>
+        <p:nvSpPr>
+          <p:cNvPr id="9" name="Rectangle 8"/>
+          <p:cNvSpPr/>
+          <p:nvPr/>
+        </p:nvSpPr>
+        <p:spPr>
+          <a:xfrm>
+            <a:off x="1752600" y="4648200"/>
+            <a:ext cx="1143000" cy="533400"/>
+          </a:xfrm>
+          <a:prstGeom prst="rect">
+            <a:avLst/>
+          </a:prstGeom>
+        </p:spPr>
+        <p:style>
+          <a:lnRef idx="2">
+            <a:schemeClr val="accent1">
+              <a:shade val="50000"/>
+            </a:schemeClr>
+          </a:lnRef>
+          <a:fillRef idx="1">
+            <a:schemeClr val="accent1"/>
+          </a:fillRef>
+          <a:effectRef idx="0">
+            <a:schemeClr val="accent1"/>
+          </a:effectRef>
+          <a:fontRef idx="minor">
+            <a:schemeClr val="lt1"/>
+          </a:fontRef>
+        </p:style>
+        <p:txBody>
+          <a:bodyPr rtlCol="0" anchor="ctr"/>
+          <a:lstStyle/>
+          <a:p>
+            <a:pPr algn="ctr"/>
+            <a:r>
+              <a:rPr lang="en-US" dirty="0" smtClean="0"/>
+              <a:t>L1 Cache</a:t>
+            </a:r>
+            <a:endParaRPr lang="en-US" dirty="0"/>
+          </a:p>
+        </p:txBody>
+      </p:sp>
+      <p:sp>
+        <p:nvSpPr>
+          <p:cNvPr id="10" name="Rectangle 9"/>
+          <p:cNvSpPr/>
+          <p:nvPr/>
+        </p:nvSpPr>
+        <p:spPr>
+          <a:xfrm>
+            <a:off x="3048000" y="4648200"/>
+            <a:ext cx="1143000" cy="533400"/>
+          </a:xfrm>
+          <a:prstGeom prst="rect">
+            <a:avLst/>
+          </a:prstGeom>
+        </p:spPr>
+        <p:style>
+          <a:lnRef idx="2">
+            <a:schemeClr val="accent1">
+              <a:shade val="50000"/>
+            </a:schemeClr>
+          </a:lnRef>
+          <a:fillRef idx="1">
+            <a:schemeClr val="accent1"/>
+          </a:fillRef>
+          <a:effectRef idx="0">
+            <a:schemeClr val="accent1"/>
+          </a:effectRef>
+          <a:fontRef idx="minor">
+            <a:schemeClr val="lt1"/>
+          </a:fontRef>
+        </p:style>
+        <p:txBody>
+          <a:bodyPr rtlCol="0" anchor="ctr"/>
+          <a:lstStyle/>
+          <a:p>
+            <a:pPr algn="ctr"/>
+            <a:r>
+              <a:rPr lang="en-US" dirty="0" smtClean="0"/>
+              <a:t>L1 Cache</a:t>
+            </a:r>
+            <a:endParaRPr lang="en-US" dirty="0"/>
+          </a:p>
+        </p:txBody>
+      </p:sp>
+      <p:sp>
+        <p:nvSpPr>
+          <p:cNvPr id="11" name="Rectangle 10"/>
+          <p:cNvSpPr/>
+          <p:nvPr/>
+        </p:nvSpPr>
+        <p:spPr>
+          <a:xfrm>
+            <a:off x="4343400" y="4648200"/>
+            <a:ext cx="1143000" cy="533400"/>
+          </a:xfrm>
+          <a:prstGeom prst="rect">
+            <a:avLst/>
+          </a:prstGeom>
+        </p:spPr>
+        <p:style>
+          <a:lnRef idx="2">
+            <a:schemeClr val="accent1">
+              <a:shade val="50000"/>
+            </a:schemeClr>
+          </a:lnRef>
+          <a:fillRef idx="1">
+            <a:schemeClr val="accent1"/>
+          </a:fillRef>
+          <a:effectRef idx="0">
+            <a:schemeClr val="accent1"/>
+          </a:effectRef>
+          <a:fontRef idx="minor">
+            <a:schemeClr val="lt1"/>
+          </a:fontRef>
+        </p:style>
+        <p:txBody>
+          <a:bodyPr rtlCol="0" anchor="ctr"/>
+          <a:lstStyle/>
+          <a:p>
+            <a:pPr algn="ctr"/>
+            <a:r>
+              <a:rPr lang="en-US" dirty="0" smtClean="0"/>
+              <a:t>L1 Cache</a:t>
+            </a:r>
+            <a:endParaRPr lang="en-US" dirty="0"/>
+          </a:p>
+        </p:txBody>
+      </p:sp>
+      <p:sp>
+        <p:nvSpPr>
+          <p:cNvPr id="12" name="Rectangle 11"/>
+          <p:cNvSpPr/>
+          <p:nvPr/>
+        </p:nvSpPr>
+        <p:spPr>
+          <a:xfrm>
+            <a:off x="5638800" y="4648200"/>
+            <a:ext cx="1143000" cy="533400"/>
+          </a:xfrm>
+          <a:prstGeom prst="rect">
+            <a:avLst/>
+          </a:prstGeom>
+        </p:spPr>
+        <p:style>
+          <a:lnRef idx="2">
+            <a:schemeClr val="accent1">
+              <a:shade val="50000"/>
+            </a:schemeClr>
+          </a:lnRef>
+          <a:fillRef idx="1">
+            <a:schemeClr val="accent1"/>
+          </a:fillRef>
+          <a:effectRef idx="0">
+            <a:schemeClr val="accent1"/>
+          </a:effectRef>
+          <a:fontRef idx="minor">
+            <a:schemeClr val="lt1"/>
+          </a:fontRef>
+        </p:style>
+        <p:txBody>
+          <a:bodyPr rtlCol="0" anchor="ctr"/>
+          <a:lstStyle/>
+          <a:p>
+            <a:pPr algn="ctr"/>
+            <a:r>
+              <a:rPr lang="en-US" dirty="0" smtClean="0"/>
+              <a:t>L1 Cache</a:t>
+            </a:r>
+            <a:endParaRPr lang="en-US" dirty="0"/>
+          </a:p>
+        </p:txBody>
+      </p:sp>
+      <p:sp>
+        <p:nvSpPr>
+          <p:cNvPr id="13" name="Rectangle 12"/>
+          <p:cNvSpPr/>
+          <p:nvPr/>
+        </p:nvSpPr>
+        <p:spPr>
+          <a:xfrm>
+            <a:off x="1752600" y="5257800"/>
+            <a:ext cx="2438400" cy="609600"/>
+          </a:xfrm>
+          <a:prstGeom prst="rect">
+            <a:avLst/>
+          </a:prstGeom>
+        </p:spPr>
+        <p:style>
+          <a:lnRef idx="2">
+            <a:schemeClr val="accent1">
+              <a:shade val="50000"/>
+            </a:schemeClr>
+          </a:lnRef>
+          <a:fillRef idx="1">
+            <a:schemeClr val="accent1"/>
+          </a:fillRef>
+          <a:effectRef idx="0">
+            <a:schemeClr val="accent1"/>
+          </a:effectRef>
+          <a:fontRef idx="minor">
+            <a:schemeClr val="lt1"/>
+          </a:fontRef>
+        </p:style>
+        <p:txBody>
+          <a:bodyPr rtlCol="0" anchor="ctr"/>
+          <a:lstStyle/>
+          <a:p>
+            <a:pPr algn="ctr"/>
+            <a:r>
+              <a:rPr lang="en-US" dirty="0" smtClean="0"/>
+              <a:t>L2 Cache</a:t>
+            </a:r>
+            <a:endParaRPr lang="en-US" dirty="0"/>
+          </a:p>
+        </p:txBody>
+      </p:sp>
+      <p:sp>
+        <p:nvSpPr>
+          <p:cNvPr id="14" name="Rectangle 13"/>
+          <p:cNvSpPr/>
+          <p:nvPr/>
+        </p:nvSpPr>
+        <p:spPr>
+          <a:xfrm>
+            <a:off x="4343400" y="5257800"/>
+            <a:ext cx="2438400" cy="609600"/>
+          </a:xfrm>
+          <a:prstGeom prst="rect">
+            <a:avLst/>
+          </a:prstGeom>
+        </p:spPr>
+        <p:style>
+          <a:lnRef idx="2">
+            <a:schemeClr val="accent1">
+              <a:shade val="50000"/>
+            </a:schemeClr>
+          </a:lnRef>
+          <a:fillRef idx="1">
+            <a:schemeClr val="accent1"/>
+          </a:fillRef>
+          <a:effectRef idx="0">
+            <a:schemeClr val="accent1"/>
+          </a:effectRef>
+          <a:fontRef idx="minor">
+            <a:schemeClr val="lt1"/>
+          </a:fontRef>
+        </p:style>
+        <p:txBody>
+          <a:bodyPr rtlCol="0" anchor="ctr"/>
+          <a:lstStyle/>
+          <a:p>
+            <a:pPr algn="ctr"/>
+            <a:r>
+              <a:rPr lang="en-US" dirty="0" smtClean="0"/>
+              <a:t>L2 Cache</a:t>
+            </a:r>
+            <a:endParaRPr lang="en-US" dirty="0"/>
+          </a:p>
+        </p:txBody>
+      </p:sp>
+      <p:sp>
+        <p:nvSpPr>
+          <p:cNvPr id="15" name="Rectangle 14"/>
+          <p:cNvSpPr/>
+          <p:nvPr/>
+        </p:nvSpPr>
+        <p:spPr>
+          <a:xfrm>
+            <a:off x="1752600" y="5943600"/>
+            <a:ext cx="5029200" cy="533400"/>
+          </a:xfrm>
+          <a:prstGeom prst="rect">
+            <a:avLst/>
+          </a:prstGeom>
+        </p:spPr>
+        <p:style>
+          <a:lnRef idx="2">
+            <a:schemeClr val="accent1">
+              <a:shade val="50000"/>
+            </a:schemeClr>
+          </a:lnRef>
+          <a:fillRef idx="1">
+            <a:schemeClr val="accent1"/>
+          </a:fillRef>
+          <a:effectRef idx="0">
+            <a:schemeClr val="accent1"/>
+          </a:effectRef>
+          <a:fontRef idx="minor">
+            <a:schemeClr val="lt1"/>
+          </a:fontRef>
+        </p:style>
+        <p:txBody>
+          <a:bodyPr rtlCol="0" anchor="ctr"/>
+          <a:lstStyle/>
+          <a:p>
+            <a:pPr algn="ctr"/>
+            <a:r>
+              <a:rPr lang="en-US" dirty="0" smtClean="0"/>
+              <a:t>L3 Cache</a:t>
+            </a:r>
+            <a:endParaRPr lang="en-US" dirty="0"/>
+          </a:p>
+        </p:txBody>
+      </p:sp>
+    </p:spTree>
+    <p:extLst>
+      <p:ext uri="{BB962C8B-B14F-4D97-AF65-F5344CB8AC3E}">
+        <p14:creationId xmlns:p14="http://schemas.microsoft.com/office/powerpoint/2010/main" val="1997634152"/>
       </p:ext>
     </p:extLst>
   </p:cSld>
@@ -9311,6 +10309,1496 @@
     <p:extLst>
       <p:ext uri="{BB962C8B-B14F-4D97-AF65-F5344CB8AC3E}">
         <p14:creationId xmlns:p14="http://schemas.microsoft.com/office/powerpoint/2010/main" val="3237691251"/>
+      </p:ext>
+    </p:extLst>
+  </p:cSld>
+  <p:clrMapOvr>
+    <a:masterClrMapping/>
+  </p:clrMapOvr>
+  <p:timing>
+    <p:tnLst>
+      <p:par>
+        <p:cTn id="1" dur="indefinite" restart="never" nodeType="tmRoot"/>
+      </p:par>
+    </p:tnLst>
+  </p:timing>
+</p:sld>
+</file>
+
+<file path=ppt/slides/slide20.xml><?xml version="1.0" encoding="utf-8"?>
+<p:sld xmlns:a="http://schemas.openxmlformats.org/drawingml/2006/main" xmlns:r="http://schemas.openxmlformats.org/officeDocument/2006/relationships" xmlns:p="http://schemas.openxmlformats.org/presentationml/2006/main">
+  <p:cSld>
+    <p:spTree>
+      <p:nvGrpSpPr>
+        <p:cNvPr id="1" name=""/>
+        <p:cNvGrpSpPr/>
+        <p:nvPr/>
+      </p:nvGrpSpPr>
+      <p:grpSpPr>
+        <a:xfrm>
+          <a:off x="0" y="0"/>
+          <a:ext cx="0" cy="0"/>
+          <a:chOff x="0" y="0"/>
+          <a:chExt cx="0" cy="0"/>
+        </a:xfrm>
+      </p:grpSpPr>
+      <p:sp>
+        <p:nvSpPr>
+          <p:cNvPr id="2" name="Title 1"/>
+          <p:cNvSpPr>
+            <a:spLocks noGrp="1"/>
+          </p:cNvSpPr>
+          <p:nvPr>
+            <p:ph type="title"/>
+          </p:nvPr>
+        </p:nvSpPr>
+        <p:spPr/>
+        <p:txBody>
+          <a:bodyPr/>
+          <a:lstStyle/>
+          <a:p>
+            <a:r>
+              <a:rPr lang="en-US" dirty="0" smtClean="0"/>
+              <a:t>Understanding cache layout</a:t>
+            </a:r>
+            <a:endParaRPr lang="en-US" dirty="0"/>
+          </a:p>
+        </p:txBody>
+      </p:sp>
+      <p:sp>
+        <p:nvSpPr>
+          <p:cNvPr id="3" name="Content Placeholder 2"/>
+          <p:cNvSpPr>
+            <a:spLocks noGrp="1"/>
+          </p:cNvSpPr>
+          <p:nvPr>
+            <p:ph idx="1"/>
+          </p:nvPr>
+        </p:nvSpPr>
+        <p:spPr/>
+        <p:txBody>
+          <a:bodyPr/>
+          <a:lstStyle/>
+          <a:p>
+            <a:r>
+              <a:rPr lang="en-US" dirty="0" smtClean="0"/>
+              <a:t>Caches operate on </a:t>
+            </a:r>
+            <a:r>
+              <a:rPr lang="en-US" i="1" dirty="0" smtClean="0"/>
+              <a:t>cache lines</a:t>
+            </a:r>
+            <a:r>
+              <a:rPr lang="en-US" dirty="0" smtClean="0"/>
+              <a:t>, usually 32 or 64 bytes segments of memory.</a:t>
+            </a:r>
+            <a:endParaRPr lang="en-US" i="1" dirty="0"/>
+          </a:p>
+        </p:txBody>
+      </p:sp>
+      <p:sp>
+        <p:nvSpPr>
+          <p:cNvPr id="4" name="Slide Number Placeholder 3"/>
+          <p:cNvSpPr>
+            <a:spLocks noGrp="1"/>
+          </p:cNvSpPr>
+          <p:nvPr>
+            <p:ph type="sldNum" sz="quarter" idx="12"/>
+          </p:nvPr>
+        </p:nvSpPr>
+        <p:spPr/>
+        <p:txBody>
+          <a:bodyPr/>
+          <a:lstStyle/>
+          <a:p>
+            <a:fld id="{6DA12B36-9664-4CB0-8B2E-F4A2F44AE97E}" type="slidenum">
+              <a:rPr lang="en-US" smtClean="0"/>
+              <a:t>20</a:t>
+            </a:fld>
+            <a:endParaRPr lang="en-US"/>
+          </a:p>
+        </p:txBody>
+      </p:sp>
+      <p:graphicFrame>
+        <p:nvGraphicFramePr>
+          <p:cNvPr id="5" name="Table 4"/>
+          <p:cNvGraphicFramePr>
+            <a:graphicFrameLocks noGrp="1"/>
+          </p:cNvGraphicFramePr>
+          <p:nvPr>
+            <p:extLst>
+              <p:ext uri="{D42A27DB-BD31-4B8C-83A1-F6EECF244321}">
+                <p14:modId xmlns:p14="http://schemas.microsoft.com/office/powerpoint/2010/main" val="1105906628"/>
+              </p:ext>
+            </p:extLst>
+          </p:nvPr>
+        </p:nvGraphicFramePr>
+        <p:xfrm>
+          <a:off x="1143000" y="2743200"/>
+          <a:ext cx="6096000" cy="1483360"/>
+        </p:xfrm>
+        <a:graphic>
+          <a:graphicData uri="http://schemas.openxmlformats.org/drawingml/2006/table">
+            <a:tbl>
+              <a:tblPr firstRow="1" bandRow="1">
+                <a:tableStyleId>{5940675A-B579-460E-94D1-54222C63F5DA}</a:tableStyleId>
+              </a:tblPr>
+              <a:tblGrid>
+                <a:gridCol w="762000"/>
+                <a:gridCol w="762000"/>
+                <a:gridCol w="762000"/>
+                <a:gridCol w="762000"/>
+                <a:gridCol w="762000"/>
+                <a:gridCol w="762000"/>
+                <a:gridCol w="762000"/>
+                <a:gridCol w="762000"/>
+              </a:tblGrid>
+              <a:tr h="370840">
+                <a:tc>
+                  <a:txBody>
+                    <a:bodyPr/>
+                    <a:lstStyle/>
+                    <a:p>
+                      <a:r>
+                        <a:rPr lang="en-US" dirty="0" smtClean="0"/>
+                        <a:t>23</a:t>
+                      </a:r>
+                      <a:endParaRPr lang="en-US" dirty="0"/>
+                    </a:p>
+                  </a:txBody>
+                  <a:tcPr/>
+                </a:tc>
+                <a:tc>
+                  <a:txBody>
+                    <a:bodyPr/>
+                    <a:lstStyle/>
+                    <a:p>
+                      <a:r>
+                        <a:rPr lang="en-US" dirty="0" smtClean="0"/>
+                        <a:t>53</a:t>
+                      </a:r>
+                      <a:endParaRPr lang="en-US" dirty="0"/>
+                    </a:p>
+                  </a:txBody>
+                  <a:tcPr/>
+                </a:tc>
+                <a:tc>
+                  <a:txBody>
+                    <a:bodyPr/>
+                    <a:lstStyle/>
+                    <a:p>
+                      <a:r>
+                        <a:rPr lang="en-US" dirty="0" smtClean="0"/>
+                        <a:t>8</a:t>
+                      </a:r>
+                      <a:endParaRPr lang="en-US" dirty="0"/>
+                    </a:p>
+                  </a:txBody>
+                  <a:tcPr/>
+                </a:tc>
+                <a:tc>
+                  <a:txBody>
+                    <a:bodyPr/>
+                    <a:lstStyle/>
+                    <a:p>
+                      <a:r>
+                        <a:rPr lang="en-US" dirty="0" smtClean="0"/>
+                        <a:t>886</a:t>
+                      </a:r>
+                      <a:endParaRPr lang="en-US" dirty="0"/>
+                    </a:p>
+                  </a:txBody>
+                  <a:tcPr/>
+                </a:tc>
+                <a:tc>
+                  <a:txBody>
+                    <a:bodyPr/>
+                    <a:lstStyle/>
+                    <a:p>
+                      <a:r>
+                        <a:rPr lang="en-US" dirty="0" smtClean="0"/>
+                        <a:t>7456</a:t>
+                      </a:r>
+                      <a:endParaRPr lang="en-US" dirty="0"/>
+                    </a:p>
+                  </a:txBody>
+                  <a:tcPr/>
+                </a:tc>
+                <a:tc>
+                  <a:txBody>
+                    <a:bodyPr/>
+                    <a:lstStyle/>
+                    <a:p>
+                      <a:r>
+                        <a:rPr lang="en-US" dirty="0" smtClean="0"/>
+                        <a:t>3</a:t>
+                      </a:r>
+                      <a:endParaRPr lang="en-US" dirty="0"/>
+                    </a:p>
+                  </a:txBody>
+                  <a:tcPr/>
+                </a:tc>
+                <a:tc>
+                  <a:txBody>
+                    <a:bodyPr/>
+                    <a:lstStyle/>
+                    <a:p>
+                      <a:r>
+                        <a:rPr lang="en-US" dirty="0" smtClean="0"/>
+                        <a:t>-4</a:t>
+                      </a:r>
+                      <a:endParaRPr lang="en-US" dirty="0"/>
+                    </a:p>
+                  </a:txBody>
+                  <a:tcPr/>
+                </a:tc>
+                <a:tc>
+                  <a:txBody>
+                    <a:bodyPr/>
+                    <a:lstStyle/>
+                    <a:p>
+                      <a:r>
+                        <a:rPr lang="en-US" dirty="0" smtClean="0"/>
+                        <a:t>18</a:t>
+                      </a:r>
+                      <a:endParaRPr lang="en-US" dirty="0"/>
+                    </a:p>
+                  </a:txBody>
+                  <a:tcPr/>
+                </a:tc>
+              </a:tr>
+              <a:tr h="370840">
+                <a:tc>
+                  <a:txBody>
+                    <a:bodyPr/>
+                    <a:lstStyle/>
+                    <a:p>
+                      <a:r>
+                        <a:rPr lang="en-US" dirty="0" smtClean="0"/>
+                        <a:t>H</a:t>
+                      </a:r>
+                      <a:endParaRPr lang="en-US" dirty="0"/>
+                    </a:p>
+                  </a:txBody>
+                  <a:tcPr/>
+                </a:tc>
+                <a:tc>
+                  <a:txBody>
+                    <a:bodyPr/>
+                    <a:lstStyle/>
+                    <a:p>
+                      <a:r>
+                        <a:rPr lang="en-US" dirty="0" smtClean="0"/>
+                        <a:t>E</a:t>
+                      </a:r>
+                      <a:endParaRPr lang="en-US" dirty="0"/>
+                    </a:p>
+                  </a:txBody>
+                  <a:tcPr/>
+                </a:tc>
+                <a:tc>
+                  <a:txBody>
+                    <a:bodyPr/>
+                    <a:lstStyle/>
+                    <a:p>
+                      <a:r>
+                        <a:rPr lang="en-US" dirty="0" smtClean="0"/>
+                        <a:t>L</a:t>
+                      </a:r>
+                      <a:endParaRPr lang="en-US" dirty="0"/>
+                    </a:p>
+                  </a:txBody>
+                  <a:tcPr/>
+                </a:tc>
+                <a:tc>
+                  <a:txBody>
+                    <a:bodyPr/>
+                    <a:lstStyle/>
+                    <a:p>
+                      <a:r>
+                        <a:rPr lang="en-US" dirty="0" smtClean="0"/>
+                        <a:t>L</a:t>
+                      </a:r>
+                      <a:endParaRPr lang="en-US" dirty="0"/>
+                    </a:p>
+                  </a:txBody>
+                  <a:tcPr/>
+                </a:tc>
+                <a:tc>
+                  <a:txBody>
+                    <a:bodyPr/>
+                    <a:lstStyle/>
+                    <a:p>
+                      <a:r>
+                        <a:rPr lang="en-US" dirty="0" smtClean="0"/>
+                        <a:t>O</a:t>
+                      </a:r>
+                      <a:endParaRPr lang="en-US" dirty="0"/>
+                    </a:p>
+                  </a:txBody>
+                  <a:tcPr/>
+                </a:tc>
+                <a:tc>
+                  <a:txBody>
+                    <a:bodyPr/>
+                    <a:lstStyle/>
+                    <a:p>
+                      <a:endParaRPr lang="en-US" dirty="0"/>
+                    </a:p>
+                  </a:txBody>
+                  <a:tcPr/>
+                </a:tc>
+                <a:tc>
+                  <a:txBody>
+                    <a:bodyPr/>
+                    <a:lstStyle/>
+                    <a:p>
+                      <a:r>
+                        <a:rPr lang="en-US" dirty="0" smtClean="0"/>
+                        <a:t>W</a:t>
+                      </a:r>
+                      <a:endParaRPr lang="en-US" dirty="0"/>
+                    </a:p>
+                  </a:txBody>
+                  <a:tcPr/>
+                </a:tc>
+                <a:tc>
+                  <a:txBody>
+                    <a:bodyPr/>
+                    <a:lstStyle/>
+                    <a:p>
+                      <a:r>
+                        <a:rPr lang="en-US" dirty="0" smtClean="0"/>
+                        <a:t>O</a:t>
+                      </a:r>
+                      <a:endParaRPr lang="en-US" dirty="0"/>
+                    </a:p>
+                  </a:txBody>
+                  <a:tcPr/>
+                </a:tc>
+              </a:tr>
+              <a:tr h="370840">
+                <a:tc>
+                  <a:txBody>
+                    <a:bodyPr/>
+                    <a:lstStyle/>
+                    <a:p>
+                      <a:r>
+                        <a:rPr lang="en-US" dirty="0" smtClean="0"/>
+                        <a:t>R</a:t>
+                      </a:r>
+                      <a:endParaRPr lang="en-US" dirty="0"/>
+                    </a:p>
+                  </a:txBody>
+                  <a:tcPr/>
+                </a:tc>
+                <a:tc>
+                  <a:txBody>
+                    <a:bodyPr/>
+                    <a:lstStyle/>
+                    <a:p>
+                      <a:r>
+                        <a:rPr lang="en-US" dirty="0" smtClean="0"/>
+                        <a:t>L</a:t>
+                      </a:r>
+                      <a:endParaRPr lang="en-US" dirty="0"/>
+                    </a:p>
+                  </a:txBody>
+                  <a:tcPr/>
+                </a:tc>
+                <a:tc>
+                  <a:txBody>
+                    <a:bodyPr/>
+                    <a:lstStyle/>
+                    <a:p>
+                      <a:r>
+                        <a:rPr lang="en-US" dirty="0" smtClean="0"/>
+                        <a:t>D</a:t>
+                      </a:r>
+                      <a:endParaRPr lang="en-US" dirty="0"/>
+                    </a:p>
+                  </a:txBody>
+                  <a:tcPr/>
+                </a:tc>
+                <a:tc>
+                  <a:txBody>
+                    <a:bodyPr/>
+                    <a:lstStyle/>
+                    <a:p>
+                      <a:r>
+                        <a:rPr lang="en-US" dirty="0" smtClean="0"/>
+                        <a:t>!</a:t>
+                      </a:r>
+                      <a:endParaRPr lang="en-US" dirty="0"/>
+                    </a:p>
+                  </a:txBody>
+                  <a:tcPr/>
+                </a:tc>
+                <a:tc>
+                  <a:txBody>
+                    <a:bodyPr/>
+                    <a:lstStyle/>
+                    <a:p>
+                      <a:r>
+                        <a:rPr lang="en-US" dirty="0" smtClean="0"/>
+                        <a:t>0</a:t>
+                      </a:r>
+                      <a:endParaRPr lang="en-US" dirty="0"/>
+                    </a:p>
+                  </a:txBody>
+                  <a:tcPr/>
+                </a:tc>
+                <a:tc>
+                  <a:txBody>
+                    <a:bodyPr/>
+                    <a:lstStyle/>
+                    <a:p>
+                      <a:r>
+                        <a:rPr lang="en-US" dirty="0" smtClean="0"/>
+                        <a:t>15</a:t>
+                      </a:r>
+                      <a:endParaRPr lang="en-US" dirty="0"/>
+                    </a:p>
+                  </a:txBody>
+                  <a:tcPr/>
+                </a:tc>
+                <a:tc>
+                  <a:txBody>
+                    <a:bodyPr/>
+                    <a:lstStyle/>
+                    <a:p>
+                      <a:r>
+                        <a:rPr lang="en-US" dirty="0" smtClean="0"/>
+                        <a:t>2.3</a:t>
+                      </a:r>
+                      <a:endParaRPr lang="en-US" dirty="0"/>
+                    </a:p>
+                  </a:txBody>
+                  <a:tcPr/>
+                </a:tc>
+                <a:tc>
+                  <a:txBody>
+                    <a:bodyPr/>
+                    <a:lstStyle/>
+                    <a:p>
+                      <a:r>
+                        <a:rPr lang="en-US" dirty="0" smtClean="0"/>
+                        <a:t>-90.1</a:t>
+                      </a:r>
+                      <a:endParaRPr lang="en-US" dirty="0"/>
+                    </a:p>
+                  </a:txBody>
+                  <a:tcPr/>
+                </a:tc>
+              </a:tr>
+              <a:tr h="370840">
+                <a:tc>
+                  <a:txBody>
+                    <a:bodyPr/>
+                    <a:lstStyle/>
+                    <a:p>
+                      <a:r>
+                        <a:rPr lang="en-US" dirty="0" smtClean="0"/>
+                        <a:t>30</a:t>
+                      </a:r>
+                      <a:endParaRPr lang="en-US" dirty="0"/>
+                    </a:p>
+                  </a:txBody>
+                  <a:tcPr/>
+                </a:tc>
+                <a:tc>
+                  <a:txBody>
+                    <a:bodyPr/>
+                    <a:lstStyle/>
+                    <a:p>
+                      <a:r>
+                        <a:rPr lang="en-US" dirty="0" smtClean="0"/>
+                        <a:t>18</a:t>
+                      </a:r>
+                      <a:endParaRPr lang="en-US" dirty="0"/>
+                    </a:p>
+                  </a:txBody>
+                  <a:tcPr/>
+                </a:tc>
+                <a:tc>
+                  <a:txBody>
+                    <a:bodyPr/>
+                    <a:lstStyle/>
+                    <a:p>
+                      <a:r>
+                        <a:rPr lang="en-US" dirty="0" smtClean="0"/>
+                        <a:t>992</a:t>
+                      </a:r>
+                      <a:endParaRPr lang="en-US" dirty="0"/>
+                    </a:p>
+                  </a:txBody>
+                  <a:tcPr/>
+                </a:tc>
+                <a:tc>
+                  <a:txBody>
+                    <a:bodyPr/>
+                    <a:lstStyle/>
+                    <a:p>
+                      <a:r>
+                        <a:rPr lang="en-US" dirty="0" smtClean="0"/>
+                        <a:t>-421</a:t>
+                      </a:r>
+                      <a:endParaRPr lang="en-US" dirty="0"/>
+                    </a:p>
+                  </a:txBody>
+                  <a:tcPr/>
+                </a:tc>
+                <a:tc>
+                  <a:txBody>
+                    <a:bodyPr/>
+                    <a:lstStyle/>
+                    <a:p>
+                      <a:r>
+                        <a:rPr lang="en-US" dirty="0" smtClean="0"/>
+                        <a:t>6</a:t>
+                      </a:r>
+                      <a:endParaRPr lang="en-US" dirty="0"/>
+                    </a:p>
+                  </a:txBody>
+                  <a:tcPr/>
+                </a:tc>
+                <a:tc>
+                  <a:txBody>
+                    <a:bodyPr/>
+                    <a:lstStyle/>
+                    <a:p>
+                      <a:r>
+                        <a:rPr lang="en-US" dirty="0" smtClean="0"/>
+                        <a:t>7</a:t>
+                      </a:r>
+                      <a:endParaRPr lang="en-US" dirty="0"/>
+                    </a:p>
+                  </a:txBody>
+                  <a:tcPr/>
+                </a:tc>
+                <a:tc>
+                  <a:txBody>
+                    <a:bodyPr/>
+                    <a:lstStyle/>
+                    <a:p>
+                      <a:r>
+                        <a:rPr lang="en-US" dirty="0" smtClean="0"/>
+                        <a:t>8</a:t>
+                      </a:r>
+                      <a:endParaRPr lang="en-US" dirty="0"/>
+                    </a:p>
+                  </a:txBody>
+                  <a:tcPr/>
+                </a:tc>
+                <a:tc>
+                  <a:txBody>
+                    <a:bodyPr/>
+                    <a:lstStyle/>
+                    <a:p>
+                      <a:r>
+                        <a:rPr lang="en-US" dirty="0" smtClean="0"/>
+                        <a:t>9</a:t>
+                      </a:r>
+                      <a:endParaRPr lang="en-US" dirty="0"/>
+                    </a:p>
+                  </a:txBody>
+                  <a:tcPr/>
+                </a:tc>
+              </a:tr>
+            </a:tbl>
+          </a:graphicData>
+        </a:graphic>
+      </p:graphicFrame>
+      <p:graphicFrame>
+        <p:nvGraphicFramePr>
+          <p:cNvPr id="6" name="Table 5"/>
+          <p:cNvGraphicFramePr>
+            <a:graphicFrameLocks noGrp="1"/>
+          </p:cNvGraphicFramePr>
+          <p:nvPr>
+            <p:extLst>
+              <p:ext uri="{D42A27DB-BD31-4B8C-83A1-F6EECF244321}">
+                <p14:modId xmlns:p14="http://schemas.microsoft.com/office/powerpoint/2010/main" val="900518355"/>
+              </p:ext>
+            </p:extLst>
+          </p:nvPr>
+        </p:nvGraphicFramePr>
+        <p:xfrm>
+          <a:off x="1143000" y="5115560"/>
+          <a:ext cx="6096000" cy="370840"/>
+        </p:xfrm>
+        <a:graphic>
+          <a:graphicData uri="http://schemas.openxmlformats.org/drawingml/2006/table">
+            <a:tbl>
+              <a:tblPr firstRow="1" bandRow="1">
+                <a:tableStyleId>{5940675A-B579-460E-94D1-54222C63F5DA}</a:tableStyleId>
+              </a:tblPr>
+              <a:tblGrid>
+                <a:gridCol w="762000"/>
+                <a:gridCol w="762000"/>
+                <a:gridCol w="762000"/>
+                <a:gridCol w="762000"/>
+                <a:gridCol w="762000"/>
+                <a:gridCol w="762000"/>
+                <a:gridCol w="762000"/>
+                <a:gridCol w="762000"/>
+              </a:tblGrid>
+              <a:tr h="370840">
+                <a:tc>
+                  <a:txBody>
+                    <a:bodyPr/>
+                    <a:lstStyle/>
+                    <a:p>
+                      <a:r>
+                        <a:rPr lang="en-US" dirty="0" smtClean="0"/>
+                        <a:t>23</a:t>
+                      </a:r>
+                      <a:endParaRPr lang="en-US" dirty="0"/>
+                    </a:p>
+                  </a:txBody>
+                  <a:tcPr/>
+                </a:tc>
+                <a:tc>
+                  <a:txBody>
+                    <a:bodyPr/>
+                    <a:lstStyle/>
+                    <a:p>
+                      <a:r>
+                        <a:rPr lang="en-US" dirty="0" smtClean="0"/>
+                        <a:t>53</a:t>
+                      </a:r>
+                      <a:endParaRPr lang="en-US" dirty="0"/>
+                    </a:p>
+                  </a:txBody>
+                  <a:tcPr/>
+                </a:tc>
+                <a:tc>
+                  <a:txBody>
+                    <a:bodyPr/>
+                    <a:lstStyle/>
+                    <a:p>
+                      <a:r>
+                        <a:rPr lang="en-US" dirty="0" smtClean="0"/>
+                        <a:t>8</a:t>
+                      </a:r>
+                      <a:endParaRPr lang="en-US" dirty="0"/>
+                    </a:p>
+                  </a:txBody>
+                  <a:tcPr/>
+                </a:tc>
+                <a:tc>
+                  <a:txBody>
+                    <a:bodyPr/>
+                    <a:lstStyle/>
+                    <a:p>
+                      <a:r>
+                        <a:rPr lang="en-US" dirty="0" smtClean="0"/>
+                        <a:t>886</a:t>
+                      </a:r>
+                      <a:endParaRPr lang="en-US" dirty="0"/>
+                    </a:p>
+                  </a:txBody>
+                  <a:tcPr/>
+                </a:tc>
+                <a:tc>
+                  <a:txBody>
+                    <a:bodyPr/>
+                    <a:lstStyle/>
+                    <a:p>
+                      <a:r>
+                        <a:rPr lang="en-US" dirty="0" smtClean="0"/>
+                        <a:t>7456</a:t>
+                      </a:r>
+                      <a:endParaRPr lang="en-US" dirty="0"/>
+                    </a:p>
+                  </a:txBody>
+                  <a:tcPr/>
+                </a:tc>
+                <a:tc>
+                  <a:txBody>
+                    <a:bodyPr/>
+                    <a:lstStyle/>
+                    <a:p>
+                      <a:r>
+                        <a:rPr lang="en-US" dirty="0" smtClean="0"/>
+                        <a:t>3</a:t>
+                      </a:r>
+                      <a:endParaRPr lang="en-US" dirty="0"/>
+                    </a:p>
+                  </a:txBody>
+                  <a:tcPr/>
+                </a:tc>
+                <a:tc>
+                  <a:txBody>
+                    <a:bodyPr/>
+                    <a:lstStyle/>
+                    <a:p>
+                      <a:r>
+                        <a:rPr lang="en-US" dirty="0" smtClean="0"/>
+                        <a:t>-4</a:t>
+                      </a:r>
+                      <a:endParaRPr lang="en-US" dirty="0"/>
+                    </a:p>
+                  </a:txBody>
+                  <a:tcPr/>
+                </a:tc>
+                <a:tc>
+                  <a:txBody>
+                    <a:bodyPr/>
+                    <a:lstStyle/>
+                    <a:p>
+                      <a:r>
+                        <a:rPr lang="en-US" dirty="0" smtClean="0"/>
+                        <a:t>18</a:t>
+                      </a:r>
+                      <a:endParaRPr lang="en-US" dirty="0"/>
+                    </a:p>
+                  </a:txBody>
+                  <a:tcPr/>
+                </a:tc>
+              </a:tr>
+            </a:tbl>
+          </a:graphicData>
+        </a:graphic>
+      </p:graphicFrame>
+      <p:cxnSp>
+        <p:nvCxnSpPr>
+          <p:cNvPr id="8" name="Straight Arrow Connector 7"/>
+          <p:cNvCxnSpPr/>
+          <p:nvPr/>
+        </p:nvCxnSpPr>
+        <p:spPr>
+          <a:xfrm>
+            <a:off x="4191000" y="4267200"/>
+            <a:ext cx="0" cy="762000"/>
+          </a:xfrm>
+          <a:prstGeom prst="straightConnector1">
+            <a:avLst/>
+          </a:prstGeom>
+          <a:ln>
+            <a:tailEnd type="arrow"/>
+          </a:ln>
+        </p:spPr>
+        <p:style>
+          <a:lnRef idx="3">
+            <a:schemeClr val="accent5"/>
+          </a:lnRef>
+          <a:fillRef idx="0">
+            <a:schemeClr val="accent5"/>
+          </a:fillRef>
+          <a:effectRef idx="2">
+            <a:schemeClr val="accent5"/>
+          </a:effectRef>
+          <a:fontRef idx="minor">
+            <a:schemeClr val="tx1"/>
+          </a:fontRef>
+        </p:style>
+      </p:cxnSp>
+      <p:sp>
+        <p:nvSpPr>
+          <p:cNvPr id="10" name="Rectangle 9"/>
+          <p:cNvSpPr/>
+          <p:nvPr/>
+        </p:nvSpPr>
+        <p:spPr>
+          <a:xfrm>
+            <a:off x="1066800" y="5638800"/>
+            <a:ext cx="3048000" cy="838200"/>
+          </a:xfrm>
+          <a:prstGeom prst="rect">
+            <a:avLst/>
+          </a:prstGeom>
+        </p:spPr>
+        <p:style>
+          <a:lnRef idx="2">
+            <a:schemeClr val="accent1">
+              <a:shade val="50000"/>
+            </a:schemeClr>
+          </a:lnRef>
+          <a:fillRef idx="1">
+            <a:schemeClr val="accent1"/>
+          </a:fillRef>
+          <a:effectRef idx="0">
+            <a:schemeClr val="accent1"/>
+          </a:effectRef>
+          <a:fontRef idx="minor">
+            <a:schemeClr val="lt1"/>
+          </a:fontRef>
+        </p:style>
+        <p:txBody>
+          <a:bodyPr rtlCol="0" anchor="ctr"/>
+          <a:lstStyle/>
+          <a:p>
+            <a:pPr algn="ctr"/>
+            <a:r>
+              <a:rPr lang="en-US" dirty="0" smtClean="0"/>
+              <a:t>A read from one memory location causes the line to be loaded in cache.</a:t>
+            </a:r>
+            <a:endParaRPr lang="en-US" dirty="0"/>
+          </a:p>
+        </p:txBody>
+      </p:sp>
+      <p:sp>
+        <p:nvSpPr>
+          <p:cNvPr id="11" name="Rectangle 10"/>
+          <p:cNvSpPr/>
+          <p:nvPr/>
+        </p:nvSpPr>
+        <p:spPr>
+          <a:xfrm>
+            <a:off x="4267200" y="5638800"/>
+            <a:ext cx="3048000" cy="838200"/>
+          </a:xfrm>
+          <a:prstGeom prst="rect">
+            <a:avLst/>
+          </a:prstGeom>
+        </p:spPr>
+        <p:style>
+          <a:lnRef idx="2">
+            <a:schemeClr val="accent1">
+              <a:shade val="50000"/>
+            </a:schemeClr>
+          </a:lnRef>
+          <a:fillRef idx="1">
+            <a:schemeClr val="accent1"/>
+          </a:fillRef>
+          <a:effectRef idx="0">
+            <a:schemeClr val="accent1"/>
+          </a:effectRef>
+          <a:fontRef idx="minor">
+            <a:schemeClr val="lt1"/>
+          </a:fontRef>
+        </p:style>
+        <p:txBody>
+          <a:bodyPr rtlCol="0" anchor="ctr"/>
+          <a:lstStyle/>
+          <a:p>
+            <a:pPr algn="ctr"/>
+            <a:r>
+              <a:rPr lang="en-US" dirty="0" smtClean="0"/>
+              <a:t>A write to one memory location causes the line to be written to memory.</a:t>
+            </a:r>
+            <a:endParaRPr lang="en-US" dirty="0"/>
+          </a:p>
+        </p:txBody>
+      </p:sp>
+      <p:sp>
+        <p:nvSpPr>
+          <p:cNvPr id="12" name="Footer Placeholder 11"/>
+          <p:cNvSpPr>
+            <a:spLocks noGrp="1"/>
+          </p:cNvSpPr>
+          <p:nvPr>
+            <p:ph type="ftr" sz="quarter" idx="11"/>
+          </p:nvPr>
+        </p:nvSpPr>
+        <p:spPr/>
+        <p:txBody>
+          <a:bodyPr/>
+          <a:lstStyle/>
+          <a:p>
+            <a:r>
+              <a:rPr lang="en-US" smtClean="0"/>
+              <a:t>Source: Williams, Chapter 8</a:t>
+            </a:r>
+            <a:endParaRPr lang="en-US"/>
+          </a:p>
+        </p:txBody>
+      </p:sp>
+    </p:spTree>
+    <p:extLst>
+      <p:ext uri="{BB962C8B-B14F-4D97-AF65-F5344CB8AC3E}">
+        <p14:creationId xmlns:p14="http://schemas.microsoft.com/office/powerpoint/2010/main" val="4060564715"/>
+      </p:ext>
+    </p:extLst>
+  </p:cSld>
+  <p:clrMapOvr>
+    <a:masterClrMapping/>
+  </p:clrMapOvr>
+  <p:timing>
+    <p:tnLst>
+      <p:par>
+        <p:cTn id="1" dur="indefinite" restart="never" nodeType="tmRoot">
+          <p:childTnLst>
+            <p:seq concurrent="1" nextAc="seek">
+              <p:cTn id="2" dur="indefinite" nodeType="mainSeq">
+                <p:childTnLst>
+                  <p:par>
+                    <p:cTn id="3" fill="hold">
+                      <p:stCondLst>
+                        <p:cond delay="indefinite"/>
+                      </p:stCondLst>
+                      <p:childTnLst>
+                        <p:par>
+                          <p:cTn id="4" fill="hold">
+                            <p:stCondLst>
+                              <p:cond delay="0"/>
+                            </p:stCondLst>
+                            <p:childTnLst>
+                              <p:par>
+                                <p:cTn id="5" presetID="1" presetClass="entr" presetSubtype="0" fill="hold" nodeType="clickEffect">
+                                  <p:stCondLst>
+                                    <p:cond delay="0"/>
+                                  </p:stCondLst>
+                                  <p:childTnLst>
+                                    <p:set>
+                                      <p:cBhvr>
+                                        <p:cTn id="6" dur="1" fill="hold">
+                                          <p:stCondLst>
+                                            <p:cond delay="0"/>
+                                          </p:stCondLst>
+                                        </p:cTn>
+                                        <p:tgtEl>
+                                          <p:spTgt spid="8"/>
+                                        </p:tgtEl>
+                                        <p:attrNameLst>
+                                          <p:attrName>style.visibility</p:attrName>
+                                        </p:attrNameLst>
+                                      </p:cBhvr>
+                                      <p:to>
+                                        <p:strVal val="visible"/>
+                                      </p:to>
+                                    </p:set>
+                                  </p:childTnLst>
+                                </p:cTn>
+                              </p:par>
+                              <p:par>
+                                <p:cTn id="7" presetID="1" presetClass="entr" presetSubtype="0" fill="hold" nodeType="withEffect">
+                                  <p:stCondLst>
+                                    <p:cond delay="0"/>
+                                  </p:stCondLst>
+                                  <p:childTnLst>
+                                    <p:set>
+                                      <p:cBhvr>
+                                        <p:cTn id="8" dur="1" fill="hold">
+                                          <p:stCondLst>
+                                            <p:cond delay="0"/>
+                                          </p:stCondLst>
+                                        </p:cTn>
+                                        <p:tgtEl>
+                                          <p:spTgt spid="6"/>
+                                        </p:tgtEl>
+                                        <p:attrNameLst>
+                                          <p:attrName>style.visibility</p:attrName>
+                                        </p:attrNameLst>
+                                      </p:cBhvr>
+                                      <p:to>
+                                        <p:strVal val="visible"/>
+                                      </p:to>
+                                    </p:set>
+                                  </p:childTnLst>
+                                </p:cTn>
+                              </p:par>
+                            </p:childTnLst>
+                          </p:cTn>
+                        </p:par>
+                      </p:childTnLst>
+                    </p:cTn>
+                  </p:par>
+                  <p:par>
+                    <p:cTn id="9" fill="hold">
+                      <p:stCondLst>
+                        <p:cond delay="indefinite"/>
+                      </p:stCondLst>
+                      <p:childTnLst>
+                        <p:par>
+                          <p:cTn id="10" fill="hold">
+                            <p:stCondLst>
+                              <p:cond delay="0"/>
+                            </p:stCondLst>
+                            <p:childTnLst>
+                              <p:par>
+                                <p:cTn id="11" presetID="1" presetClass="entr" presetSubtype="0" fill="hold" grpId="0" nodeType="clickEffect">
+                                  <p:stCondLst>
+                                    <p:cond delay="0"/>
+                                  </p:stCondLst>
+                                  <p:childTnLst>
+                                    <p:set>
+                                      <p:cBhvr>
+                                        <p:cTn id="12" dur="1" fill="hold">
+                                          <p:stCondLst>
+                                            <p:cond delay="0"/>
+                                          </p:stCondLst>
+                                        </p:cTn>
+                                        <p:tgtEl>
+                                          <p:spTgt spid="10"/>
+                                        </p:tgtEl>
+                                        <p:attrNameLst>
+                                          <p:attrName>style.visibility</p:attrName>
+                                        </p:attrNameLst>
+                                      </p:cBhvr>
+                                      <p:to>
+                                        <p:strVal val="visible"/>
+                                      </p:to>
+                                    </p:set>
+                                  </p:childTnLst>
+                                </p:cTn>
+                              </p:par>
+                            </p:childTnLst>
+                          </p:cTn>
+                        </p:par>
+                      </p:childTnLst>
+                    </p:cTn>
+                  </p:par>
+                  <p:par>
+                    <p:cTn id="13" fill="hold">
+                      <p:stCondLst>
+                        <p:cond delay="indefinite"/>
+                      </p:stCondLst>
+                      <p:childTnLst>
+                        <p:par>
+                          <p:cTn id="14" fill="hold">
+                            <p:stCondLst>
+                              <p:cond delay="0"/>
+                            </p:stCondLst>
+                            <p:childTnLst>
+                              <p:par>
+                                <p:cTn id="15" presetID="1" presetClass="entr" presetSubtype="0" fill="hold" grpId="0" nodeType="clickEffect">
+                                  <p:stCondLst>
+                                    <p:cond delay="0"/>
+                                  </p:stCondLst>
+                                  <p:childTnLst>
+                                    <p:set>
+                                      <p:cBhvr>
+                                        <p:cTn id="16" dur="1" fill="hold">
+                                          <p:stCondLst>
+                                            <p:cond delay="0"/>
+                                          </p:stCondLst>
+                                        </p:cTn>
+                                        <p:tgtEl>
+                                          <p:spTgt spid="11"/>
+                                        </p:tgtEl>
+                                        <p:attrNameLst>
+                                          <p:attrName>style.visibility</p:attrName>
+                                        </p:attrNameLst>
+                                      </p:cBhvr>
+                                      <p:to>
+                                        <p:strVal val="visible"/>
+                                      </p:to>
+                                    </p:set>
+                                  </p:childTnLst>
+                                </p:cTn>
+                              </p:par>
+                            </p:childTnLst>
+                          </p:cTn>
+                        </p:par>
+                      </p:childTnLst>
+                    </p:cTn>
+                  </p:par>
+                </p:childTnLst>
+              </p:cTn>
+              <p:prevCondLst>
+                <p:cond evt="onPrev" delay="0">
+                  <p:tgtEl>
+                    <p:sldTgt/>
+                  </p:tgtEl>
+                </p:cond>
+              </p:prevCondLst>
+              <p:nextCondLst>
+                <p:cond evt="onNext" delay="0">
+                  <p:tgtEl>
+                    <p:sldTgt/>
+                  </p:tgtEl>
+                </p:cond>
+              </p:nextCondLst>
+            </p:seq>
+          </p:childTnLst>
+        </p:cTn>
+      </p:par>
+    </p:tnLst>
+    <p:bldLst>
+      <p:bldP spid="10" grpId="0" animBg="1"/>
+      <p:bldP spid="11" grpId="0" animBg="1"/>
+    </p:bldLst>
+  </p:timing>
+</p:sld>
+</file>
+
+<file path=ppt/slides/slide21.xml><?xml version="1.0" encoding="utf-8"?>
+<p:sld xmlns:a="http://schemas.openxmlformats.org/drawingml/2006/main" xmlns:r="http://schemas.openxmlformats.org/officeDocument/2006/relationships" xmlns:p="http://schemas.openxmlformats.org/presentationml/2006/main">
+  <p:cSld>
+    <p:spTree>
+      <p:nvGrpSpPr>
+        <p:cNvPr id="1" name=""/>
+        <p:cNvGrpSpPr/>
+        <p:nvPr/>
+      </p:nvGrpSpPr>
+      <p:grpSpPr>
+        <a:xfrm>
+          <a:off x="0" y="0"/>
+          <a:ext cx="0" cy="0"/>
+          <a:chOff x="0" y="0"/>
+          <a:chExt cx="0" cy="0"/>
+        </a:xfrm>
+      </p:grpSpPr>
+      <p:sp>
+        <p:nvSpPr>
+          <p:cNvPr id="2" name="Title 1"/>
+          <p:cNvSpPr>
+            <a:spLocks noGrp="1"/>
+          </p:cNvSpPr>
+          <p:nvPr>
+            <p:ph type="title"/>
+          </p:nvPr>
+        </p:nvSpPr>
+        <p:spPr/>
+        <p:txBody>
+          <a:bodyPr/>
+          <a:lstStyle/>
+          <a:p>
+            <a:r>
+              <a:rPr lang="en-US" dirty="0" smtClean="0"/>
+              <a:t>Problems with cache</a:t>
+            </a:r>
+            <a:endParaRPr lang="en-US" dirty="0"/>
+          </a:p>
+        </p:txBody>
+      </p:sp>
+      <p:sp>
+        <p:nvSpPr>
+          <p:cNvPr id="3" name="Content Placeholder 2"/>
+          <p:cNvSpPr>
+            <a:spLocks noGrp="1"/>
+          </p:cNvSpPr>
+          <p:nvPr>
+            <p:ph idx="1"/>
+          </p:nvPr>
+        </p:nvSpPr>
+        <p:spPr/>
+        <p:txBody>
+          <a:bodyPr>
+            <a:normAutofit lnSpcReduction="10000"/>
+          </a:bodyPr>
+          <a:lstStyle/>
+          <a:p>
+            <a:r>
+              <a:rPr lang="en-US" dirty="0" smtClean="0"/>
+              <a:t>Understanding how cache can impact the performance of concurrent code is important.</a:t>
+            </a:r>
+          </a:p>
+          <a:p>
+            <a:pPr marL="914400" lvl="1" indent="-457200"/>
+            <a:r>
+              <a:rPr lang="en-US" i="1" dirty="0" smtClean="0"/>
+              <a:t>Cache </a:t>
+            </a:r>
+            <a:r>
+              <a:rPr lang="en-US" i="1" dirty="0" err="1" smtClean="0"/>
+              <a:t>ping-pong</a:t>
+            </a:r>
+            <a:r>
+              <a:rPr lang="en-US" dirty="0" smtClean="0"/>
+              <a:t>: If two threads are reading from a memory location and one thread writes to it, then</a:t>
+            </a:r>
+          </a:p>
+          <a:p>
+            <a:pPr marL="1600200" lvl="2" indent="-457200"/>
+            <a:r>
+              <a:rPr lang="en-US" dirty="0" smtClean="0"/>
+              <a:t>Each read and write must go to main memory</a:t>
+            </a:r>
+          </a:p>
+          <a:p>
+            <a:pPr marL="1600200" lvl="2" indent="-457200"/>
+            <a:r>
+              <a:rPr lang="en-US" dirty="0" smtClean="0"/>
+              <a:t>Eliminates the performance advantage of cache</a:t>
+            </a:r>
+          </a:p>
+          <a:p>
+            <a:pPr marL="1600200" lvl="2" indent="-457200"/>
+            <a:r>
+              <a:rPr lang="en-US" dirty="0" smtClean="0"/>
+              <a:t>To fix it: avoid mutexes – especially in loops</a:t>
+            </a:r>
+          </a:p>
+          <a:p>
+            <a:pPr marL="914400" lvl="1" indent="-457200"/>
+            <a:r>
+              <a:rPr lang="en-US" i="1" dirty="0" smtClean="0"/>
+              <a:t>False sharing</a:t>
+            </a:r>
+            <a:r>
+              <a:rPr lang="en-US" dirty="0" smtClean="0"/>
+              <a:t>: If two threads read or write data which is on the same cache line, then</a:t>
+            </a:r>
+          </a:p>
+          <a:p>
+            <a:pPr marL="1600200" lvl="2" indent="-457200"/>
+            <a:r>
+              <a:rPr lang="en-US" dirty="0"/>
+              <a:t>Each read and write must go to main memory</a:t>
+            </a:r>
+          </a:p>
+          <a:p>
+            <a:pPr marL="1600200" lvl="2" indent="-457200"/>
+            <a:r>
+              <a:rPr lang="en-US" dirty="0"/>
+              <a:t>Eliminates the performance advantage of cache</a:t>
+            </a:r>
+          </a:p>
+          <a:p>
+            <a:pPr marL="1600200" lvl="2" indent="-457200"/>
+            <a:r>
+              <a:rPr lang="en-US" dirty="0" smtClean="0"/>
+              <a:t>To fix it: keep data used by different threads separated</a:t>
+            </a:r>
+          </a:p>
+          <a:p>
+            <a:pPr marL="457200" indent="-457200"/>
+            <a:r>
+              <a:rPr lang="en-US" dirty="0" smtClean="0"/>
+              <a:t>These problems are difficult to detect – measure them!</a:t>
+            </a:r>
+          </a:p>
+          <a:p>
+            <a:pPr marL="1600200" lvl="2" indent="-457200"/>
+            <a:endParaRPr lang="en-US" dirty="0"/>
+          </a:p>
+        </p:txBody>
+      </p:sp>
+      <p:sp>
+        <p:nvSpPr>
+          <p:cNvPr id="4" name="Slide Number Placeholder 3"/>
+          <p:cNvSpPr>
+            <a:spLocks noGrp="1"/>
+          </p:cNvSpPr>
+          <p:nvPr>
+            <p:ph type="sldNum" sz="quarter" idx="12"/>
+          </p:nvPr>
+        </p:nvSpPr>
+        <p:spPr/>
+        <p:txBody>
+          <a:bodyPr/>
+          <a:lstStyle/>
+          <a:p>
+            <a:fld id="{6DA12B36-9664-4CB0-8B2E-F4A2F44AE97E}" type="slidenum">
+              <a:rPr lang="en-US" smtClean="0"/>
+              <a:t>21</a:t>
+            </a:fld>
+            <a:endParaRPr lang="en-US"/>
+          </a:p>
+        </p:txBody>
+      </p:sp>
+      <p:sp>
+        <p:nvSpPr>
+          <p:cNvPr id="5" name="Footer Placeholder 4"/>
+          <p:cNvSpPr>
+            <a:spLocks noGrp="1"/>
+          </p:cNvSpPr>
+          <p:nvPr>
+            <p:ph type="ftr" sz="quarter" idx="11"/>
+          </p:nvPr>
+        </p:nvSpPr>
+        <p:spPr/>
+        <p:txBody>
+          <a:bodyPr/>
+          <a:lstStyle/>
+          <a:p>
+            <a:r>
+              <a:rPr lang="en-US" smtClean="0"/>
+              <a:t>Source: Williams, Chapter 8</a:t>
+            </a:r>
+            <a:endParaRPr lang="en-US"/>
+          </a:p>
+        </p:txBody>
+      </p:sp>
+    </p:spTree>
+    <p:extLst>
+      <p:ext uri="{BB962C8B-B14F-4D97-AF65-F5344CB8AC3E}">
+        <p14:creationId xmlns:p14="http://schemas.microsoft.com/office/powerpoint/2010/main" val="3814987670"/>
+      </p:ext>
+    </p:extLst>
+  </p:cSld>
+  <p:clrMapOvr>
+    <a:masterClrMapping/>
+  </p:clrMapOvr>
+  <p:timing>
+    <p:tnLst>
+      <p:par>
+        <p:cTn id="1" dur="indefinite" restart="never" nodeType="tmRoot"/>
+      </p:par>
+    </p:tnLst>
+  </p:timing>
+</p:sld>
+</file>
+
+<file path=ppt/slides/slide22.xml><?xml version="1.0" encoding="utf-8"?>
+<p:sld xmlns:a="http://schemas.openxmlformats.org/drawingml/2006/main" xmlns:r="http://schemas.openxmlformats.org/officeDocument/2006/relationships" xmlns:p="http://schemas.openxmlformats.org/presentationml/2006/main">
+  <p:cSld>
+    <p:spTree>
+      <p:nvGrpSpPr>
+        <p:cNvPr id="1" name=""/>
+        <p:cNvGrpSpPr/>
+        <p:nvPr/>
+      </p:nvGrpSpPr>
+      <p:grpSpPr>
+        <a:xfrm>
+          <a:off x="0" y="0"/>
+          <a:ext cx="0" cy="0"/>
+          <a:chOff x="0" y="0"/>
+          <a:chExt cx="0" cy="0"/>
+        </a:xfrm>
+      </p:grpSpPr>
+      <p:sp>
+        <p:nvSpPr>
+          <p:cNvPr id="2" name="Title 1"/>
+          <p:cNvSpPr>
+            <a:spLocks noGrp="1"/>
+          </p:cNvSpPr>
+          <p:nvPr>
+            <p:ph type="title"/>
+          </p:nvPr>
+        </p:nvSpPr>
+        <p:spPr/>
+        <p:txBody>
+          <a:bodyPr/>
+          <a:lstStyle/>
+          <a:p>
+            <a:r>
+              <a:rPr lang="en-US" dirty="0" smtClean="0"/>
+              <a:t>Benefits of cache</a:t>
+            </a:r>
+            <a:endParaRPr lang="en-US" dirty="0"/>
+          </a:p>
+        </p:txBody>
+      </p:sp>
+      <p:sp>
+        <p:nvSpPr>
+          <p:cNvPr id="3" name="Content Placeholder 2"/>
+          <p:cNvSpPr>
+            <a:spLocks noGrp="1"/>
+          </p:cNvSpPr>
+          <p:nvPr>
+            <p:ph idx="1"/>
+          </p:nvPr>
+        </p:nvSpPr>
+        <p:spPr/>
+        <p:txBody>
+          <a:bodyPr/>
+          <a:lstStyle/>
+          <a:p>
+            <a:r>
+              <a:rPr lang="en-US" dirty="0" smtClean="0"/>
+              <a:t>Use the speed and size of cache to your advantage.</a:t>
+            </a:r>
+          </a:p>
+          <a:p>
+            <a:pPr marL="800100" lvl="1" indent="-342900"/>
+            <a:r>
+              <a:rPr lang="en-US" dirty="0" smtClean="0"/>
+              <a:t>Understand as much about your target CPU architectures as possible.</a:t>
+            </a:r>
+          </a:p>
+          <a:p>
+            <a:pPr marL="1485900" lvl="2" indent="-342900"/>
+            <a:r>
+              <a:rPr lang="en-US" dirty="0" smtClean="0"/>
+              <a:t>How large are the caches?</a:t>
+            </a:r>
+          </a:p>
+          <a:p>
+            <a:pPr marL="1485900" lvl="2" indent="-342900"/>
+            <a:r>
+              <a:rPr lang="en-US" dirty="0" smtClean="0"/>
+              <a:t>What are the cache line sizes?</a:t>
+            </a:r>
+          </a:p>
+          <a:p>
+            <a:pPr marL="1485900" lvl="2" indent="-342900"/>
+            <a:r>
+              <a:rPr lang="en-US" dirty="0" smtClean="0"/>
+              <a:t>How many levels of cache exist?</a:t>
+            </a:r>
+          </a:p>
+          <a:p>
+            <a:pPr marL="1485900" lvl="2" indent="-342900"/>
+            <a:r>
+              <a:rPr lang="en-US" dirty="0" smtClean="0"/>
+              <a:t>How are the caches shared?</a:t>
+            </a:r>
+          </a:p>
+          <a:p>
+            <a:pPr marL="800100" lvl="1" indent="-342900"/>
+            <a:r>
+              <a:rPr lang="en-US" dirty="0" smtClean="0"/>
+              <a:t>Keep data used on one thread close in memory.</a:t>
+            </a:r>
+          </a:p>
+          <a:p>
+            <a:pPr marL="1485900" lvl="2" indent="-342900"/>
+            <a:r>
+              <a:rPr lang="en-US" dirty="0" smtClean="0"/>
+              <a:t>Prefer contiguous arrays of data.</a:t>
+            </a:r>
+          </a:p>
+          <a:p>
+            <a:pPr marL="1485900" lvl="2" indent="-342900"/>
+            <a:r>
+              <a:rPr lang="en-US" dirty="0" smtClean="0"/>
+              <a:t>Avoid data structures with heap-allocated memory.</a:t>
+            </a:r>
+          </a:p>
+          <a:p>
+            <a:pPr marL="342900" indent="-342900"/>
+            <a:endParaRPr lang="en-US" dirty="0"/>
+          </a:p>
+          <a:p>
+            <a:pPr marL="342900" indent="-342900"/>
+            <a:r>
+              <a:rPr lang="en-US" dirty="0"/>
+              <a:t>These </a:t>
+            </a:r>
+            <a:r>
+              <a:rPr lang="en-US" dirty="0" smtClean="0"/>
+              <a:t>benefits are </a:t>
+            </a:r>
+            <a:r>
+              <a:rPr lang="en-US" dirty="0"/>
+              <a:t>difficult to </a:t>
+            </a:r>
+            <a:r>
+              <a:rPr lang="en-US" dirty="0" smtClean="0"/>
+              <a:t>find – </a:t>
+            </a:r>
+            <a:r>
+              <a:rPr lang="en-US" dirty="0"/>
+              <a:t>measure them!</a:t>
+            </a:r>
+          </a:p>
+          <a:p>
+            <a:pPr marL="342900" indent="-342900"/>
+            <a:endParaRPr lang="en-US" dirty="0"/>
+          </a:p>
+        </p:txBody>
+      </p:sp>
+      <p:sp>
+        <p:nvSpPr>
+          <p:cNvPr id="4" name="Slide Number Placeholder 3"/>
+          <p:cNvSpPr>
+            <a:spLocks noGrp="1"/>
+          </p:cNvSpPr>
+          <p:nvPr>
+            <p:ph type="sldNum" sz="quarter" idx="12"/>
+          </p:nvPr>
+        </p:nvSpPr>
+        <p:spPr/>
+        <p:txBody>
+          <a:bodyPr/>
+          <a:lstStyle/>
+          <a:p>
+            <a:fld id="{6DA12B36-9664-4CB0-8B2E-F4A2F44AE97E}" type="slidenum">
+              <a:rPr lang="en-US" smtClean="0"/>
+              <a:t>22</a:t>
+            </a:fld>
+            <a:endParaRPr lang="en-US"/>
+          </a:p>
+        </p:txBody>
+      </p:sp>
+    </p:spTree>
+    <p:extLst>
+      <p:ext uri="{BB962C8B-B14F-4D97-AF65-F5344CB8AC3E}">
+        <p14:creationId xmlns:p14="http://schemas.microsoft.com/office/powerpoint/2010/main" val="3305614842"/>
       </p:ext>
     </p:extLst>
   </p:cSld>

</xml_diff>